<commit_message>
Update the started defense
</commit_message>
<xml_diff>
--- a/开题答辩PPT.pptx
+++ b/开题答辩PPT.pptx
@@ -9,22 +9,23 @@
     <p:notesMasterId r:id="rId5"/>
   </p:notesMasterIdLst>
   <p:handoutMasterIdLst>
-    <p:handoutMasterId r:id="rId13"/>
+    <p:handoutMasterId r:id="rId14"/>
   </p:handoutMasterIdLst>
   <p:sldIdLst>
     <p:sldId id="257" r:id="rId4"/>
-    <p:sldId id="509" r:id="rId6"/>
-    <p:sldId id="633" r:id="rId7"/>
-    <p:sldId id="634" r:id="rId8"/>
-    <p:sldId id="635" r:id="rId9"/>
-    <p:sldId id="631" r:id="rId10"/>
+    <p:sldId id="633" r:id="rId6"/>
+    <p:sldId id="509" r:id="rId7"/>
+    <p:sldId id="631" r:id="rId8"/>
+    <p:sldId id="639" r:id="rId9"/>
+    <p:sldId id="640" r:id="rId10"/>
     <p:sldId id="399" r:id="rId11"/>
-    <p:sldId id="632" r:id="rId12"/>
+    <p:sldId id="641" r:id="rId12"/>
+    <p:sldId id="632" r:id="rId13"/>
   </p:sldIdLst>
   <p:sldSz cx="12192000" cy="6858000"/>
   <p:notesSz cx="7103745" cy="10234295"/>
   <p:custDataLst>
-    <p:tags r:id="rId18"/>
+    <p:tags r:id="rId19"/>
   </p:custDataLst>
   <p:defaultTextStyle>
     <a:defPPr>
@@ -129,7 +130,7 @@
             <a:srgbClr val="A4A3A4"/>
           </p15:clr>
         </p15:guide>
-        <p15:guide id="2" pos="3840" userDrawn="1">
+        <p15:guide id="2" pos="3841" userDrawn="1">
           <p15:clr>
             <a:srgbClr val="A4A3A4"/>
           </p15:clr>
@@ -2609,7 +2610,7 @@
                   </a:schemeClr>
                 </a:solidFill>
                 <a:uFillTx/>
-                <a:latin typeface="Arial" panose="020B0604020202090204" pitchFamily="34" charset="0"/>
+                <a:latin typeface="Arial" panose="020B0604020202020204" pitchFamily="34" charset="0"/>
                 <a:ea typeface="微软雅黑" panose="020B0503020204020204" charset="-122"/>
                 <a:cs typeface="+mj-cs"/>
                 <a:sym typeface="+mn-ea"/>
@@ -2664,7 +2665,7 @@
               <a:spcAft>
                 <a:spcPts val="1000"/>
               </a:spcAft>
-              <a:buFont typeface="Arial" panose="020B0604020202090204" pitchFamily="34" charset="0"/>
+              <a:buFont typeface="Arial" panose="020B0604020202020204" pitchFamily="34" charset="0"/>
               <a:buChar char="•"/>
               <a:defRPr kumimoji="0" lang="zh-CN" altLang="en-US" sz="1600" b="0" i="0" u="none" strike="noStrike" kern="1200" cap="none" spc="150" normalizeH="0" baseline="0" noProof="1" dirty="0">
                 <a:solidFill>
@@ -2674,7 +2675,7 @@
                   </a:schemeClr>
                 </a:solidFill>
                 <a:uFillTx/>
-                <a:latin typeface="Arial" panose="020B0604020202090204" pitchFamily="34" charset="0"/>
+                <a:latin typeface="Arial" panose="020B0604020202020204" pitchFamily="34" charset="0"/>
                 <a:ea typeface="微软雅黑" panose="020B0503020204020204" charset="-122"/>
                 <a:cs typeface="+mn-cs"/>
                 <a:sym typeface="+mn-ea"/>
@@ -2690,7 +2691,7 @@
               <a:spcAft>
                 <a:spcPts val="1000"/>
               </a:spcAft>
-              <a:buFont typeface="Arial" panose="020B0604020202090204" pitchFamily="34" charset="0"/>
+              <a:buFont typeface="Arial" panose="020B0604020202020204" pitchFamily="34" charset="0"/>
               <a:buChar char="•"/>
               <a:tabLst>
                 <a:tab pos="1609725" algn="l"/>
@@ -2703,7 +2704,7 @@
                   </a:schemeClr>
                 </a:solidFill>
                 <a:uFillTx/>
-                <a:latin typeface="Arial" panose="020B0604020202090204" pitchFamily="34" charset="0"/>
+                <a:latin typeface="Arial" panose="020B0604020202020204" pitchFamily="34" charset="0"/>
                 <a:ea typeface="微软雅黑" panose="020B0503020204020204" charset="-122"/>
                 <a:cs typeface="+mn-cs"/>
                 <a:sym typeface="+mn-ea"/>
@@ -2719,7 +2720,7 @@
               <a:spcAft>
                 <a:spcPts val="1000"/>
               </a:spcAft>
-              <a:buFont typeface="Arial" panose="020B0604020202090204" pitchFamily="34" charset="0"/>
+              <a:buFont typeface="Arial" panose="020B0604020202020204" pitchFamily="34" charset="0"/>
               <a:buChar char="•"/>
               <a:defRPr kumimoji="0" lang="zh-CN" altLang="en-US" sz="1600" b="0" i="0" u="none" strike="noStrike" kern="1200" cap="none" spc="150" normalizeH="0" baseline="0" noProof="1" dirty="0">
                 <a:solidFill>
@@ -2729,7 +2730,7 @@
                   </a:schemeClr>
                 </a:solidFill>
                 <a:uFillTx/>
-                <a:latin typeface="Arial" panose="020B0604020202090204" pitchFamily="34" charset="0"/>
+                <a:latin typeface="Arial" panose="020B0604020202020204" pitchFamily="34" charset="0"/>
                 <a:ea typeface="微软雅黑" panose="020B0503020204020204" charset="-122"/>
                 <a:cs typeface="+mn-cs"/>
                 <a:sym typeface="+mn-ea"/>
@@ -2745,7 +2746,7 @@
               <a:spcAft>
                 <a:spcPts val="1000"/>
               </a:spcAft>
-              <a:buFont typeface="Arial" panose="020B0604020202090204" pitchFamily="34" charset="0"/>
+              <a:buFont typeface="Arial" panose="020B0604020202020204" pitchFamily="34" charset="0"/>
               <a:buChar char="•"/>
               <a:defRPr kumimoji="0" lang="zh-CN" altLang="en-US" sz="1600" b="0" i="0" u="none" strike="noStrike" kern="1200" cap="none" spc="150" normalizeH="0" baseline="0" noProof="1" dirty="0">
                 <a:solidFill>
@@ -2755,7 +2756,7 @@
                   </a:schemeClr>
                 </a:solidFill>
                 <a:uFillTx/>
-                <a:latin typeface="Arial" panose="020B0604020202090204" pitchFamily="34" charset="0"/>
+                <a:latin typeface="Arial" panose="020B0604020202020204" pitchFamily="34" charset="0"/>
                 <a:ea typeface="微软雅黑" panose="020B0503020204020204" charset="-122"/>
                 <a:cs typeface="+mn-cs"/>
                 <a:sym typeface="+mn-ea"/>
@@ -2771,7 +2772,7 @@
               <a:spcAft>
                 <a:spcPts val="1000"/>
               </a:spcAft>
-              <a:buFont typeface="Arial" panose="020B0604020202090204" pitchFamily="34" charset="0"/>
+              <a:buFont typeface="Arial" panose="020B0604020202020204" pitchFamily="34" charset="0"/>
               <a:buChar char="•"/>
               <a:defRPr kumimoji="0" lang="zh-CN" altLang="en-US" sz="1600" b="0" i="0" u="none" strike="noStrike" kern="1200" cap="none" spc="150" normalizeH="0" baseline="0" noProof="1" dirty="0">
                 <a:solidFill>
@@ -2781,7 +2782,7 @@
                   </a:schemeClr>
                 </a:solidFill>
                 <a:uFillTx/>
-                <a:latin typeface="Arial" panose="020B0604020202090204" pitchFamily="34" charset="0"/>
+                <a:latin typeface="Arial" panose="020B0604020202020204" pitchFamily="34" charset="0"/>
                 <a:ea typeface="微软雅黑" panose="020B0503020204020204" charset="-122"/>
                 <a:cs typeface="+mn-cs"/>
                 <a:sym typeface="+mn-ea"/>
@@ -3279,7 +3280,7 @@
                   </a:schemeClr>
                 </a:solidFill>
                 <a:uFillTx/>
-                <a:latin typeface="Arial" panose="020B0604020202090204" pitchFamily="34" charset="0"/>
+                <a:latin typeface="Arial" panose="020B0604020202020204" pitchFamily="34" charset="0"/>
                 <a:ea typeface="汉仪旗黑-85S" panose="00020600040101010101" pitchFamily="18" charset="-122"/>
               </a:defRPr>
             </a:lvl1pPr>
@@ -3327,7 +3328,7 @@
                   </a:schemeClr>
                 </a:solidFill>
                 <a:uFillTx/>
-                <a:latin typeface="Arial" panose="020B0604020202090204" pitchFamily="34" charset="0"/>
+                <a:latin typeface="Arial" panose="020B0604020202020204" pitchFamily="34" charset="0"/>
                 <a:ea typeface="微软雅黑" panose="020B0503020204020204" charset="-122"/>
                 <a:cs typeface="+mn-cs"/>
                 <a:sym typeface="+mn-ea"/>
@@ -3847,7 +3848,7 @@
                   </a:schemeClr>
                 </a:solidFill>
                 <a:uFillTx/>
-                <a:latin typeface="Arial" panose="020B0604020202090204" pitchFamily="34" charset="0"/>
+                <a:latin typeface="Arial" panose="020B0604020202020204" pitchFamily="34" charset="0"/>
                 <a:ea typeface="汉仪旗黑-85S" panose="00020600040101010101" pitchFamily="18" charset="-122"/>
                 <a:cs typeface="+mj-cs"/>
                 <a:sym typeface="+mn-ea"/>
@@ -3902,7 +3903,7 @@
               <a:spcAft>
                 <a:spcPts val="1000"/>
               </a:spcAft>
-              <a:buFont typeface="Arial" panose="020B0604020202090204" pitchFamily="34" charset="0"/>
+              <a:buFont typeface="Arial" panose="020B0604020202020204" pitchFamily="34" charset="0"/>
               <a:buNone/>
               <a:defRPr kumimoji="0" lang="zh-CN" altLang="en-US" sz="1600" b="0" i="0" u="none" strike="noStrike" kern="1200" cap="none" spc="150" normalizeH="0" baseline="0" noProof="1" dirty="0">
                 <a:solidFill>
@@ -3912,7 +3913,7 @@
                   </a:schemeClr>
                 </a:solidFill>
                 <a:uFillTx/>
-                <a:latin typeface="Arial" panose="020B0604020202090204" pitchFamily="34" charset="0"/>
+                <a:latin typeface="Arial" panose="020B0604020202020204" pitchFamily="34" charset="0"/>
                 <a:ea typeface="微软雅黑" panose="020B0503020204020204" charset="-122"/>
                 <a:cs typeface="+mn-cs"/>
                 <a:sym typeface="+mn-ea"/>
@@ -3928,7 +3929,7 @@
               <a:spcAft>
                 <a:spcPts val="1000"/>
               </a:spcAft>
-              <a:buFont typeface="Arial" panose="020B0604020202090204" pitchFamily="34" charset="0"/>
+              <a:buFont typeface="Arial" panose="020B0604020202020204" pitchFamily="34" charset="0"/>
               <a:buNone/>
               <a:tabLst>
                 <a:tab pos="1609725" algn="l"/>
@@ -3941,7 +3942,7 @@
                   </a:schemeClr>
                 </a:solidFill>
                 <a:uFillTx/>
-                <a:latin typeface="Arial" panose="020B0604020202090204" pitchFamily="34" charset="0"/>
+                <a:latin typeface="Arial" panose="020B0604020202020204" pitchFamily="34" charset="0"/>
                 <a:ea typeface="微软雅黑" panose="020B0503020204020204" charset="-122"/>
                 <a:cs typeface="+mn-cs"/>
                 <a:sym typeface="+mn-ea"/>
@@ -3957,7 +3958,7 @@
               <a:spcAft>
                 <a:spcPts val="1000"/>
               </a:spcAft>
-              <a:buFont typeface="Arial" panose="020B0604020202090204" pitchFamily="34" charset="0"/>
+              <a:buFont typeface="Arial" panose="020B0604020202020204" pitchFamily="34" charset="0"/>
               <a:buNone/>
               <a:defRPr kumimoji="0" lang="zh-CN" altLang="en-US" sz="1600" b="0" i="0" u="none" strike="noStrike" kern="1200" cap="none" spc="150" normalizeH="0" baseline="0" noProof="1" dirty="0">
                 <a:solidFill>
@@ -3967,7 +3968,7 @@
                   </a:schemeClr>
                 </a:solidFill>
                 <a:uFillTx/>
-                <a:latin typeface="Arial" panose="020B0604020202090204" pitchFamily="34" charset="0"/>
+                <a:latin typeface="Arial" panose="020B0604020202020204" pitchFamily="34" charset="0"/>
                 <a:ea typeface="微软雅黑" panose="020B0503020204020204" charset="-122"/>
                 <a:cs typeface="+mn-cs"/>
                 <a:sym typeface="+mn-ea"/>
@@ -3983,7 +3984,7 @@
               <a:spcAft>
                 <a:spcPts val="1000"/>
               </a:spcAft>
-              <a:buFont typeface="Arial" panose="020B0604020202090204" pitchFamily="34" charset="0"/>
+              <a:buFont typeface="Arial" panose="020B0604020202020204" pitchFamily="34" charset="0"/>
               <a:buNone/>
               <a:defRPr kumimoji="0" lang="zh-CN" altLang="en-US" sz="1600" b="0" i="0" u="none" strike="noStrike" kern="1200" cap="none" spc="150" normalizeH="0" baseline="0" noProof="1" dirty="0">
                 <a:solidFill>
@@ -3993,7 +3994,7 @@
                   </a:schemeClr>
                 </a:solidFill>
                 <a:uFillTx/>
-                <a:latin typeface="Arial" panose="020B0604020202090204" pitchFamily="34" charset="0"/>
+                <a:latin typeface="Arial" panose="020B0604020202020204" pitchFamily="34" charset="0"/>
                 <a:ea typeface="微软雅黑" panose="020B0503020204020204" charset="-122"/>
                 <a:cs typeface="+mn-cs"/>
                 <a:sym typeface="+mn-ea"/>
@@ -4009,7 +4010,7 @@
               <a:spcAft>
                 <a:spcPts val="1000"/>
               </a:spcAft>
-              <a:buFont typeface="Arial" panose="020B0604020202090204" pitchFamily="34" charset="0"/>
+              <a:buFont typeface="Arial" panose="020B0604020202020204" pitchFamily="34" charset="0"/>
               <a:buNone/>
               <a:defRPr kumimoji="0" lang="zh-CN" altLang="en-US" sz="1600" b="0" i="0" u="none" strike="noStrike" kern="1200" cap="none" spc="150" normalizeH="0" baseline="0" noProof="1" dirty="0">
                 <a:solidFill>
@@ -4019,7 +4020,7 @@
                   </a:schemeClr>
                 </a:solidFill>
                 <a:uFillTx/>
-                <a:latin typeface="Arial" panose="020B0604020202090204" pitchFamily="34" charset="0"/>
+                <a:latin typeface="Arial" panose="020B0604020202020204" pitchFamily="34" charset="0"/>
                 <a:ea typeface="微软雅黑" panose="020B0503020204020204" charset="-122"/>
                 <a:cs typeface="+mn-cs"/>
                 <a:sym typeface="+mn-ea"/>
@@ -4121,7 +4122,7 @@
                     <a:lumOff val="15000"/>
                   </a:schemeClr>
                 </a:solidFill>
-                <a:latin typeface="Arial" panose="020B0604020202090204" pitchFamily="34" charset="0"/>
+                <a:latin typeface="Arial" panose="020B0604020202020204" pitchFamily="34" charset="0"/>
                 <a:ea typeface="微软雅黑" panose="020B0503020204020204" charset="-122"/>
               </a:defRPr>
             </a:lvl1pPr>
@@ -4134,7 +4135,7 @@
                     <a:lumOff val="15000"/>
                   </a:schemeClr>
                 </a:solidFill>
-                <a:latin typeface="Arial" panose="020B0604020202090204" pitchFamily="34" charset="0"/>
+                <a:latin typeface="Arial" panose="020B0604020202020204" pitchFamily="34" charset="0"/>
                 <a:ea typeface="微软雅黑" panose="020B0503020204020204" charset="-122"/>
               </a:defRPr>
             </a:lvl2pPr>
@@ -4147,7 +4148,7 @@
                     <a:lumOff val="15000"/>
                   </a:schemeClr>
                 </a:solidFill>
-                <a:latin typeface="Arial" panose="020B0604020202090204" pitchFamily="34" charset="0"/>
+                <a:latin typeface="Arial" panose="020B0604020202020204" pitchFamily="34" charset="0"/>
                 <a:ea typeface="微软雅黑" panose="020B0503020204020204" charset="-122"/>
               </a:defRPr>
             </a:lvl3pPr>
@@ -4160,7 +4161,7 @@
                     <a:lumOff val="15000"/>
                   </a:schemeClr>
                 </a:solidFill>
-                <a:latin typeface="Arial" panose="020B0604020202090204" pitchFamily="34" charset="0"/>
+                <a:latin typeface="Arial" panose="020B0604020202020204" pitchFamily="34" charset="0"/>
                 <a:ea typeface="微软雅黑" panose="020B0503020204020204" charset="-122"/>
               </a:defRPr>
             </a:lvl4pPr>
@@ -4173,7 +4174,7 @@
                     <a:lumOff val="15000"/>
                   </a:schemeClr>
                 </a:solidFill>
-                <a:latin typeface="Arial" panose="020B0604020202090204" pitchFamily="34" charset="0"/>
+                <a:latin typeface="Arial" panose="020B0604020202020204" pitchFamily="34" charset="0"/>
                 <a:ea typeface="微软雅黑" panose="020B0503020204020204" charset="-122"/>
               </a:defRPr>
             </a:lvl5pPr>
@@ -4643,7 +4644,7 @@
                   </a:schemeClr>
                 </a:solidFill>
                 <a:uFillTx/>
-                <a:latin typeface="Arial" panose="020B0604020202090204" pitchFamily="34" charset="0"/>
+                <a:latin typeface="Arial" panose="020B0604020202020204" pitchFamily="34" charset="0"/>
                 <a:ea typeface="微软雅黑" panose="020B0503020204020204" charset="-122"/>
                 <a:cs typeface="+mj-cs"/>
                 <a:sym typeface="+mn-ea"/>
@@ -4704,7 +4705,7 @@
                   </a:schemeClr>
                 </a:solidFill>
                 <a:uFillTx/>
-                <a:latin typeface="Arial" panose="020B0604020202090204" pitchFamily="34" charset="0"/>
+                <a:latin typeface="Arial" panose="020B0604020202020204" pitchFamily="34" charset="0"/>
                 <a:ea typeface="微软雅黑" panose="020B0503020204020204" charset="-122"/>
               </a:defRPr>
             </a:lvl1pPr>
@@ -4785,7 +4786,7 @@
               <a:spcAft>
                 <a:spcPts val="1000"/>
               </a:spcAft>
-              <a:buFont typeface="Arial" panose="020B0604020202090204" pitchFamily="34" charset="0"/>
+              <a:buFont typeface="Arial" panose="020B0604020202020204" pitchFamily="34" charset="0"/>
               <a:buChar char="•"/>
               <a:defRPr kumimoji="0" lang="zh-CN" altLang="en-US" sz="1600" b="0" i="0" u="none" strike="noStrike" kern="1200" cap="none" spc="150" normalizeH="0" baseline="0" noProof="1" dirty="0">
                 <a:solidFill>
@@ -4795,7 +4796,7 @@
                   </a:schemeClr>
                 </a:solidFill>
                 <a:uFillTx/>
-                <a:latin typeface="Arial" panose="020B0604020202090204" pitchFamily="34" charset="0"/>
+                <a:latin typeface="Arial" panose="020B0604020202020204" pitchFamily="34" charset="0"/>
                 <a:ea typeface="微软雅黑" panose="020B0503020204020204" charset="-122"/>
                 <a:cs typeface="+mn-cs"/>
                 <a:sym typeface="+mn-ea"/>
@@ -4811,7 +4812,7 @@
               <a:spcAft>
                 <a:spcPts val="1000"/>
               </a:spcAft>
-              <a:buFont typeface="Arial" panose="020B0604020202090204" pitchFamily="34" charset="0"/>
+              <a:buFont typeface="Arial" panose="020B0604020202020204" pitchFamily="34" charset="0"/>
               <a:buChar char="•"/>
               <a:tabLst>
                 <a:tab pos="1609725" algn="l"/>
@@ -4824,7 +4825,7 @@
                   </a:schemeClr>
                 </a:solidFill>
                 <a:uFillTx/>
-                <a:latin typeface="Arial" panose="020B0604020202090204" pitchFamily="34" charset="0"/>
+                <a:latin typeface="Arial" panose="020B0604020202020204" pitchFamily="34" charset="0"/>
                 <a:ea typeface="微软雅黑" panose="020B0503020204020204" charset="-122"/>
                 <a:cs typeface="+mn-cs"/>
                 <a:sym typeface="+mn-ea"/>
@@ -4840,7 +4841,7 @@
               <a:spcAft>
                 <a:spcPts val="1000"/>
               </a:spcAft>
-              <a:buFont typeface="Arial" panose="020B0604020202090204" pitchFamily="34" charset="0"/>
+              <a:buFont typeface="Arial" panose="020B0604020202020204" pitchFamily="34" charset="0"/>
               <a:buChar char="•"/>
               <a:defRPr kumimoji="0" lang="zh-CN" altLang="en-US" sz="1600" b="0" i="0" u="none" strike="noStrike" kern="1200" cap="none" spc="150" normalizeH="0" baseline="0" noProof="1" dirty="0">
                 <a:solidFill>
@@ -4850,7 +4851,7 @@
                   </a:schemeClr>
                 </a:solidFill>
                 <a:uFillTx/>
-                <a:latin typeface="Arial" panose="020B0604020202090204" pitchFamily="34" charset="0"/>
+                <a:latin typeface="Arial" panose="020B0604020202020204" pitchFamily="34" charset="0"/>
                 <a:ea typeface="微软雅黑" panose="020B0503020204020204" charset="-122"/>
                 <a:cs typeface="+mn-cs"/>
                 <a:sym typeface="+mn-ea"/>
@@ -4866,7 +4867,7 @@
               <a:spcAft>
                 <a:spcPts val="1000"/>
               </a:spcAft>
-              <a:buFont typeface="Arial" panose="020B0604020202090204" pitchFamily="34" charset="0"/>
+              <a:buFont typeface="Arial" panose="020B0604020202020204" pitchFamily="34" charset="0"/>
               <a:buChar char="•"/>
               <a:defRPr kumimoji="0" lang="zh-CN" altLang="en-US" sz="1600" b="0" i="0" u="none" strike="noStrike" kern="1200" cap="none" spc="150" normalizeH="0" baseline="0" noProof="1" dirty="0">
                 <a:solidFill>
@@ -4876,7 +4877,7 @@
                   </a:schemeClr>
                 </a:solidFill>
                 <a:uFillTx/>
-                <a:latin typeface="Arial" panose="020B0604020202090204" pitchFamily="34" charset="0"/>
+                <a:latin typeface="Arial" panose="020B0604020202020204" pitchFamily="34" charset="0"/>
                 <a:ea typeface="微软雅黑" panose="020B0503020204020204" charset="-122"/>
                 <a:cs typeface="+mn-cs"/>
                 <a:sym typeface="+mn-ea"/>
@@ -4892,7 +4893,7 @@
               <a:spcAft>
                 <a:spcPts val="1000"/>
               </a:spcAft>
-              <a:buFont typeface="Arial" panose="020B0604020202090204" pitchFamily="34" charset="0"/>
+              <a:buFont typeface="Arial" panose="020B0604020202020204" pitchFamily="34" charset="0"/>
               <a:buChar char="•"/>
               <a:defRPr kumimoji="0" lang="zh-CN" altLang="en-US" sz="1600" b="0" i="0" u="none" strike="noStrike" kern="1200" cap="none" spc="150" normalizeH="0" baseline="0" noProof="1" dirty="0">
                 <a:solidFill>
@@ -4902,7 +4903,7 @@
                   </a:schemeClr>
                 </a:solidFill>
                 <a:uFillTx/>
-                <a:latin typeface="Arial" panose="020B0604020202090204" pitchFamily="34" charset="0"/>
+                <a:latin typeface="Arial" panose="020B0604020202020204" pitchFamily="34" charset="0"/>
                 <a:ea typeface="微软雅黑" panose="020B0503020204020204" charset="-122"/>
                 <a:cs typeface="+mn-cs"/>
                 <a:sym typeface="+mn-ea"/>
@@ -5005,7 +5006,7 @@
               <a:spcAft>
                 <a:spcPts val="0"/>
               </a:spcAft>
-              <a:buFont typeface="Arial" panose="020B0604020202090204" pitchFamily="34" charset="0"/>
+              <a:buFont typeface="Arial" panose="020B0604020202020204" pitchFamily="34" charset="0"/>
               <a:buNone/>
               <a:defRPr kumimoji="0" lang="zh-CN" altLang="en-US" sz="2000" b="0" i="0" u="none" strike="noStrike" kern="1200" cap="none" spc="200" normalizeH="0" baseline="0" noProof="1" dirty="0">
                 <a:solidFill>
@@ -5015,7 +5016,7 @@
                   </a:schemeClr>
                 </a:solidFill>
                 <a:uFillTx/>
-                <a:latin typeface="Arial" panose="020B0604020202090204" pitchFamily="34" charset="0"/>
+                <a:latin typeface="Arial" panose="020B0604020202020204" pitchFamily="34" charset="0"/>
                 <a:ea typeface="微软雅黑" panose="020B0503020204020204" charset="-122"/>
                 <a:cs typeface="+mn-cs"/>
                 <a:sym typeface="+mn-ea"/>
@@ -5102,7 +5103,7 @@
               <a:spcAft>
                 <a:spcPts val="1000"/>
               </a:spcAft>
-              <a:buFont typeface="Arial" panose="020B0604020202090204" pitchFamily="34" charset="0"/>
+              <a:buFont typeface="Arial" panose="020B0604020202020204" pitchFamily="34" charset="0"/>
               <a:buChar char="•"/>
               <a:defRPr kumimoji="0" lang="zh-CN" altLang="en-US" sz="1600" b="0" i="0" u="none" strike="noStrike" kern="1200" cap="none" spc="150" normalizeH="0" baseline="0" noProof="1" dirty="0">
                 <a:solidFill>
@@ -5112,7 +5113,7 @@
                   </a:schemeClr>
                 </a:solidFill>
                 <a:uFillTx/>
-                <a:latin typeface="Arial" panose="020B0604020202090204" pitchFamily="34" charset="0"/>
+                <a:latin typeface="Arial" panose="020B0604020202020204" pitchFamily="34" charset="0"/>
                 <a:ea typeface="微软雅黑" panose="020B0503020204020204" charset="-122"/>
                 <a:cs typeface="+mn-cs"/>
                 <a:sym typeface="+mn-ea"/>
@@ -5128,7 +5129,7 @@
               <a:spcAft>
                 <a:spcPts val="1000"/>
               </a:spcAft>
-              <a:buFont typeface="Arial" panose="020B0604020202090204" pitchFamily="34" charset="0"/>
+              <a:buFont typeface="Arial" panose="020B0604020202020204" pitchFamily="34" charset="0"/>
               <a:buChar char="•"/>
               <a:tabLst>
                 <a:tab pos="1609725" algn="l"/>
@@ -5141,7 +5142,7 @@
                   </a:schemeClr>
                 </a:solidFill>
                 <a:uFillTx/>
-                <a:latin typeface="Arial" panose="020B0604020202090204" pitchFamily="34" charset="0"/>
+                <a:latin typeface="Arial" panose="020B0604020202020204" pitchFamily="34" charset="0"/>
                 <a:ea typeface="微软雅黑" panose="020B0503020204020204" charset="-122"/>
                 <a:cs typeface="+mn-cs"/>
                 <a:sym typeface="+mn-ea"/>
@@ -5157,7 +5158,7 @@
               <a:spcAft>
                 <a:spcPts val="1000"/>
               </a:spcAft>
-              <a:buFont typeface="Arial" panose="020B0604020202090204" pitchFamily="34" charset="0"/>
+              <a:buFont typeface="Arial" panose="020B0604020202020204" pitchFamily="34" charset="0"/>
               <a:buChar char="•"/>
               <a:defRPr kumimoji="0" lang="zh-CN" altLang="en-US" sz="1600" b="0" i="0" u="none" strike="noStrike" kern="1200" cap="none" spc="150" normalizeH="0" baseline="0" noProof="1" dirty="0">
                 <a:solidFill>
@@ -5167,7 +5168,7 @@
                   </a:schemeClr>
                 </a:solidFill>
                 <a:uFillTx/>
-                <a:latin typeface="Arial" panose="020B0604020202090204" pitchFamily="34" charset="0"/>
+                <a:latin typeface="Arial" panose="020B0604020202020204" pitchFamily="34" charset="0"/>
                 <a:ea typeface="微软雅黑" panose="020B0503020204020204" charset="-122"/>
                 <a:cs typeface="+mn-cs"/>
                 <a:sym typeface="+mn-ea"/>
@@ -5183,7 +5184,7 @@
               <a:spcAft>
                 <a:spcPts val="1000"/>
               </a:spcAft>
-              <a:buFont typeface="Arial" panose="020B0604020202090204" pitchFamily="34" charset="0"/>
+              <a:buFont typeface="Arial" panose="020B0604020202020204" pitchFamily="34" charset="0"/>
               <a:buChar char="•"/>
               <a:defRPr kumimoji="0" lang="zh-CN" altLang="en-US" sz="1600" b="0" i="0" u="none" strike="noStrike" kern="1200" cap="none" spc="150" normalizeH="0" baseline="0" noProof="1" dirty="0">
                 <a:solidFill>
@@ -5193,7 +5194,7 @@
                   </a:schemeClr>
                 </a:solidFill>
                 <a:uFillTx/>
-                <a:latin typeface="Arial" panose="020B0604020202090204" pitchFamily="34" charset="0"/>
+                <a:latin typeface="Arial" panose="020B0604020202020204" pitchFamily="34" charset="0"/>
                 <a:ea typeface="微软雅黑" panose="020B0503020204020204" charset="-122"/>
                 <a:cs typeface="+mn-cs"/>
                 <a:sym typeface="+mn-ea"/>
@@ -5209,7 +5210,7 @@
               <a:spcAft>
                 <a:spcPts val="1000"/>
               </a:spcAft>
-              <a:buFont typeface="Arial" panose="020B0604020202090204" pitchFamily="34" charset="0"/>
+              <a:buFont typeface="Arial" panose="020B0604020202020204" pitchFamily="34" charset="0"/>
               <a:buChar char="•"/>
               <a:defRPr kumimoji="0" lang="zh-CN" altLang="en-US" sz="1600" b="0" i="0" u="none" strike="noStrike" kern="1200" cap="none" spc="150" normalizeH="0" baseline="0" noProof="1" dirty="0">
                 <a:solidFill>
@@ -5219,7 +5220,7 @@
                   </a:schemeClr>
                 </a:solidFill>
                 <a:uFillTx/>
-                <a:latin typeface="Arial" panose="020B0604020202090204" pitchFamily="34" charset="0"/>
+                <a:latin typeface="Arial" panose="020B0604020202020204" pitchFamily="34" charset="0"/>
                 <a:ea typeface="微软雅黑" panose="020B0503020204020204" charset="-122"/>
                 <a:cs typeface="+mn-cs"/>
                 <a:sym typeface="+mn-ea"/>
@@ -6274,7 +6275,7 @@
                   </a:schemeClr>
                 </a:solidFill>
                 <a:uFillTx/>
-                <a:latin typeface="Arial" panose="020B0604020202090204" pitchFamily="34" charset="0"/>
+                <a:latin typeface="Arial" panose="020B0604020202020204" pitchFamily="34" charset="0"/>
                 <a:ea typeface="微软雅黑" panose="020B0503020204020204" charset="-122"/>
                 <a:cs typeface="+mj-cs"/>
                 <a:sym typeface="+mn-ea"/>
@@ -6329,7 +6330,7 @@
               <a:spcAft>
                 <a:spcPts val="1000"/>
               </a:spcAft>
-              <a:buFont typeface="Arial" panose="020B0604020202090204" pitchFamily="34" charset="0"/>
+              <a:buFont typeface="Arial" panose="020B0604020202020204" pitchFamily="34" charset="0"/>
               <a:buNone/>
               <a:defRPr kumimoji="0" lang="zh-CN" altLang="en-US" sz="1600" b="0" i="0" u="none" strike="noStrike" kern="1200" cap="none" spc="150" normalizeH="0" baseline="0" noProof="1" dirty="0">
                 <a:solidFill>
@@ -6339,7 +6340,7 @@
                   </a:schemeClr>
                 </a:solidFill>
                 <a:uFillTx/>
-                <a:latin typeface="Arial" panose="020B0604020202090204" pitchFamily="34" charset="0"/>
+                <a:latin typeface="Arial" panose="020B0604020202020204" pitchFamily="34" charset="0"/>
                 <a:ea typeface="微软雅黑" panose="020B0503020204020204" charset="-122"/>
                 <a:cs typeface="+mn-cs"/>
                 <a:sym typeface="+mn-ea"/>
@@ -6355,7 +6356,7 @@
               <a:spcAft>
                 <a:spcPts val="1000"/>
               </a:spcAft>
-              <a:buFont typeface="Arial" panose="020B0604020202090204" pitchFamily="34" charset="0"/>
+              <a:buFont typeface="Arial" panose="020B0604020202020204" pitchFamily="34" charset="0"/>
               <a:buChar char="•"/>
               <a:tabLst>
                 <a:tab pos="1609725" algn="l"/>
@@ -6381,7 +6382,7 @@
               <a:spcAft>
                 <a:spcPts val="1000"/>
               </a:spcAft>
-              <a:buFont typeface="Arial" panose="020B0604020202090204" pitchFamily="34" charset="0"/>
+              <a:buFont typeface="Arial" panose="020B0604020202020204" pitchFamily="34" charset="0"/>
               <a:buChar char="•"/>
               <a:defRPr kumimoji="0" lang="zh-CN" altLang="en-US" sz="1600" b="0" i="0" u="none" strike="noStrike" kern="1200" cap="none" spc="150" normalizeH="0" baseline="0" noProof="1" dirty="0">
                 <a:solidFill>
@@ -6404,7 +6405,7 @@
               <a:spcAft>
                 <a:spcPts val="1000"/>
               </a:spcAft>
-              <a:buFont typeface="Arial" panose="020B0604020202090204" pitchFamily="34" charset="0"/>
+              <a:buFont typeface="Arial" panose="020B0604020202020204" pitchFamily="34" charset="0"/>
               <a:buChar char="•"/>
               <a:defRPr kumimoji="0" lang="zh-CN" altLang="en-US" sz="1600" b="0" i="0" u="none" strike="noStrike" kern="1200" cap="none" spc="150" normalizeH="0" baseline="0" noProof="1" dirty="0">
                 <a:solidFill>
@@ -6427,7 +6428,7 @@
               <a:spcAft>
                 <a:spcPts val="1000"/>
               </a:spcAft>
-              <a:buFont typeface="Arial" panose="020B0604020202090204" pitchFamily="34" charset="0"/>
+              <a:buFont typeface="Arial" panose="020B0604020202020204" pitchFamily="34" charset="0"/>
               <a:buChar char="•"/>
               <a:defRPr kumimoji="0" lang="zh-CN" altLang="en-US" sz="1600" b="0" i="0" u="none" strike="noStrike" kern="1200" cap="none" spc="150" normalizeH="0" baseline="0" noProof="1" dirty="0">
                 <a:solidFill>
@@ -6483,7 +6484,7 @@
               <a:spcAft>
                 <a:spcPts val="1000"/>
               </a:spcAft>
-              <a:buFont typeface="Arial" panose="020B0604020202090204" pitchFamily="34" charset="0"/>
+              <a:buFont typeface="Arial" panose="020B0604020202020204" pitchFamily="34" charset="0"/>
               <a:buChar char="•"/>
               <a:defRPr kumimoji="0" lang="zh-CN" altLang="en-US" sz="1600" b="0" i="0" u="none" strike="noStrike" kern="1200" cap="none" spc="150" normalizeH="0" baseline="0" noProof="1" dirty="0">
                 <a:solidFill>
@@ -6493,7 +6494,7 @@
                   </a:schemeClr>
                 </a:solidFill>
                 <a:uFillTx/>
-                <a:latin typeface="Arial" panose="020B0604020202090204" pitchFamily="34" charset="0"/>
+                <a:latin typeface="Arial" panose="020B0604020202020204" pitchFamily="34" charset="0"/>
                 <a:ea typeface="微软雅黑" panose="020B0503020204020204" charset="-122"/>
                 <a:cs typeface="+mn-cs"/>
                 <a:sym typeface="+mn-ea"/>
@@ -6940,7 +6941,7 @@
                   </a:schemeClr>
                 </a:solidFill>
                 <a:uFillTx/>
-                <a:latin typeface="Arial" panose="020B0604020202090204" pitchFamily="34" charset="0"/>
+                <a:latin typeface="Arial" panose="020B0604020202020204" pitchFamily="34" charset="0"/>
                 <a:ea typeface="微软雅黑" panose="020B0503020204020204" charset="-122"/>
                 <a:cs typeface="+mj-cs"/>
                 <a:sym typeface="+mn-ea"/>
@@ -6991,7 +6992,7 @@
                     <a:lumOff val="15000"/>
                   </a:schemeClr>
                 </a:solidFill>
-                <a:latin typeface="Arial" panose="020B0604020202090204" pitchFamily="34" charset="0"/>
+                <a:latin typeface="Arial" panose="020B0604020202020204" pitchFamily="34" charset="0"/>
                 <a:ea typeface="微软雅黑" panose="020B0503020204020204" charset="-122"/>
               </a:defRPr>
             </a:lvl1pPr>
@@ -7003,7 +7004,7 @@
                     <a:lumOff val="15000"/>
                   </a:schemeClr>
                 </a:solidFill>
-                <a:latin typeface="Arial" panose="020B0604020202090204" pitchFamily="34" charset="0"/>
+                <a:latin typeface="Arial" panose="020B0604020202020204" pitchFamily="34" charset="0"/>
                 <a:ea typeface="微软雅黑" panose="020B0503020204020204" charset="-122"/>
               </a:defRPr>
             </a:lvl2pPr>
@@ -7015,7 +7016,7 @@
                     <a:lumOff val="15000"/>
                   </a:schemeClr>
                 </a:solidFill>
-                <a:latin typeface="Arial" panose="020B0604020202090204" pitchFamily="34" charset="0"/>
+                <a:latin typeface="Arial" panose="020B0604020202020204" pitchFamily="34" charset="0"/>
                 <a:ea typeface="微软雅黑" panose="020B0503020204020204" charset="-122"/>
               </a:defRPr>
             </a:lvl3pPr>
@@ -7027,7 +7028,7 @@
                     <a:lumOff val="15000"/>
                   </a:schemeClr>
                 </a:solidFill>
-                <a:latin typeface="Arial" panose="020B0604020202090204" pitchFamily="34" charset="0"/>
+                <a:latin typeface="Arial" panose="020B0604020202020204" pitchFamily="34" charset="0"/>
                 <a:ea typeface="微软雅黑" panose="020B0503020204020204" charset="-122"/>
               </a:defRPr>
             </a:lvl4pPr>
@@ -7039,7 +7040,7 @@
                     <a:lumOff val="15000"/>
                   </a:schemeClr>
                 </a:solidFill>
-                <a:latin typeface="Arial" panose="020B0604020202090204" pitchFamily="34" charset="0"/>
+                <a:latin typeface="Arial" panose="020B0604020202020204" pitchFamily="34" charset="0"/>
                 <a:ea typeface="微软雅黑" panose="020B0503020204020204" charset="-122"/>
               </a:defRPr>
             </a:lvl5pPr>
@@ -8301,7 +8302,7 @@
                   </a:schemeClr>
                 </a:solidFill>
                 <a:uFillTx/>
-                <a:latin typeface="Arial" panose="020B0604020202090204" pitchFamily="34" charset="0"/>
+                <a:latin typeface="Arial" panose="020B0604020202020204" pitchFamily="34" charset="0"/>
                 <a:ea typeface="汉仪旗黑-85S" panose="00020600040101010101" pitchFamily="18" charset="-122"/>
                 <a:cs typeface="+mj-cs"/>
                 <a:sym typeface="+mn-ea"/>
@@ -9300,7 +9301,7 @@
                   </a:schemeClr>
                 </a:solidFill>
                 <a:uFillTx/>
-                <a:latin typeface="Arial" panose="020B0604020202090204" pitchFamily="34" charset="0"/>
+                <a:latin typeface="Arial" panose="020B0604020202020204" pitchFamily="34" charset="0"/>
                 <a:ea typeface="汉仪旗黑-85S" panose="00020600040101010101" pitchFamily="18" charset="-122"/>
               </a:defRPr>
             </a:lvl1pPr>
@@ -9347,7 +9348,7 @@
                     <a:lumOff val="15000"/>
                   </a:schemeClr>
                 </a:solidFill>
-                <a:latin typeface="Arial" panose="020B0604020202090204" pitchFamily="34" charset="0"/>
+                <a:latin typeface="Arial" panose="020B0604020202020204" pitchFamily="34" charset="0"/>
                 <a:ea typeface="微软雅黑" panose="020B0503020204020204" charset="-122"/>
               </a:defRPr>
             </a:lvl1pPr>
@@ -9594,7 +9595,7 @@
                   <a:lumOff val="15000"/>
                 </a:schemeClr>
               </a:solidFill>
-              <a:latin typeface="Arial" panose="020B0604020202090204" pitchFamily="34" charset="0"/>
+              <a:latin typeface="Arial" panose="020B0604020202020204" pitchFamily="34" charset="0"/>
               <a:sym typeface="+mn-ea"/>
             </a:endParaRPr>
           </a:p>
@@ -9719,7 +9720,7 @@
                       <a:lumOff val="15000"/>
                     </a:schemeClr>
                   </a:solidFill>
-                  <a:latin typeface="Arial" panose="020B0604020202090204" pitchFamily="34" charset="0"/>
+                  <a:latin typeface="Arial" panose="020B0604020202020204" pitchFamily="34" charset="0"/>
                 </a:rPr>
                 <a:t> </a:t>
               </a:r>
@@ -9730,7 +9731,7 @@
                     <a:lumOff val="15000"/>
                   </a:schemeClr>
                 </a:solidFill>
-                <a:latin typeface="Arial" panose="020B0604020202090204" pitchFamily="34" charset="0"/>
+                <a:latin typeface="Arial" panose="020B0604020202020204" pitchFamily="34" charset="0"/>
               </a:endParaRPr>
             </a:p>
           </p:txBody>
@@ -9792,7 +9793,7 @@
                     <a:lumOff val="15000"/>
                   </a:schemeClr>
                 </a:solidFill>
-                <a:latin typeface="Arial" panose="020B0604020202090204" pitchFamily="34" charset="0"/>
+                <a:latin typeface="Arial" panose="020B0604020202020204" pitchFamily="34" charset="0"/>
               </a:endParaRPr>
             </a:p>
           </p:txBody>
@@ -9852,7 +9853,7 @@
                     <a:lumOff val="15000"/>
                   </a:schemeClr>
                 </a:solidFill>
-                <a:latin typeface="Arial" panose="020B0604020202090204" pitchFamily="34" charset="0"/>
+                <a:latin typeface="Arial" panose="020B0604020202020204" pitchFamily="34" charset="0"/>
               </a:endParaRPr>
             </a:p>
           </p:txBody>
@@ -9891,7 +9892,7 @@
                   </a:schemeClr>
                 </a:solidFill>
                 <a:uFillTx/>
-                <a:latin typeface="Arial" panose="020B0604020202090204" pitchFamily="34" charset="0"/>
+                <a:latin typeface="Arial" panose="020B0604020202020204" pitchFamily="34" charset="0"/>
                 <a:ea typeface="汉仪旗黑-85S" panose="00020600040101010101" pitchFamily="18" charset="-122"/>
               </a:defRPr>
             </a:lvl1pPr>
@@ -9930,7 +9931,7 @@
                     <a:lumOff val="15000"/>
                   </a:schemeClr>
                 </a:solidFill>
-                <a:latin typeface="Arial" panose="020B0604020202090204" pitchFamily="34" charset="0"/>
+                <a:latin typeface="Arial" panose="020B0604020202020204" pitchFamily="34" charset="0"/>
               </a:defRPr>
             </a:lvl1pPr>
           </a:lstStyle>
@@ -9967,7 +9968,7 @@
                     <a:lumOff val="15000"/>
                   </a:schemeClr>
                 </a:solidFill>
-                <a:latin typeface="Arial" panose="020B0604020202090204" pitchFamily="34" charset="0"/>
+                <a:latin typeface="Arial" panose="020B0604020202020204" pitchFamily="34" charset="0"/>
               </a:defRPr>
             </a:lvl1pPr>
           </a:lstStyle>
@@ -10001,7 +10002,7 @@
                     <a:lumOff val="15000"/>
                   </a:schemeClr>
                 </a:solidFill>
-                <a:latin typeface="Arial" panose="020B0604020202090204" pitchFamily="34" charset="0"/>
+                <a:latin typeface="Arial" panose="020B0604020202020204" pitchFamily="34" charset="0"/>
               </a:defRPr>
             </a:lvl1pPr>
           </a:lstStyle>
@@ -10052,7 +10053,7 @@
                     <a:lumOff val="15000"/>
                   </a:schemeClr>
                 </a:solidFill>
-                <a:latin typeface="Arial" panose="020B0604020202090204" pitchFamily="34" charset="0"/>
+                <a:latin typeface="Arial" panose="020B0604020202020204" pitchFamily="34" charset="0"/>
                 <a:ea typeface="微软雅黑" panose="020B0503020204020204" charset="-122"/>
               </a:defRPr>
             </a:lvl1pPr>
@@ -10071,7 +10072,7 @@
                     <a:lumOff val="15000"/>
                   </a:schemeClr>
                 </a:solidFill>
-                <a:latin typeface="Arial" panose="020B0604020202090204" pitchFamily="34" charset="0"/>
+                <a:latin typeface="Arial" panose="020B0604020202020204" pitchFamily="34" charset="0"/>
                 <a:ea typeface="微软雅黑" panose="020B0503020204020204" charset="-122"/>
               </a:defRPr>
             </a:lvl2pPr>
@@ -10090,7 +10091,7 @@
                     <a:lumOff val="15000"/>
                   </a:schemeClr>
                 </a:solidFill>
-                <a:latin typeface="Arial" panose="020B0604020202090204" pitchFamily="34" charset="0"/>
+                <a:latin typeface="Arial" panose="020B0604020202020204" pitchFamily="34" charset="0"/>
                 <a:ea typeface="微软雅黑" panose="020B0503020204020204" charset="-122"/>
               </a:defRPr>
             </a:lvl3pPr>
@@ -10109,7 +10110,7 @@
                     <a:lumOff val="15000"/>
                   </a:schemeClr>
                 </a:solidFill>
-                <a:latin typeface="Arial" panose="020B0604020202090204" pitchFamily="34" charset="0"/>
+                <a:latin typeface="Arial" panose="020B0604020202020204" pitchFamily="34" charset="0"/>
                 <a:ea typeface="微软雅黑" panose="020B0503020204020204" charset="-122"/>
               </a:defRPr>
             </a:lvl4pPr>
@@ -10128,7 +10129,7 @@
                     <a:lumOff val="15000"/>
                   </a:schemeClr>
                 </a:solidFill>
-                <a:latin typeface="Arial" panose="020B0604020202090204" pitchFamily="34" charset="0"/>
+                <a:latin typeface="Arial" panose="020B0604020202020204" pitchFamily="34" charset="0"/>
                 <a:ea typeface="微软雅黑" panose="020B0503020204020204" charset="-122"/>
               </a:defRPr>
             </a:lvl5pPr>
@@ -10237,7 +10238,7 @@
                     <a:lumOff val="15000"/>
                   </a:schemeClr>
                 </a:solidFill>
-                <a:latin typeface="Arial" panose="020B0604020202090204" pitchFamily="34" charset="0"/>
+                <a:latin typeface="Arial" panose="020B0604020202020204" pitchFamily="34" charset="0"/>
                 <a:ea typeface="微软雅黑" panose="020B0503020204020204" charset="-122"/>
               </a:defRPr>
             </a:lvl1pPr>
@@ -10255,7 +10256,7 @@
                     <a:lumOff val="15000"/>
                   </a:schemeClr>
                 </a:solidFill>
-                <a:latin typeface="Arial" panose="020B0604020202090204" pitchFamily="34" charset="0"/>
+                <a:latin typeface="Arial" panose="020B0604020202020204" pitchFamily="34" charset="0"/>
                 <a:ea typeface="微软雅黑" panose="020B0503020204020204" charset="-122"/>
               </a:defRPr>
             </a:lvl2pPr>
@@ -10273,7 +10274,7 @@
                     <a:lumOff val="15000"/>
                   </a:schemeClr>
                 </a:solidFill>
-                <a:latin typeface="Arial" panose="020B0604020202090204" pitchFamily="34" charset="0"/>
+                <a:latin typeface="Arial" panose="020B0604020202020204" pitchFamily="34" charset="0"/>
                 <a:ea typeface="微软雅黑" panose="020B0503020204020204" charset="-122"/>
               </a:defRPr>
             </a:lvl3pPr>
@@ -10291,7 +10292,7 @@
                     <a:lumOff val="15000"/>
                   </a:schemeClr>
                 </a:solidFill>
-                <a:latin typeface="Arial" panose="020B0604020202090204" pitchFamily="34" charset="0"/>
+                <a:latin typeface="Arial" panose="020B0604020202020204" pitchFamily="34" charset="0"/>
                 <a:ea typeface="微软雅黑" panose="020B0503020204020204" charset="-122"/>
               </a:defRPr>
             </a:lvl4pPr>
@@ -10309,7 +10310,7 @@
                     <a:lumOff val="15000"/>
                   </a:schemeClr>
                 </a:solidFill>
-                <a:latin typeface="Arial" panose="020B0604020202090204" pitchFamily="34" charset="0"/>
+                <a:latin typeface="Arial" panose="020B0604020202020204" pitchFamily="34" charset="0"/>
                 <a:ea typeface="微软雅黑" panose="020B0503020204020204" charset="-122"/>
               </a:defRPr>
             </a:lvl5pPr>
@@ -10471,7 +10472,7 @@
                   <a:lumOff val="15000"/>
                 </a:schemeClr>
               </a:solidFill>
-              <a:latin typeface="Arial" panose="020B0604020202090204" pitchFamily="34" charset="0"/>
+              <a:latin typeface="Arial" panose="020B0604020202020204" pitchFamily="34" charset="0"/>
               <a:sym typeface="+mn-ea"/>
             </a:endParaRPr>
           </a:p>
@@ -10594,7 +10595,7 @@
                       <a:lumOff val="15000"/>
                     </a:schemeClr>
                   </a:solidFill>
-                  <a:latin typeface="Arial" panose="020B0604020202090204" pitchFamily="34" charset="0"/>
+                  <a:latin typeface="Arial" panose="020B0604020202020204" pitchFamily="34" charset="0"/>
                 </a:rPr>
                 <a:t> </a:t>
               </a:r>
@@ -10605,7 +10606,7 @@
                     <a:lumOff val="15000"/>
                   </a:schemeClr>
                 </a:solidFill>
-                <a:latin typeface="Arial" panose="020B0604020202090204" pitchFamily="34" charset="0"/>
+                <a:latin typeface="Arial" panose="020B0604020202020204" pitchFamily="34" charset="0"/>
               </a:endParaRPr>
             </a:p>
           </p:txBody>
@@ -10665,7 +10666,7 @@
                     <a:lumOff val="15000"/>
                   </a:schemeClr>
                 </a:solidFill>
-                <a:latin typeface="Arial" panose="020B0604020202090204" pitchFamily="34" charset="0"/>
+                <a:latin typeface="Arial" panose="020B0604020202020204" pitchFamily="34" charset="0"/>
               </a:endParaRPr>
             </a:p>
           </p:txBody>
@@ -10723,7 +10724,7 @@
                     <a:lumOff val="15000"/>
                   </a:schemeClr>
                 </a:solidFill>
-                <a:latin typeface="Arial" panose="020B0604020202090204" pitchFamily="34" charset="0"/>
+                <a:latin typeface="Arial" panose="020B0604020202020204" pitchFamily="34" charset="0"/>
               </a:endParaRPr>
             </a:p>
           </p:txBody>
@@ -10759,7 +10760,7 @@
                     <a:lumOff val="15000"/>
                   </a:schemeClr>
                 </a:solidFill>
-                <a:latin typeface="Arial" panose="020B0604020202090204" pitchFamily="34" charset="0"/>
+                <a:latin typeface="Arial" panose="020B0604020202020204" pitchFamily="34" charset="0"/>
                 <a:ea typeface="微软雅黑" panose="020B0503020204020204" charset="-122"/>
               </a:defRPr>
             </a:lvl1pPr>
@@ -10798,7 +10799,7 @@
                     <a:lumOff val="15000"/>
                   </a:schemeClr>
                 </a:solidFill>
-                <a:latin typeface="Arial" panose="020B0604020202090204" pitchFamily="34" charset="0"/>
+                <a:latin typeface="Arial" panose="020B0604020202020204" pitchFamily="34" charset="0"/>
               </a:defRPr>
             </a:lvl1pPr>
           </a:lstStyle>
@@ -10835,7 +10836,7 @@
                     <a:lumOff val="15000"/>
                   </a:schemeClr>
                 </a:solidFill>
-                <a:latin typeface="Arial" panose="020B0604020202090204" pitchFamily="34" charset="0"/>
+                <a:latin typeface="Arial" panose="020B0604020202020204" pitchFamily="34" charset="0"/>
               </a:defRPr>
             </a:lvl1pPr>
           </a:lstStyle>
@@ -10869,7 +10870,7 @@
                     <a:lumOff val="15000"/>
                   </a:schemeClr>
                 </a:solidFill>
-                <a:latin typeface="Arial" panose="020B0604020202090204" pitchFamily="34" charset="0"/>
+                <a:latin typeface="Arial" panose="020B0604020202020204" pitchFamily="34" charset="0"/>
               </a:defRPr>
             </a:lvl1pPr>
           </a:lstStyle>
@@ -10922,7 +10923,7 @@
                     <a:lumOff val="15000"/>
                   </a:schemeClr>
                 </a:solidFill>
-                <a:latin typeface="Arial" panose="020B0604020202090204" pitchFamily="34" charset="0"/>
+                <a:latin typeface="Arial" panose="020B0604020202020204" pitchFamily="34" charset="0"/>
                 <a:ea typeface="微软雅黑" panose="020B0503020204020204" charset="-122"/>
               </a:defRPr>
             </a:lvl1pPr>
@@ -10975,7 +10976,7 @@
                     <a:lumOff val="15000"/>
                   </a:schemeClr>
                 </a:solidFill>
-                <a:latin typeface="Arial" panose="020B0604020202090204" pitchFamily="34" charset="0"/>
+                <a:latin typeface="Arial" panose="020B0604020202020204" pitchFamily="34" charset="0"/>
                 <a:ea typeface="微软雅黑" panose="020B0503020204020204" charset="-122"/>
               </a:defRPr>
             </a:lvl1pPr>
@@ -10993,7 +10994,7 @@
                     <a:lumOff val="15000"/>
                   </a:schemeClr>
                 </a:solidFill>
-                <a:latin typeface="Arial" panose="020B0604020202090204" pitchFamily="34" charset="0"/>
+                <a:latin typeface="Arial" panose="020B0604020202020204" pitchFamily="34" charset="0"/>
                 <a:ea typeface="微软雅黑" panose="020B0503020204020204" charset="-122"/>
               </a:defRPr>
             </a:lvl2pPr>
@@ -11011,7 +11012,7 @@
                     <a:lumOff val="15000"/>
                   </a:schemeClr>
                 </a:solidFill>
-                <a:latin typeface="Arial" panose="020B0604020202090204" pitchFamily="34" charset="0"/>
+                <a:latin typeface="Arial" panose="020B0604020202020204" pitchFamily="34" charset="0"/>
                 <a:ea typeface="微软雅黑" panose="020B0503020204020204" charset="-122"/>
               </a:defRPr>
             </a:lvl3pPr>
@@ -11029,7 +11030,7 @@
                     <a:lumOff val="15000"/>
                   </a:schemeClr>
                 </a:solidFill>
-                <a:latin typeface="Arial" panose="020B0604020202090204" pitchFamily="34" charset="0"/>
+                <a:latin typeface="Arial" panose="020B0604020202020204" pitchFamily="34" charset="0"/>
                 <a:ea typeface="微软雅黑" panose="020B0503020204020204" charset="-122"/>
               </a:defRPr>
             </a:lvl4pPr>
@@ -11047,7 +11048,7 @@
                     <a:lumOff val="15000"/>
                   </a:schemeClr>
                 </a:solidFill>
-                <a:latin typeface="Arial" panose="020B0604020202090204" pitchFamily="34" charset="0"/>
+                <a:latin typeface="Arial" panose="020B0604020202020204" pitchFamily="34" charset="0"/>
                 <a:ea typeface="微软雅黑" panose="020B0503020204020204" charset="-122"/>
               </a:defRPr>
             </a:lvl5pPr>
@@ -11268,7 +11269,7 @@
                       <a:lumOff val="15000"/>
                     </a:schemeClr>
                   </a:solidFill>
-                  <a:latin typeface="Arial" panose="020B0604020202090204" pitchFamily="34" charset="0"/>
+                  <a:latin typeface="Arial" panose="020B0604020202020204" pitchFamily="34" charset="0"/>
                 </a:rPr>
                 <a:t> </a:t>
               </a:r>
@@ -11279,7 +11280,7 @@
                     <a:lumOff val="15000"/>
                   </a:schemeClr>
                 </a:solidFill>
-                <a:latin typeface="Arial" panose="020B0604020202090204" pitchFamily="34" charset="0"/>
+                <a:latin typeface="Arial" panose="020B0604020202020204" pitchFamily="34" charset="0"/>
               </a:endParaRPr>
             </a:p>
           </p:txBody>
@@ -11339,7 +11340,7 @@
                     <a:lumOff val="15000"/>
                   </a:schemeClr>
                 </a:solidFill>
-                <a:latin typeface="Arial" panose="020B0604020202090204" pitchFamily="34" charset="0"/>
+                <a:latin typeface="Arial" panose="020B0604020202020204" pitchFamily="34" charset="0"/>
               </a:endParaRPr>
             </a:p>
           </p:txBody>
@@ -11397,7 +11398,7 @@
                     <a:lumOff val="15000"/>
                   </a:schemeClr>
                 </a:solidFill>
-                <a:latin typeface="Arial" panose="020B0604020202090204" pitchFamily="34" charset="0"/>
+                <a:latin typeface="Arial" panose="020B0604020202020204" pitchFamily="34" charset="0"/>
               </a:endParaRPr>
             </a:p>
           </p:txBody>
@@ -11461,7 +11462,7 @@
                   <a:lumOff val="15000"/>
                 </a:schemeClr>
               </a:solidFill>
-              <a:latin typeface="Arial" panose="020B0604020202090204" pitchFamily="34" charset="0"/>
+              <a:latin typeface="Arial" panose="020B0604020202020204" pitchFamily="34" charset="0"/>
               <a:sym typeface="+mn-ea"/>
             </a:endParaRPr>
           </a:p>
@@ -11502,7 +11503,7 @@
                     <a:lumOff val="15000"/>
                   </a:schemeClr>
                 </a:solidFill>
-                <a:latin typeface="Arial" panose="020B0604020202090204" pitchFamily="34" charset="0"/>
+                <a:latin typeface="Arial" panose="020B0604020202020204" pitchFamily="34" charset="0"/>
                 <a:ea typeface="微软雅黑" panose="020B0503020204020204" charset="-122"/>
               </a:defRPr>
             </a:lvl1pPr>
@@ -11541,7 +11542,7 @@
                     <a:lumOff val="15000"/>
                   </a:schemeClr>
                 </a:solidFill>
-                <a:latin typeface="Arial" panose="020B0604020202090204" pitchFamily="34" charset="0"/>
+                <a:latin typeface="Arial" panose="020B0604020202020204" pitchFamily="34" charset="0"/>
               </a:defRPr>
             </a:lvl1pPr>
           </a:lstStyle>
@@ -11578,7 +11579,7 @@
                     <a:lumOff val="15000"/>
                   </a:schemeClr>
                 </a:solidFill>
-                <a:latin typeface="Arial" panose="020B0604020202090204" pitchFamily="34" charset="0"/>
+                <a:latin typeface="Arial" panose="020B0604020202020204" pitchFamily="34" charset="0"/>
               </a:defRPr>
             </a:lvl1pPr>
           </a:lstStyle>
@@ -11612,7 +11613,7 @@
                     <a:lumOff val="15000"/>
                   </a:schemeClr>
                 </a:solidFill>
-                <a:latin typeface="Arial" panose="020B0604020202090204" pitchFamily="34" charset="0"/>
+                <a:latin typeface="Arial" panose="020B0604020202020204" pitchFamily="34" charset="0"/>
               </a:defRPr>
             </a:lvl1pPr>
           </a:lstStyle>
@@ -11662,7 +11663,7 @@
                     <a:lumOff val="15000"/>
                   </a:schemeClr>
                 </a:solidFill>
-                <a:latin typeface="Arial" panose="020B0604020202090204" pitchFamily="34" charset="0"/>
+                <a:latin typeface="Arial" panose="020B0604020202020204" pitchFamily="34" charset="0"/>
                 <a:ea typeface="微软雅黑" panose="020B0503020204020204" charset="-122"/>
               </a:defRPr>
             </a:lvl1pPr>
@@ -11680,7 +11681,7 @@
                     <a:lumOff val="15000"/>
                   </a:schemeClr>
                 </a:solidFill>
-                <a:latin typeface="Arial" panose="020B0604020202090204" pitchFamily="34" charset="0"/>
+                <a:latin typeface="Arial" panose="020B0604020202020204" pitchFamily="34" charset="0"/>
                 <a:ea typeface="微软雅黑" panose="020B0503020204020204" charset="-122"/>
               </a:defRPr>
             </a:lvl2pPr>
@@ -11698,7 +11699,7 @@
                     <a:lumOff val="15000"/>
                   </a:schemeClr>
                 </a:solidFill>
-                <a:latin typeface="Arial" panose="020B0604020202090204" pitchFamily="34" charset="0"/>
+                <a:latin typeface="Arial" panose="020B0604020202020204" pitchFamily="34" charset="0"/>
                 <a:ea typeface="微软雅黑" panose="020B0503020204020204" charset="-122"/>
               </a:defRPr>
             </a:lvl3pPr>
@@ -11716,7 +11717,7 @@
                     <a:lumOff val="15000"/>
                   </a:schemeClr>
                 </a:solidFill>
-                <a:latin typeface="Arial" panose="020B0604020202090204" pitchFamily="34" charset="0"/>
+                <a:latin typeface="Arial" panose="020B0604020202020204" pitchFamily="34" charset="0"/>
                 <a:ea typeface="微软雅黑" panose="020B0503020204020204" charset="-122"/>
               </a:defRPr>
             </a:lvl4pPr>
@@ -11734,7 +11735,7 @@
                     <a:lumOff val="15000"/>
                   </a:schemeClr>
                 </a:solidFill>
-                <a:latin typeface="Arial" panose="020B0604020202090204" pitchFamily="34" charset="0"/>
+                <a:latin typeface="Arial" panose="020B0604020202020204" pitchFamily="34" charset="0"/>
                 <a:ea typeface="微软雅黑" panose="020B0503020204020204" charset="-122"/>
               </a:defRPr>
             </a:lvl5pPr>
@@ -11847,7 +11848,7 @@
                     <a:lumOff val="15000"/>
                   </a:schemeClr>
                 </a:solidFill>
-                <a:latin typeface="Arial" panose="020B0604020202090204" pitchFamily="34" charset="0"/>
+                <a:latin typeface="Arial" panose="020B0604020202020204" pitchFamily="34" charset="0"/>
                 <a:ea typeface="微软雅黑" panose="020B0503020204020204" charset="-122"/>
               </a:defRPr>
             </a:lvl1pPr>
@@ -12012,7 +12013,7 @@
                       <a:lumOff val="15000"/>
                     </a:schemeClr>
                   </a:solidFill>
-                  <a:latin typeface="Arial" panose="020B0604020202090204" pitchFamily="34" charset="0"/>
+                  <a:latin typeface="Arial" panose="020B0604020202020204" pitchFamily="34" charset="0"/>
                 </a:rPr>
                 <a:t> </a:t>
               </a:r>
@@ -12023,7 +12024,7 @@
                     <a:lumOff val="15000"/>
                   </a:schemeClr>
                 </a:solidFill>
-                <a:latin typeface="Arial" panose="020B0604020202090204" pitchFamily="34" charset="0"/>
+                <a:latin typeface="Arial" panose="020B0604020202020204" pitchFamily="34" charset="0"/>
               </a:endParaRPr>
             </a:p>
           </p:txBody>
@@ -12083,7 +12084,7 @@
                     <a:lumOff val="15000"/>
                   </a:schemeClr>
                 </a:solidFill>
-                <a:latin typeface="Arial" panose="020B0604020202090204" pitchFamily="34" charset="0"/>
+                <a:latin typeface="Arial" panose="020B0604020202020204" pitchFamily="34" charset="0"/>
               </a:endParaRPr>
             </a:p>
           </p:txBody>
@@ -12141,7 +12142,7 @@
                     <a:lumOff val="15000"/>
                   </a:schemeClr>
                 </a:solidFill>
-                <a:latin typeface="Arial" panose="020B0604020202090204" pitchFamily="34" charset="0"/>
+                <a:latin typeface="Arial" panose="020B0604020202020204" pitchFamily="34" charset="0"/>
               </a:endParaRPr>
             </a:p>
           </p:txBody>
@@ -12207,7 +12208,7 @@
                   <a:lumOff val="15000"/>
                 </a:schemeClr>
               </a:solidFill>
-              <a:latin typeface="Arial" panose="020B0604020202090204" pitchFamily="34" charset="0"/>
+              <a:latin typeface="Arial" panose="020B0604020202020204" pitchFamily="34" charset="0"/>
               <a:cs typeface="Viner Hand ITC" panose="03070502030502020203" charset="0"/>
               <a:sym typeface="+mn-ea"/>
             </a:endParaRPr>
@@ -12249,7 +12250,7 @@
                     <a:lumOff val="15000"/>
                   </a:schemeClr>
                 </a:solidFill>
-                <a:latin typeface="Arial" panose="020B0604020202090204" pitchFamily="34" charset="0"/>
+                <a:latin typeface="Arial" panose="020B0604020202020204" pitchFamily="34" charset="0"/>
                 <a:ea typeface="微软雅黑" panose="020B0503020204020204" charset="-122"/>
               </a:defRPr>
             </a:lvl1pPr>
@@ -12299,7 +12300,7 @@
                     <a:lumOff val="15000"/>
                   </a:schemeClr>
                 </a:solidFill>
-                <a:latin typeface="Arial" panose="020B0604020202090204" pitchFamily="34" charset="0"/>
+                <a:latin typeface="Arial" panose="020B0604020202020204" pitchFamily="34" charset="0"/>
                 <a:ea typeface="微软雅黑" panose="020B0503020204020204" charset="-122"/>
               </a:defRPr>
             </a:lvl1pPr>
@@ -12317,7 +12318,7 @@
                     <a:lumOff val="15000"/>
                   </a:schemeClr>
                 </a:solidFill>
-                <a:latin typeface="Arial" panose="020B0604020202090204" pitchFamily="34" charset="0"/>
+                <a:latin typeface="Arial" panose="020B0604020202020204" pitchFamily="34" charset="0"/>
                 <a:ea typeface="微软雅黑" panose="020B0503020204020204" charset="-122"/>
               </a:defRPr>
             </a:lvl2pPr>
@@ -12335,7 +12336,7 @@
                     <a:lumOff val="15000"/>
                   </a:schemeClr>
                 </a:solidFill>
-                <a:latin typeface="Arial" panose="020B0604020202090204" pitchFamily="34" charset="0"/>
+                <a:latin typeface="Arial" panose="020B0604020202020204" pitchFamily="34" charset="0"/>
                 <a:ea typeface="微软雅黑" panose="020B0503020204020204" charset="-122"/>
               </a:defRPr>
             </a:lvl3pPr>
@@ -12353,7 +12354,7 @@
                     <a:lumOff val="15000"/>
                   </a:schemeClr>
                 </a:solidFill>
-                <a:latin typeface="Arial" panose="020B0604020202090204" pitchFamily="34" charset="0"/>
+                <a:latin typeface="Arial" panose="020B0604020202020204" pitchFamily="34" charset="0"/>
                 <a:ea typeface="微软雅黑" panose="020B0503020204020204" charset="-122"/>
               </a:defRPr>
             </a:lvl4pPr>
@@ -12371,7 +12372,7 @@
                     <a:lumOff val="15000"/>
                   </a:schemeClr>
                 </a:solidFill>
-                <a:latin typeface="Arial" panose="020B0604020202090204" pitchFamily="34" charset="0"/>
+                <a:latin typeface="Arial" panose="020B0604020202020204" pitchFamily="34" charset="0"/>
                 <a:ea typeface="微软雅黑" panose="020B0503020204020204" charset="-122"/>
               </a:defRPr>
             </a:lvl5pPr>
@@ -12467,7 +12468,7 @@
                     <a:lumOff val="15000"/>
                   </a:schemeClr>
                 </a:solidFill>
-                <a:latin typeface="Arial" panose="020B0604020202090204" pitchFamily="34" charset="0"/>
+                <a:latin typeface="Arial" panose="020B0604020202020204" pitchFamily="34" charset="0"/>
               </a:defRPr>
             </a:lvl1pPr>
           </a:lstStyle>
@@ -12504,7 +12505,7 @@
                     <a:lumOff val="15000"/>
                   </a:schemeClr>
                 </a:solidFill>
-                <a:latin typeface="Arial" panose="020B0604020202090204" pitchFamily="34" charset="0"/>
+                <a:latin typeface="Arial" panose="020B0604020202020204" pitchFamily="34" charset="0"/>
               </a:defRPr>
             </a:lvl1pPr>
           </a:lstStyle>
@@ -12538,7 +12539,7 @@
                     <a:lumOff val="15000"/>
                   </a:schemeClr>
                 </a:solidFill>
-                <a:latin typeface="Arial" panose="020B0604020202090204" pitchFamily="34" charset="0"/>
+                <a:latin typeface="Arial" panose="020B0604020202020204" pitchFamily="34" charset="0"/>
               </a:defRPr>
             </a:lvl1pPr>
           </a:lstStyle>
@@ -12588,7 +12589,7 @@
                     <a:lumOff val="15000"/>
                   </a:schemeClr>
                 </a:solidFill>
-                <a:latin typeface="Arial" panose="020B0604020202090204" pitchFamily="34" charset="0"/>
+                <a:latin typeface="Arial" panose="020B0604020202020204" pitchFamily="34" charset="0"/>
                 <a:ea typeface="微软雅黑" panose="020B0503020204020204" charset="-122"/>
               </a:defRPr>
             </a:lvl1pPr>
@@ -12606,7 +12607,7 @@
                     <a:lumOff val="15000"/>
                   </a:schemeClr>
                 </a:solidFill>
-                <a:latin typeface="Arial" panose="020B0604020202090204" pitchFamily="34" charset="0"/>
+                <a:latin typeface="Arial" panose="020B0604020202020204" pitchFamily="34" charset="0"/>
                 <a:ea typeface="微软雅黑" panose="020B0503020204020204" charset="-122"/>
               </a:defRPr>
             </a:lvl2pPr>
@@ -12624,7 +12625,7 @@
                     <a:lumOff val="15000"/>
                   </a:schemeClr>
                 </a:solidFill>
-                <a:latin typeface="Arial" panose="020B0604020202090204" pitchFamily="34" charset="0"/>
+                <a:latin typeface="Arial" panose="020B0604020202020204" pitchFamily="34" charset="0"/>
                 <a:ea typeface="微软雅黑" panose="020B0503020204020204" charset="-122"/>
               </a:defRPr>
             </a:lvl3pPr>
@@ -12642,7 +12643,7 @@
                     <a:lumOff val="15000"/>
                   </a:schemeClr>
                 </a:solidFill>
-                <a:latin typeface="Arial" panose="020B0604020202090204" pitchFamily="34" charset="0"/>
+                <a:latin typeface="Arial" panose="020B0604020202020204" pitchFamily="34" charset="0"/>
                 <a:ea typeface="微软雅黑" panose="020B0503020204020204" charset="-122"/>
               </a:defRPr>
             </a:lvl4pPr>
@@ -12660,7 +12661,7 @@
                     <a:lumOff val="15000"/>
                   </a:schemeClr>
                 </a:solidFill>
-                <a:latin typeface="Arial" panose="020B0604020202090204" pitchFamily="34" charset="0"/>
+                <a:latin typeface="Arial" panose="020B0604020202020204" pitchFamily="34" charset="0"/>
                 <a:ea typeface="微软雅黑" panose="020B0503020204020204" charset="-122"/>
               </a:defRPr>
             </a:lvl5pPr>
@@ -12773,7 +12774,7 @@
                     <a:lumOff val="15000"/>
                   </a:schemeClr>
                 </a:solidFill>
-                <a:latin typeface="Arial" panose="020B0604020202090204" pitchFamily="34" charset="0"/>
+                <a:latin typeface="Arial" panose="020B0604020202020204" pitchFamily="34" charset="0"/>
                 <a:ea typeface="微软雅黑" panose="020B0503020204020204" charset="-122"/>
               </a:defRPr>
             </a:lvl1pPr>
@@ -12830,7 +12831,7 @@
                     <a:lumOff val="15000"/>
                   </a:schemeClr>
                 </a:solidFill>
-                <a:latin typeface="Arial" panose="020B0604020202090204" pitchFamily="34" charset="0"/>
+                <a:latin typeface="Arial" panose="020B0604020202020204" pitchFamily="34" charset="0"/>
                 <a:ea typeface="微软雅黑" panose="020B0503020204020204" charset="-122"/>
               </a:defRPr>
             </a:lvl1pPr>
@@ -12936,7 +12937,7 @@
                   <a:lumOff val="15000"/>
                 </a:schemeClr>
               </a:solidFill>
-              <a:latin typeface="Arial" panose="020B0604020202090204" pitchFamily="34" charset="0"/>
+              <a:latin typeface="Arial" panose="020B0604020202020204" pitchFamily="34" charset="0"/>
               <a:sym typeface="+mn-ea"/>
             </a:endParaRPr>
           </a:p>
@@ -13059,7 +13060,7 @@
                       <a:lumOff val="15000"/>
                     </a:schemeClr>
                   </a:solidFill>
-                  <a:latin typeface="Arial" panose="020B0604020202090204" pitchFamily="34" charset="0"/>
+                  <a:latin typeface="Arial" panose="020B0604020202020204" pitchFamily="34" charset="0"/>
                 </a:rPr>
                 <a:t> </a:t>
               </a:r>
@@ -13070,7 +13071,7 @@
                     <a:lumOff val="15000"/>
                   </a:schemeClr>
                 </a:solidFill>
-                <a:latin typeface="Arial" panose="020B0604020202090204" pitchFamily="34" charset="0"/>
+                <a:latin typeface="Arial" panose="020B0604020202020204" pitchFamily="34" charset="0"/>
               </a:endParaRPr>
             </a:p>
           </p:txBody>
@@ -13130,7 +13131,7 @@
                     <a:lumOff val="15000"/>
                   </a:schemeClr>
                 </a:solidFill>
-                <a:latin typeface="Arial" panose="020B0604020202090204" pitchFamily="34" charset="0"/>
+                <a:latin typeface="Arial" panose="020B0604020202020204" pitchFamily="34" charset="0"/>
               </a:endParaRPr>
             </a:p>
           </p:txBody>
@@ -13188,7 +13189,7 @@
                     <a:lumOff val="15000"/>
                   </a:schemeClr>
                 </a:solidFill>
-                <a:latin typeface="Arial" panose="020B0604020202090204" pitchFamily="34" charset="0"/>
+                <a:latin typeface="Arial" panose="020B0604020202020204" pitchFamily="34" charset="0"/>
               </a:endParaRPr>
             </a:p>
           </p:txBody>
@@ -13311,7 +13312,7 @@
                       <a:lumOff val="15000"/>
                     </a:schemeClr>
                   </a:solidFill>
-                  <a:latin typeface="Arial" panose="020B0604020202090204" pitchFamily="34" charset="0"/>
+                  <a:latin typeface="Arial" panose="020B0604020202020204" pitchFamily="34" charset="0"/>
                 </a:rPr>
                 <a:t> </a:t>
               </a:r>
@@ -13322,7 +13323,7 @@
                     <a:lumOff val="15000"/>
                   </a:schemeClr>
                 </a:solidFill>
-                <a:latin typeface="Arial" panose="020B0604020202090204" pitchFamily="34" charset="0"/>
+                <a:latin typeface="Arial" panose="020B0604020202020204" pitchFamily="34" charset="0"/>
               </a:endParaRPr>
             </a:p>
           </p:txBody>
@@ -13382,7 +13383,7 @@
                     <a:lumOff val="15000"/>
                   </a:schemeClr>
                 </a:solidFill>
-                <a:latin typeface="Arial" panose="020B0604020202090204" pitchFamily="34" charset="0"/>
+                <a:latin typeface="Arial" panose="020B0604020202020204" pitchFamily="34" charset="0"/>
               </a:endParaRPr>
             </a:p>
           </p:txBody>
@@ -13440,7 +13441,7 @@
                     <a:lumOff val="15000"/>
                   </a:schemeClr>
                 </a:solidFill>
-                <a:latin typeface="Arial" panose="020B0604020202090204" pitchFamily="34" charset="0"/>
+                <a:latin typeface="Arial" panose="020B0604020202020204" pitchFamily="34" charset="0"/>
               </a:endParaRPr>
             </a:p>
           </p:txBody>
@@ -13478,7 +13479,7 @@
                     <a:lumOff val="15000"/>
                   </a:schemeClr>
                 </a:solidFill>
-                <a:latin typeface="Arial" panose="020B0604020202090204" pitchFamily="34" charset="0"/>
+                <a:latin typeface="Arial" panose="020B0604020202020204" pitchFamily="34" charset="0"/>
                 <a:ea typeface="微软雅黑" panose="020B0503020204020204" charset="-122"/>
               </a:defRPr>
             </a:lvl1pPr>
@@ -13517,7 +13518,7 @@
                     <a:lumOff val="15000"/>
                   </a:schemeClr>
                 </a:solidFill>
-                <a:latin typeface="Arial" panose="020B0604020202090204" pitchFamily="34" charset="0"/>
+                <a:latin typeface="Arial" panose="020B0604020202020204" pitchFamily="34" charset="0"/>
               </a:defRPr>
             </a:lvl1pPr>
           </a:lstStyle>
@@ -13554,7 +13555,7 @@
                     <a:lumOff val="15000"/>
                   </a:schemeClr>
                 </a:solidFill>
-                <a:latin typeface="Arial" panose="020B0604020202090204" pitchFamily="34" charset="0"/>
+                <a:latin typeface="Arial" panose="020B0604020202020204" pitchFamily="34" charset="0"/>
               </a:defRPr>
             </a:lvl1pPr>
           </a:lstStyle>
@@ -13588,7 +13589,7 @@
                     <a:lumOff val="15000"/>
                   </a:schemeClr>
                 </a:solidFill>
-                <a:latin typeface="Arial" panose="020B0604020202090204" pitchFamily="34" charset="0"/>
+                <a:latin typeface="Arial" panose="020B0604020202020204" pitchFamily="34" charset="0"/>
               </a:defRPr>
             </a:lvl1pPr>
           </a:lstStyle>
@@ -13642,7 +13643,7 @@
                     <a:lumOff val="15000"/>
                   </a:schemeClr>
                 </a:solidFill>
-                <a:latin typeface="Arial" panose="020B0604020202090204" pitchFamily="34" charset="0"/>
+                <a:latin typeface="Arial" panose="020B0604020202020204" pitchFamily="34" charset="0"/>
                 <a:ea typeface="微软雅黑" panose="020B0503020204020204" charset="-122"/>
               </a:defRPr>
             </a:lvl1pPr>
@@ -15626,7 +15627,7 @@
         <a:spcBef>
           <a:spcPts val="1000"/>
         </a:spcBef>
-        <a:buFont typeface="Arial" panose="020B0604020202090204" pitchFamily="34" charset="0"/>
+        <a:buFont typeface="Arial" panose="020B0604020202020204" pitchFamily="34" charset="0"/>
         <a:buChar char="•"/>
         <a:defRPr sz="2400" kern="1200">
           <a:solidFill>
@@ -15644,7 +15645,7 @@
         <a:spcBef>
           <a:spcPts val="500"/>
         </a:spcBef>
-        <a:buFont typeface="Arial" panose="020B0604020202090204" pitchFamily="34" charset="0"/>
+        <a:buFont typeface="Arial" panose="020B0604020202020204" pitchFamily="34" charset="0"/>
         <a:buChar char="•"/>
         <a:defRPr sz="2000" kern="1200">
           <a:solidFill>
@@ -15662,7 +15663,7 @@
         <a:spcBef>
           <a:spcPts val="500"/>
         </a:spcBef>
-        <a:buFont typeface="Arial" panose="020B0604020202090204" pitchFamily="34" charset="0"/>
+        <a:buFont typeface="Arial" panose="020B0604020202020204" pitchFamily="34" charset="0"/>
         <a:buChar char="•"/>
         <a:defRPr sz="1800" kern="1200">
           <a:solidFill>
@@ -15680,7 +15681,7 @@
         <a:spcBef>
           <a:spcPts val="500"/>
         </a:spcBef>
-        <a:buFont typeface="Arial" panose="020B0604020202090204" pitchFamily="34" charset="0"/>
+        <a:buFont typeface="Arial" panose="020B0604020202020204" pitchFamily="34" charset="0"/>
         <a:buChar char="•"/>
         <a:defRPr sz="1800" kern="1200">
           <a:solidFill>
@@ -15698,7 +15699,7 @@
         <a:spcBef>
           <a:spcPts val="500"/>
         </a:spcBef>
-        <a:buFont typeface="Arial" panose="020B0604020202090204" pitchFamily="34" charset="0"/>
+        <a:buFont typeface="Arial" panose="020B0604020202020204" pitchFamily="34" charset="0"/>
         <a:buChar char="•"/>
         <a:defRPr sz="1800" kern="1200">
           <a:solidFill>
@@ -15716,7 +15717,7 @@
         <a:spcBef>
           <a:spcPts val="500"/>
         </a:spcBef>
-        <a:buFont typeface="Arial" panose="020B0604020202090204" pitchFamily="34" charset="0"/>
+        <a:buFont typeface="Arial" panose="020B0604020202020204" pitchFamily="34" charset="0"/>
         <a:buChar char="•"/>
         <a:defRPr sz="1800" kern="1200">
           <a:solidFill>
@@ -15734,7 +15735,7 @@
         <a:spcBef>
           <a:spcPts val="500"/>
         </a:spcBef>
-        <a:buFont typeface="Arial" panose="020B0604020202090204" pitchFamily="34" charset="0"/>
+        <a:buFont typeface="Arial" panose="020B0604020202020204" pitchFamily="34" charset="0"/>
         <a:buChar char="•"/>
         <a:defRPr sz="1800" kern="1200">
           <a:solidFill>
@@ -15752,7 +15753,7 @@
         <a:spcBef>
           <a:spcPts val="500"/>
         </a:spcBef>
-        <a:buFont typeface="Arial" panose="020B0604020202090204" pitchFamily="34" charset="0"/>
+        <a:buFont typeface="Arial" panose="020B0604020202020204" pitchFamily="34" charset="0"/>
         <a:buChar char="•"/>
         <a:defRPr sz="1800" kern="1200">
           <a:solidFill>
@@ -15770,7 +15771,7 @@
         <a:spcBef>
           <a:spcPts val="500"/>
         </a:spcBef>
-        <a:buFont typeface="Arial" panose="020B0604020202090204" pitchFamily="34" charset="0"/>
+        <a:buFont typeface="Arial" panose="020B0604020202020204" pitchFamily="34" charset="0"/>
         <a:buChar char="•"/>
         <a:defRPr sz="1800" kern="1200">
           <a:solidFill>
@@ -16046,7 +16047,7 @@
                     <a:lumOff val="15000"/>
                   </a:schemeClr>
                 </a:solidFill>
-                <a:latin typeface="Arial" panose="020B0604020202090204" pitchFamily="34" charset="0"/>
+                <a:latin typeface="Arial" panose="020B0604020202020204" pitchFamily="34" charset="0"/>
                 <a:ea typeface="微软雅黑" panose="020B0503020204020204" charset="-122"/>
               </a:defRPr>
             </a:lvl1pPr>
@@ -16094,7 +16095,7 @@
                     <a:lumOff val="15000"/>
                   </a:schemeClr>
                 </a:solidFill>
-                <a:latin typeface="Arial" panose="020B0604020202090204" pitchFamily="34" charset="0"/>
+                <a:latin typeface="Arial" panose="020B0604020202020204" pitchFamily="34" charset="0"/>
                 <a:ea typeface="微软雅黑" panose="020B0503020204020204" charset="-122"/>
               </a:defRPr>
             </a:lvl1pPr>
@@ -16139,7 +16140,7 @@
                     <a:lumOff val="15000"/>
                   </a:schemeClr>
                 </a:solidFill>
-                <a:latin typeface="Arial" panose="020B0604020202090204" pitchFamily="34" charset="0"/>
+                <a:latin typeface="Arial" panose="020B0604020202020204" pitchFamily="34" charset="0"/>
                 <a:ea typeface="微软雅黑" panose="020B0503020204020204" charset="-122"/>
               </a:defRPr>
             </a:lvl1pPr>
@@ -16237,7 +16238,7 @@
             </a:schemeClr>
           </a:solidFill>
           <a:uFillTx/>
-          <a:latin typeface="Arial" panose="020B0604020202090204" pitchFamily="34" charset="0"/>
+          <a:latin typeface="Arial" panose="020B0604020202020204" pitchFamily="34" charset="0"/>
           <a:ea typeface="微软雅黑" panose="020B0503020204020204" charset="-122"/>
           <a:cs typeface="+mj-cs"/>
         </a:defRPr>
@@ -16254,7 +16255,7 @@
         <a:spcAft>
           <a:spcPts val="1000"/>
         </a:spcAft>
-        <a:buFont typeface="Arial" panose="020B0604020202090204" pitchFamily="34" charset="0"/>
+        <a:buFont typeface="Arial" panose="020B0604020202020204" pitchFamily="34" charset="0"/>
         <a:buChar char="•"/>
         <a:defRPr sz="1600" u="none" strike="noStrike" kern="1200" cap="none" spc="150" normalizeH="0" baseline="0">
           <a:solidFill>
@@ -16264,7 +16265,7 @@
             </a:schemeClr>
           </a:solidFill>
           <a:uFillTx/>
-          <a:latin typeface="Arial" panose="020B0604020202090204" pitchFamily="34" charset="0"/>
+          <a:latin typeface="Arial" panose="020B0604020202020204" pitchFamily="34" charset="0"/>
           <a:ea typeface="微软雅黑" panose="020B0503020204020204" charset="-122"/>
           <a:cs typeface="+mn-cs"/>
         </a:defRPr>
@@ -16279,7 +16280,7 @@
         <a:spcAft>
           <a:spcPts val="1000"/>
         </a:spcAft>
-        <a:buFont typeface="Arial" panose="020B0604020202090204" pitchFamily="34" charset="0"/>
+        <a:buFont typeface="Arial" panose="020B0604020202020204" pitchFamily="34" charset="0"/>
         <a:buChar char="•"/>
         <a:tabLst>
           <a:tab pos="1609725" algn="l"/>
@@ -16292,7 +16293,7 @@
             </a:schemeClr>
           </a:solidFill>
           <a:uFillTx/>
-          <a:latin typeface="Arial" panose="020B0604020202090204" pitchFamily="34" charset="0"/>
+          <a:latin typeface="Arial" panose="020B0604020202020204" pitchFamily="34" charset="0"/>
           <a:ea typeface="微软雅黑" panose="020B0503020204020204" charset="-122"/>
           <a:cs typeface="+mn-cs"/>
         </a:defRPr>
@@ -16307,7 +16308,7 @@
         <a:spcAft>
           <a:spcPts val="1000"/>
         </a:spcAft>
-        <a:buFont typeface="Arial" panose="020B0604020202090204" pitchFamily="34" charset="0"/>
+        <a:buFont typeface="Arial" panose="020B0604020202020204" pitchFamily="34" charset="0"/>
         <a:buChar char="•"/>
         <a:defRPr sz="1600" u="none" strike="noStrike" kern="1200" cap="none" spc="150" normalizeH="0" baseline="0">
           <a:solidFill>
@@ -16317,7 +16318,7 @@
             </a:schemeClr>
           </a:solidFill>
           <a:uFillTx/>
-          <a:latin typeface="Arial" panose="020B0604020202090204" pitchFamily="34" charset="0"/>
+          <a:latin typeface="Arial" panose="020B0604020202020204" pitchFamily="34" charset="0"/>
           <a:ea typeface="微软雅黑" panose="020B0503020204020204" charset="-122"/>
           <a:cs typeface="+mn-cs"/>
         </a:defRPr>
@@ -16332,7 +16333,7 @@
         <a:spcAft>
           <a:spcPts val="1000"/>
         </a:spcAft>
-        <a:buFont typeface="Arial" panose="020B0604020202090204" pitchFamily="34" charset="0"/>
+        <a:buFont typeface="Arial" panose="020B0604020202020204" pitchFamily="34" charset="0"/>
         <a:buChar char="•"/>
         <a:defRPr sz="1600" u="none" strike="noStrike" kern="1200" cap="none" spc="150" normalizeH="0" baseline="0">
           <a:solidFill>
@@ -16342,7 +16343,7 @@
             </a:schemeClr>
           </a:solidFill>
           <a:uFillTx/>
-          <a:latin typeface="Arial" panose="020B0604020202090204" pitchFamily="34" charset="0"/>
+          <a:latin typeface="Arial" panose="020B0604020202020204" pitchFamily="34" charset="0"/>
           <a:ea typeface="微软雅黑" panose="020B0503020204020204" charset="-122"/>
           <a:cs typeface="+mn-cs"/>
         </a:defRPr>
@@ -16357,7 +16358,7 @@
         <a:spcAft>
           <a:spcPts val="1000"/>
         </a:spcAft>
-        <a:buFont typeface="Arial" panose="020B0604020202090204" pitchFamily="34" charset="0"/>
+        <a:buFont typeface="Arial" panose="020B0604020202020204" pitchFamily="34" charset="0"/>
         <a:buChar char="•"/>
         <a:defRPr sz="1600" u="none" strike="noStrike" kern="1200" cap="none" spc="150" normalizeH="0" baseline="0">
           <a:solidFill>
@@ -16367,7 +16368,7 @@
             </a:schemeClr>
           </a:solidFill>
           <a:uFillTx/>
-          <a:latin typeface="Arial" panose="020B0604020202090204" pitchFamily="34" charset="0"/>
+          <a:latin typeface="Arial" panose="020B0604020202020204" pitchFamily="34" charset="0"/>
           <a:ea typeface="微软雅黑" panose="020B0503020204020204" charset="-122"/>
           <a:cs typeface="+mn-cs"/>
         </a:defRPr>
@@ -16379,7 +16380,7 @@
         <a:spcBef>
           <a:spcPts val="500"/>
         </a:spcBef>
-        <a:buFont typeface="Arial" panose="020B0604020202090204" pitchFamily="34" charset="0"/>
+        <a:buFont typeface="Arial" panose="020B0604020202020204" pitchFamily="34" charset="0"/>
         <a:buChar char="•"/>
         <a:defRPr sz="1800" kern="1200">
           <a:solidFill>
@@ -16397,7 +16398,7 @@
         <a:spcBef>
           <a:spcPts val="500"/>
         </a:spcBef>
-        <a:buFont typeface="Arial" panose="020B0604020202090204" pitchFamily="34" charset="0"/>
+        <a:buFont typeface="Arial" panose="020B0604020202020204" pitchFamily="34" charset="0"/>
         <a:buChar char="•"/>
         <a:defRPr sz="1800" kern="1200">
           <a:solidFill>
@@ -16415,7 +16416,7 @@
         <a:spcBef>
           <a:spcPts val="500"/>
         </a:spcBef>
-        <a:buFont typeface="Arial" panose="020B0604020202090204" pitchFamily="34" charset="0"/>
+        <a:buFont typeface="Arial" panose="020B0604020202020204" pitchFamily="34" charset="0"/>
         <a:buChar char="•"/>
         <a:defRPr sz="1800" kern="1200">
           <a:solidFill>
@@ -16433,7 +16434,7 @@
         <a:spcBef>
           <a:spcPts val="500"/>
         </a:spcBef>
-        <a:buFont typeface="Arial" panose="020B0604020202090204" pitchFamily="34" charset="0"/>
+        <a:buFont typeface="Arial" panose="020B0604020202020204" pitchFamily="34" charset="0"/>
         <a:buChar char="•"/>
         <a:defRPr sz="1800" kern="1200">
           <a:solidFill>
@@ -17131,54 +17132,8 @@
         </p:nvSpPr>
         <p:spPr>
           <a:xfrm>
-            <a:off x="3048000" y="3244850"/>
-            <a:ext cx="6096000" cy="645160"/>
-          </a:xfrm>
-          <a:prstGeom prst="rect">
-            <a:avLst/>
-          </a:prstGeom>
-          <a:noFill/>
-        </p:spPr>
-        <p:txBody>
-          <a:bodyPr wrap="square" rtlCol="0" anchor="t">
-            <a:spAutoFit/>
-          </a:bodyPr>
-          <a:p>
-            <a:r>
-              <a:rPr lang="zh-CN" altLang="en-US" dirty="0">
-                <a:solidFill>
-                  <a:schemeClr val="bg1"/>
-                </a:solidFill>
-                <a:sym typeface="+mn-ea"/>
-              </a:rPr>
-              <a:t>选题背景选题背景</a:t>
-            </a:r>
-            <a:endParaRPr lang="zh-CN" altLang="en-US" dirty="0">
-              <a:solidFill>
-                <a:schemeClr val="bg1"/>
-              </a:solidFill>
-            </a:endParaRPr>
-          </a:p>
-          <a:p>
-            <a:endParaRPr lang="zh-CN" altLang="en-US" dirty="0">
-              <a:solidFill>
-                <a:schemeClr val="bg1"/>
-              </a:solidFill>
-              <a:sym typeface="+mn-ea"/>
-            </a:endParaRPr>
-          </a:p>
-        </p:txBody>
-      </p:sp>
-      <p:sp>
-        <p:nvSpPr>
-          <p:cNvPr id="4" name="文本框 3"/>
-          <p:cNvSpPr txBox="1"/>
-          <p:nvPr/>
-        </p:nvSpPr>
-        <p:spPr>
-          <a:xfrm>
-            <a:off x="457200" y="157480"/>
-            <a:ext cx="4064000" cy="706755"/>
+            <a:off x="598170" y="207645"/>
+            <a:ext cx="8002270" cy="706755"/>
           </a:xfrm>
           <a:prstGeom prst="rect">
             <a:avLst/>
@@ -17192,7 +17147,11 @@
           <a:p>
             <a:r>
               <a:rPr lang="zh-CN" altLang="en-US" sz="4000"/>
-              <a:t>选课背景</a:t>
+              <a:t>研究目标在当今的</a:t>
+            </a:r>
+            <a:r>
+              <a:rPr lang="zh-CN" altLang="en-US" sz="4000"/>
+              <a:t>应用</a:t>
             </a:r>
             <a:endParaRPr lang="zh-CN" altLang="en-US" sz="4000"/>
           </a:p>
@@ -17200,14 +17159,14 @@
       </p:sp>
       <p:sp>
         <p:nvSpPr>
-          <p:cNvPr id="5" name="文本框 4"/>
+          <p:cNvPr id="7" name="文本框 6"/>
           <p:cNvSpPr txBox="1"/>
           <p:nvPr/>
         </p:nvSpPr>
         <p:spPr>
           <a:xfrm>
-            <a:off x="662940" y="1028700"/>
-            <a:ext cx="9723120" cy="4390390"/>
+            <a:off x="685165" y="1169670"/>
+            <a:ext cx="11052175" cy="5358765"/>
           </a:xfrm>
           <a:prstGeom prst="rect">
             <a:avLst/>
@@ -17219,69 +17178,37 @@
             <a:noAutofit/>
           </a:bodyPr>
           <a:p>
-            <a:pPr marL="342900" indent="-342900">
-              <a:buFont typeface="Arial" panose="020B0604020202090204" pitchFamily="34" charset="0"/>
-              <a:buAutoNum type="arabicPeriod"/>
+            <a:pPr indent="457200">
+              <a:buFont typeface="Arial" panose="020B0604020202020204" pitchFamily="34" charset="0"/>
+              <a:buNone/>
             </a:pPr>
             <a:r>
-              <a:rPr lang="zh-CN" altLang="en-US" sz="2400"/>
-              <a:t>网络安全需求增加：随着互联网的普及和数字化技术的快速发展，网络安全威胁不断增加。网络嗅探可以检测到网络中传输的敏感信息、恶意流量以及其他安全事件，帮助网络管理员及时发现并应对网络安全威胁。</a:t>
+              <a:rPr lang="en-US" altLang="zh-CN" sz="1900"/>
+              <a:t>通过对国内外的文献调研发现，网络嗅探中的数据包捕获主要可以分口为两种方式，一种是基于操作系统内核的，如 Unix、Linux 系统，他们系统内核本身就提供包捕获机制；第二种就是基于外界提供的驱动程序库，如 Unix 下的 Libpcap 和 Windows 下的 Winpcap。</a:t>
             </a:r>
-            <a:endParaRPr lang="zh-CN" altLang="en-US" sz="2400"/>
-          </a:p>
-          <a:p>
-            <a:pPr marL="342900" indent="-342900">
-              <a:buFont typeface="Arial" panose="020B0604020202090204" pitchFamily="34" charset="0"/>
-              <a:buAutoNum type="arabicPeriod"/>
-            </a:pPr>
-            <a:endParaRPr lang="zh-CN" altLang="en-US" sz="2400"/>
-          </a:p>
-          <a:p>
-            <a:pPr marL="342900" indent="-342900">
-              <a:buFont typeface="Arial" panose="020B0604020202090204" pitchFamily="34" charset="0"/>
-              <a:buAutoNum type="arabicPeriod"/>
+            <a:endParaRPr lang="en-US" altLang="zh-CN" sz="1900"/>
+          </a:p>
+          <a:p>
+            <a:pPr indent="457200">
+              <a:buFont typeface="Arial" panose="020B0604020202020204" pitchFamily="34" charset="0"/>
+              <a:buNone/>
             </a:pPr>
             <a:r>
-              <a:rPr lang="zh-CN" altLang="en-US" sz="2400"/>
-              <a:t>提高网络运维效率：网络嗅探可以对网络传输的数据进行分析，帮助管理员了解网络的状态和性能，提供有效的网络监控和故障排除手段，提高网络运维效率。</a:t>
+              <a:rPr lang="en-US" altLang="zh-CN" sz="1900"/>
+              <a:t>Winpcap 是一个基于 Win32的开源的包捕获驱动架构，它弥补了Windows 系统内核本身提供很少包捕获接口的劣势，可以直接捕获到链路层的数据帧。基于 Winpcap 开发的监听程序具有很好的可移植性，可以很容易的移植到 Unix 系统上，所以在 Windows 系统上基于 Winpcap 来开发嗅探软件是一种很好的选择。网络嗅探技术的出现已经有较长一段时间了，因为 Unix 类系统内核提供了对网络嗅探很好的支持，而Windows 内核却没有，导致 Unix 类系统下的网络嗅探产品比 Windows 下的多。目前使用的最多的是Sniffit、WinPcap监听软件，由于在Unix和Linux系统中，发送这些命令需要超级用户的权限，这一点限制了在UNIX系统中的使用，普通用户是不能进行网络监听的，只有获得超级用户权限，才能进行网络监听，而在Windows操作系统中，则没有这个限制，只要运行这一类的监听软件即可；目前网络数据捕获器大多数是基于过滤器技术来实现的，大多数的过滤程序都是建立在伯克利实验室的Libpcap基础之上的。</a:t>
             </a:r>
-            <a:endParaRPr lang="zh-CN" altLang="en-US" sz="2400"/>
-          </a:p>
-          <a:p>
-            <a:pPr marL="342900" indent="-342900">
-              <a:buFont typeface="Arial" panose="020B0604020202090204" pitchFamily="34" charset="0"/>
-              <a:buAutoNum type="arabicPeriod"/>
-            </a:pPr>
-            <a:endParaRPr lang="zh-CN" altLang="en-US" sz="2400"/>
-          </a:p>
-          <a:p>
-            <a:pPr marL="342900" indent="-342900">
-              <a:buFont typeface="Arial" panose="020B0604020202090204" pitchFamily="34" charset="0"/>
-              <a:buAutoNum type="arabicPeriod"/>
+            <a:endParaRPr lang="en-US" altLang="zh-CN" sz="1900"/>
+          </a:p>
+          <a:p>
+            <a:pPr indent="457200">
+              <a:buFont typeface="Arial" panose="020B0604020202020204" pitchFamily="34" charset="0"/>
+              <a:buNone/>
             </a:pPr>
             <a:r>
-              <a:rPr lang="zh-CN" altLang="en-US" sz="2400"/>
-              <a:t>学习和研究网络协议和通信：通过开发网络嗅探工具，可以深入了解网络协议和通信原理，加深对网络技术的理解和研究。</a:t>
+              <a:rPr lang="en-US" altLang="zh-CN" sz="1900"/>
+              <a:t>由监听技术发展的现状来看，目前主流的网络监听工具软件几乎都是国外生产的软件。随着中国信息技术的发展，监听系统必将大有用武之地，因此监听技术的研究势在必行。</a:t>
             </a:r>
-            <a:endParaRPr lang="zh-CN" altLang="en-US" sz="2400"/>
-          </a:p>
-          <a:p>
-            <a:pPr marL="342900" indent="-342900">
-              <a:buFont typeface="Arial" panose="020B0604020202090204" pitchFamily="34" charset="0"/>
-              <a:buAutoNum type="arabicPeriod"/>
-            </a:pPr>
-            <a:endParaRPr lang="zh-CN" altLang="en-US" sz="2400"/>
-          </a:p>
-          <a:p>
-            <a:pPr marL="342900" indent="-342900">
-              <a:buFont typeface="Arial" panose="020B0604020202090204" pitchFamily="34" charset="0"/>
-              <a:buAutoNum type="arabicPeriod"/>
-            </a:pPr>
-            <a:r>
-              <a:rPr lang="zh-CN" altLang="en-US" sz="2400"/>
-              <a:t>开源社区和相关工具的支持：有许多成熟的网络嗅探工具和开源库可供开发者使用，如Scapy、Wireshark等，它们提供了强大的网络抓包和分析功能，为开发网络嗅探应用提供了丰富的资源和支持。</a:t>
-            </a:r>
-            <a:endParaRPr lang="zh-CN" altLang="en-US" sz="2400"/>
+            <a:endParaRPr lang="en-US" altLang="zh-CN" sz="1900"/>
           </a:p>
         </p:txBody>
       </p:sp>
@@ -17622,8 +17549,54 @@
         </p:nvSpPr>
         <p:spPr>
           <a:xfrm>
-            <a:off x="598170" y="207645"/>
-            <a:ext cx="8002270" cy="706755"/>
+            <a:off x="3048000" y="3244850"/>
+            <a:ext cx="6096000" cy="645160"/>
+          </a:xfrm>
+          <a:prstGeom prst="rect">
+            <a:avLst/>
+          </a:prstGeom>
+          <a:noFill/>
+        </p:spPr>
+        <p:txBody>
+          <a:bodyPr wrap="square" rtlCol="0" anchor="t">
+            <a:spAutoFit/>
+          </a:bodyPr>
+          <a:p>
+            <a:r>
+              <a:rPr lang="zh-CN" altLang="en-US" dirty="0">
+                <a:solidFill>
+                  <a:schemeClr val="bg1"/>
+                </a:solidFill>
+                <a:sym typeface="+mn-ea"/>
+              </a:rPr>
+              <a:t>选题背景选题背景</a:t>
+            </a:r>
+            <a:endParaRPr lang="zh-CN" altLang="en-US" dirty="0">
+              <a:solidFill>
+                <a:schemeClr val="bg1"/>
+              </a:solidFill>
+            </a:endParaRPr>
+          </a:p>
+          <a:p>
+            <a:endParaRPr lang="zh-CN" altLang="en-US" dirty="0">
+              <a:solidFill>
+                <a:schemeClr val="bg1"/>
+              </a:solidFill>
+              <a:sym typeface="+mn-ea"/>
+            </a:endParaRPr>
+          </a:p>
+        </p:txBody>
+      </p:sp>
+      <p:sp>
+        <p:nvSpPr>
+          <p:cNvPr id="4" name="文本框 3"/>
+          <p:cNvSpPr txBox="1"/>
+          <p:nvPr/>
+        </p:nvSpPr>
+        <p:spPr>
+          <a:xfrm>
+            <a:off x="457200" y="157480"/>
+            <a:ext cx="4064000" cy="706755"/>
           </a:xfrm>
           <a:prstGeom prst="rect">
             <a:avLst/>
@@ -17637,11 +17610,7 @@
           <a:p>
             <a:r>
               <a:rPr lang="zh-CN" altLang="en-US" sz="4000"/>
-              <a:t>研究目标在当今的</a:t>
-            </a:r>
-            <a:r>
-              <a:rPr lang="zh-CN" altLang="en-US" sz="4000"/>
-              <a:t>应用</a:t>
+              <a:t>选课背景</a:t>
             </a:r>
             <a:endParaRPr lang="zh-CN" altLang="en-US" sz="4000"/>
           </a:p>
@@ -17649,14 +17618,14 @@
       </p:sp>
       <p:sp>
         <p:nvSpPr>
-          <p:cNvPr id="7" name="文本框 6"/>
+          <p:cNvPr id="5" name="文本框 4"/>
           <p:cNvSpPr txBox="1"/>
           <p:nvPr/>
         </p:nvSpPr>
         <p:spPr>
           <a:xfrm>
-            <a:off x="685165" y="1169670"/>
-            <a:ext cx="10565765" cy="5208270"/>
+            <a:off x="530860" y="1226820"/>
+            <a:ext cx="10923270" cy="5462905"/>
           </a:xfrm>
           <a:prstGeom prst="rect">
             <a:avLst/>
@@ -17668,59 +17637,55 @@
             <a:noAutofit/>
           </a:bodyPr>
           <a:p>
-            <a:pPr indent="457200" algn="l">
-              <a:buFont typeface="Arial" panose="020B0604020202090204" pitchFamily="34" charset="0"/>
+            <a:pPr indent="457200">
+              <a:buFont typeface="Arial" panose="020B0604020202020204" pitchFamily="34" charset="0"/>
               <a:buNone/>
             </a:pPr>
             <a:r>
-              <a:rPr lang="zh-CN" altLang="en-US" sz="1900"/>
-              <a:t>sniffer 中文翻译过来就是嗅探器，在当前网络技术中使用得非常得广泛。sniffer 既可以做为网络故障的诊断工具，也可以作为黑客嗅探和监听的工具。最近两年，网络监听（sniffer）技术出现了新的重要特征。传统的 sniffer 技术是被动地监听网络通信、用户名和口令。而新的 sniffer 技术出现了主动地控制通信数据的特点，把 sniffer 技术扩展到了一个新的领域。Sniffer 技术除了目前在传统的网络侦测管理外，也开始被应用在资讯保全的领域。可以这样说，sniffer 技术是一把双刃剑，如何更好的利用它，了解它的一些特性，将能使这项技术更好的为我们带来便利。sniffer 的编程方法比较通用的有以下几种：</a:t>
+              <a:rPr lang="zh-CN" altLang="en-US" sz="1900">
+                <a:cs typeface="+mn-lt"/>
+              </a:rPr>
+              <a:t>随着互联网的普及和数字化技术的快速发展，网络安全威胁不断增加。网络嗅探可以检测到网络中传输的敏感信息、恶意流量以及其他安全事件，帮助网络管理员及时发现并应对网络安全威胁。</a:t>
             </a:r>
-            <a:endParaRPr lang="zh-CN" altLang="en-US" sz="1900"/>
+            <a:endParaRPr lang="zh-CN" altLang="en-US" sz="1900">
+              <a:cs typeface="+mn-lt"/>
+            </a:endParaRPr>
           </a:p>
           <a:p>
             <a:pPr indent="457200">
-              <a:buFont typeface="Arial" panose="020B0604020202090204" pitchFamily="34" charset="0"/>
+              <a:buFont typeface="Arial" panose="020B0604020202020204" pitchFamily="34" charset="0"/>
               <a:buNone/>
             </a:pPr>
             <a:r>
-              <a:rPr lang="zh-CN" altLang="en-US" sz="1900"/>
-              <a:t>1）.winpcap 这是一个比较通用的库，相信做过抓包的工具大多数人都不会太陌生。</a:t>
+              <a:rPr lang="zh-CN" altLang="en-US" sz="1900">
+                <a:cs typeface="+mn-lt"/>
+              </a:rPr>
+              <a:t>网络嗅探可以对网络传输的数据进行分析，帮助管理员了解网络的状态和性能，提供有效的网络监控和故障排除手段，提高网络运维效率。</a:t>
             </a:r>
-            <a:endParaRPr lang="zh-CN" altLang="en-US" sz="1900"/>
+            <a:r>
+              <a:rPr lang="en-US" altLang="zh-CN" sz="1900">
+                <a:cs typeface="+mn-lt"/>
+              </a:rPr>
+              <a:t>   </a:t>
+            </a:r>
+            <a:endParaRPr lang="en-US" altLang="zh-CN" sz="1900">
+              <a:cs typeface="+mn-lt"/>
+            </a:endParaRPr>
           </a:p>
           <a:p>
             <a:pPr indent="457200">
-              <a:buFont typeface="Arial" panose="020B0604020202090204" pitchFamily="34" charset="0"/>
+              <a:buFont typeface="Arial" panose="020B0604020202020204" pitchFamily="34" charset="0"/>
               <a:buNone/>
             </a:pPr>
             <a:r>
-              <a:rPr lang="zh-CN" altLang="en-US" sz="1900"/>
-              <a:t>2）.raw socket 在2000以后的版本都支持此项功能，2000 server 有个网络监视器就是基于 rawsocket。</a:t>
+              <a:rPr lang="zh-CN" altLang="en-US" sz="1900">
+                <a:cs typeface="+mn-lt"/>
+              </a:rPr>
+              <a:t>当今涌现了很网络嗅探工具，一些常用的网络嗅探工具有wireshark（广泛使用的网络协议分析工具，可以捕获和分析网络数据包，支持多种操作系统，并提供了强大的协议解析和过滤功能）、tcpdump（命令行工具，用于捕获和分析网络数据包，在不同的操作系统上运行，并提供了丰富的过滤和抓包选项）、networkMiner（网络取证工具，它可以提取网络流量中的文件、图像、邮件和其他信息）、ettercap（用于中间人攻击、ARP欺骗和其他网络安全测试）,重点是scapy（强大的Python库，用于构建、发送和分析网络数据包）。</a:t>
             </a:r>
-            <a:endParaRPr lang="zh-CN" altLang="en-US" sz="1900"/>
-          </a:p>
-          <a:p>
-            <a:pPr indent="457200">
-              <a:buFont typeface="Arial" panose="020B0604020202090204" pitchFamily="34" charset="0"/>
-              <a:buNone/>
-            </a:pPr>
-            <a:r>
-              <a:rPr lang="zh-CN" altLang="en-US" sz="1900"/>
-              <a:t>3）.tdi, ndis, spi, hook socket 技术，这种技术比较大的不同是，可以将包截取而不是仅仅获得包的一份拷贝。实际应用中的 Sniffer 还分软、硬两种。软件 Sniffer 的优点在于比较便宜，易于学习使用，同时也易于交流，缺点是往往无法抓取网络上所有的传输（比如碎片），某些情况下也就可能无法真正了解网络的故障和运行情况；硬件的 Sniffer 通常称为协议分析仪，一般都比较昂贵，它的优点恰恰是软件 Sniffer 所欠缺的，但是昂贵是它致命的缺点。因此目前流行的 Sniffer 工具都是软件的。网上有不少免费的 Sniffer 工具可下载使用（有些甚至提供源码），但是这些免费的软件往往功能单一，稳定性和技术支持方面也无法和商业软件相比；目前在商业网管软件中，NAI的 Sniffer TNV 套件是非常典型的协议分析仪。</a:t>
-            </a:r>
-            <a:endParaRPr lang="zh-CN" altLang="en-US" sz="1900"/>
-          </a:p>
-          <a:p>
-            <a:pPr indent="0">
-              <a:buFont typeface="Arial" panose="020B0604020202090204" pitchFamily="34" charset="0"/>
-              <a:buNone/>
-            </a:pPr>
-            <a:r>
-              <a:rPr lang="en-US" altLang="zh-CN" sz="1900"/>
-              <a:t>  </a:t>
-            </a:r>
-            <a:endParaRPr lang="en-US" altLang="zh-CN" sz="1900"/>
+            <a:endParaRPr lang="zh-CN" altLang="en-US" sz="1900">
+              <a:cs typeface="+mn-lt"/>
+            </a:endParaRPr>
           </a:p>
         </p:txBody>
       </p:sp>
@@ -18055,14 +18020,122 @@
       </p:cxnSp>
       <p:sp>
         <p:nvSpPr>
-          <p:cNvPr id="2" name="文本框 1"/>
+          <p:cNvPr id="9" name="文本框 6"/>
+          <p:cNvSpPr txBox="1"/>
+          <p:nvPr>
+            <p:custDataLst>
+              <p:tags r:id="rId6"/>
+            </p:custDataLst>
+          </p:nvPr>
+        </p:nvSpPr>
+        <p:spPr>
+          <a:xfrm>
+            <a:off x="457200" y="-106045"/>
+            <a:ext cx="11277600" cy="1228725"/>
+          </a:xfrm>
+          <a:prstGeom prst="rect">
+            <a:avLst/>
+          </a:prstGeom>
+          <a:noFill/>
+          <a:ln w="12700">
+            <a:miter lim="400000"/>
+          </a:ln>
+          <a:extLst>
+            <a:ext uri="{909E8E84-426E-40DD-AFC4-6F175D3DCCD1}">
+              <a14:hiddenFill xmlns:a14="http://schemas.microsoft.com/office/drawing/2010/main">
+                <a:solidFill>
+                  <a:schemeClr val="accent1"/>
+                </a:solidFill>
+              </a14:hiddenFill>
+            </a:ext>
+          </a:extLst>
+        </p:spPr>
+        <p:txBody>
+          <a:bodyPr lIns="0" tIns="0" rIns="0" bIns="0" anchor="ctr" anchorCtr="0">
+            <a:normAutofit/>
+          </a:bodyPr>
+          <a:lstStyle>
+            <a:defPPr>
+              <a:defRPr lang="zh-CN"/>
+            </a:defPPr>
+            <a:lvl1pPr>
+              <a:lnSpc>
+                <a:spcPct val="120000"/>
+              </a:lnSpc>
+              <a:defRPr sz="3600" b="1">
+                <a:solidFill>
+                  <a:srgbClr val="FFFFFF"/>
+                </a:solidFill>
+                <a:latin typeface="微软雅黑" panose="020B0503020204020204" charset="-122"/>
+                <a:ea typeface="微软雅黑" panose="020B0503020204020204" charset="-122"/>
+                <a:cs typeface="微软雅黑" panose="020B0503020204020204" charset="-122"/>
+              </a:defRPr>
+            </a:lvl1pPr>
+          </a:lstStyle>
+          <a:p>
+            <a:pPr>
+              <a:lnSpc>
+                <a:spcPct val="100000"/>
+              </a:lnSpc>
+            </a:pPr>
+            <a:r>
+              <a:rPr lang="zh-CN" altLang="en-US" sz="4000" dirty="0" err="1">
+                <a:solidFill>
+                  <a:schemeClr val="dk1"/>
+                </a:solidFill>
+                <a:latin typeface="微软雅黑" panose="020B0503020204020204" charset="-122"/>
+                <a:ea typeface="微软雅黑" panose="020B0503020204020204" charset="-122"/>
+                <a:cs typeface="微软雅黑" panose="020B0503020204020204" charset="-122"/>
+                <a:sym typeface="微软雅黑" panose="020B0503020204020204" charset="-122"/>
+              </a:rPr>
+              <a:t>研究内容</a:t>
+            </a:r>
+            <a:r>
+              <a:rPr lang="en-US" altLang="zh-CN" sz="4000" dirty="0" err="1">
+                <a:solidFill>
+                  <a:schemeClr val="dk1"/>
+                </a:solidFill>
+                <a:latin typeface="微软雅黑" panose="020B0503020204020204" charset="-122"/>
+                <a:ea typeface="微软雅黑" panose="020B0503020204020204" charset="-122"/>
+                <a:cs typeface="微软雅黑" panose="020B0503020204020204" charset="-122"/>
+                <a:sym typeface="微软雅黑" panose="020B0503020204020204" charset="-122"/>
+              </a:rPr>
+              <a:t>	</a:t>
+            </a:r>
+            <a:r>
+              <a:rPr lang="en-US" altLang="zh-CN" dirty="0" err="1">
+                <a:solidFill>
+                  <a:schemeClr val="dk1"/>
+                </a:solidFill>
+                <a:latin typeface="微软雅黑" panose="020B0503020204020204" charset="-122"/>
+                <a:ea typeface="微软雅黑" panose="020B0503020204020204" charset="-122"/>
+                <a:cs typeface="微软雅黑" panose="020B0503020204020204" charset="-122"/>
+                <a:sym typeface="微软雅黑" panose="020B0503020204020204" charset="-122"/>
+              </a:rPr>
+              <a:t>	</a:t>
+            </a:r>
+            <a:endParaRPr lang="en-US" altLang="zh-CN" dirty="0" err="1">
+              <a:solidFill>
+                <a:schemeClr val="dk1"/>
+              </a:solidFill>
+              <a:latin typeface="微软雅黑" panose="020B0503020204020204" charset="-122"/>
+              <a:ea typeface="微软雅黑" panose="020B0503020204020204" charset="-122"/>
+              <a:cs typeface="微软雅黑" panose="020B0503020204020204" charset="-122"/>
+              <a:sym typeface="微软雅黑" panose="020B0503020204020204" charset="-122"/>
+            </a:endParaRPr>
+          </a:p>
+        </p:txBody>
+      </p:sp>
+      <p:sp>
+        <p:nvSpPr>
+          <p:cNvPr id="11" name="文本框 10"/>
           <p:cNvSpPr txBox="1"/>
           <p:nvPr/>
         </p:nvSpPr>
         <p:spPr>
           <a:xfrm>
-            <a:off x="598170" y="207645"/>
-            <a:ext cx="8002270" cy="706755"/>
+            <a:off x="531495" y="1122680"/>
+            <a:ext cx="11205845" cy="5579110"/>
           </a:xfrm>
           <a:prstGeom prst="rect">
             <a:avLst/>
@@ -18071,90 +18144,149 @@
         </p:spPr>
         <p:txBody>
           <a:bodyPr wrap="square" rtlCol="0">
-            <a:spAutoFit/>
-          </a:bodyPr>
-          <a:p>
-            <a:r>
-              <a:rPr lang="zh-CN" altLang="en-US" sz="4000"/>
-              <a:t>研究目标在当今的</a:t>
-            </a:r>
-            <a:r>
-              <a:rPr lang="zh-CN" altLang="en-US" sz="4000"/>
-              <a:t>应用</a:t>
-            </a:r>
-            <a:endParaRPr lang="zh-CN" altLang="en-US" sz="4000"/>
-          </a:p>
-        </p:txBody>
-      </p:sp>
-      <p:sp>
-        <p:nvSpPr>
-          <p:cNvPr id="7" name="文本框 6"/>
-          <p:cNvSpPr txBox="1"/>
-          <p:nvPr/>
-        </p:nvSpPr>
-        <p:spPr>
-          <a:xfrm>
-            <a:off x="685165" y="1169670"/>
-            <a:ext cx="10768330" cy="5066665"/>
-          </a:xfrm>
-          <a:prstGeom prst="rect">
-            <a:avLst/>
-          </a:prstGeom>
-          <a:noFill/>
-        </p:spPr>
-        <p:txBody>
-          <a:bodyPr wrap="square" rtlCol="0" anchor="t">
             <a:noAutofit/>
           </a:bodyPr>
           <a:p>
-            <a:pPr indent="457200">
-              <a:buFont typeface="Arial" panose="020B0604020202090204" pitchFamily="34" charset="0"/>
+            <a:pPr indent="0">
               <a:buNone/>
             </a:pPr>
             <a:r>
-              <a:rPr lang="en-US" altLang="zh-CN"/>
-              <a:t>Sniffer TNV 主要包括两部分：便携式套件和分布式套件。便携式套件主要包括 SnifferBasic、Sniffer Pro LAN、Sniffer Pro WAN、Sniffer Pro High Speed 等组件，它是一种便携式的网络故障与性能分析的解决方案，是能够为全部七层 OSI 网络模型提供全面性能管理的工具包，它使得网络专职人员能够主动维护多拓扑结构和多协议的网络，并显著降低其网络操作成本。同时，它还具备出色的监测和分辨能力，智能的专家技术</a:t>
+              <a:rPr lang="en-US" altLang="zh-CN" sz="1900">
+                <a:cs typeface="+mn-lt"/>
+              </a:rPr>
+              <a:t>1.  </a:t>
             </a:r>
-            <a:endParaRPr lang="en-US" altLang="zh-CN" sz="1900"/>
+            <a:r>
+              <a:rPr lang="zh-CN" altLang="en-US" sz="1900">
+                <a:cs typeface="+mn-lt"/>
+              </a:rPr>
+              <a:t>网络嗅探工具的界面及数据可视化设计</a:t>
+            </a:r>
+            <a:endParaRPr lang="zh-CN" altLang="en-US" sz="1900">
+              <a:cs typeface="+mn-lt"/>
+            </a:endParaRPr>
           </a:p>
           <a:p>
             <a:pPr indent="457200">
-              <a:buFont typeface="Arial" panose="020B0604020202090204" pitchFamily="34" charset="0"/>
               <a:buNone/>
             </a:pPr>
             <a:r>
-              <a:rPr lang="en-US" altLang="zh-CN"/>
-              <a:t>扫描从网络上捕获的信息以检测网络异常现象，并应用用户定义的试探式程序自动对每种异常现象进行归类，并给出一份警告、解释问题和提出建议的解决方案；同时 Sniffer 的网络分析器还可以监视所有类型的网络硬件和拓扑结构，包括交换网络和运行 ATM OC-12和千兆以太网的高速骨干网在内；它能够支持400多种协议解释和强大的专家分析功能，可以对网络传输进行分</a:t>
+              <a:rPr lang="zh-CN" altLang="en-US" sz="1900">
+                <a:cs typeface="+mn-lt"/>
+              </a:rPr>
+              <a:t>设计一个较好的具有用户良好操作性的界面，界面包含的组件包含菜单栏、工具栏以及网络嗅探数据的显示表格及图形，以表格形式展示捕获到的网络数据包的相关信息，如时间戳、源IP地址、目标IP地址、协议类型等。实时刷新并自动滚动显示最新的数据包。表格数据中，和结果显示区域，选择需要监听的网络接口，设置过滤条件。当数据抓取分析后，将保存的流量数据在界面上进行展示。提供柱状图、饼图，直线图、图表、表格等形式，以便用户更直观地查看和分析网络流量。根据用户的需求，提供各种筛选和排序功能，以便用户更方便地查找和分析特定的流量数据。</a:t>
             </a:r>
-            <a:endParaRPr lang="en-US" altLang="zh-CN"/>
+            <a:endParaRPr lang="zh-CN" altLang="en-US" sz="1900">
+              <a:cs typeface="+mn-lt"/>
+            </a:endParaRPr>
           </a:p>
           <a:p>
             <a:pPr indent="0">
-              <a:buFont typeface="Arial" panose="020B0604020202090204" pitchFamily="34" charset="0"/>
               <a:buNone/>
             </a:pPr>
             <a:r>
-              <a:rPr lang="en-US" altLang="zh-CN"/>
-              <a:t>析，找出故障和响应缓慢的原因，从而能够确保整个 LAN 和 WAN拓扑网络的最高性能。</a:t>
+              <a:rPr lang="en-US" altLang="zh-CN" sz="1900">
+                <a:cs typeface="+mn-lt"/>
+              </a:rPr>
+              <a:t>2.  </a:t>
             </a:r>
-            <a:endParaRPr lang="en-US" altLang="zh-CN"/>
+            <a:r>
+              <a:rPr lang="zh-CN" altLang="en-US" sz="1900">
+                <a:cs typeface="+mn-lt"/>
+              </a:rPr>
+              <a:t>对网络数据的抓取与过滤</a:t>
+            </a:r>
+            <a:endParaRPr lang="zh-CN" altLang="en-US" sz="1900">
+              <a:cs typeface="+mn-lt"/>
+            </a:endParaRPr>
           </a:p>
           <a:p>
             <a:pPr indent="457200">
-              <a:buFont typeface="Arial" panose="020B0604020202090204" pitchFamily="34" charset="0"/>
               <a:buNone/>
             </a:pPr>
             <a:r>
-              <a:rPr lang="en-US" altLang="zh-CN"/>
-              <a:t>分布式套件主要包括 Distributed Sniffer System/RMON Basic 和 Distributed Snifferzystem/RMON Pro 组件。通过结合中央控制台与分布全网的网络分析器，网络管理员可以全天候地监控整个网络运行情况，这是符合 RMON 1/ RMON 2的基于专家系统的网络和应用程序管理系统，能够适应各种拓扑结构、速度和不同介质类型的网络，将有助于排除故障和生成报告。同时该软件包中还集成了 SiteMinder Security Manager，这是一个基于NT的服务器，支持多个身份验证和授权选项，允许您检查用户访问，并选择对网络设备进行访问的相应级别，如此可以保护通过 Distributed Sniffer System显示的敏感信息。  </a:t>
+              <a:rPr lang="zh-CN" altLang="en-US" sz="1900">
+                <a:cs typeface="+mn-lt"/>
+              </a:rPr>
+              <a:t>通过监听网络接口，获取网络数据包。根据用户设置的过滤条件，过滤掉不需要的数据包，并将符合条件的数据包进行抓取。</a:t>
             </a:r>
-            <a:endParaRPr lang="en-US" altLang="zh-CN"/>
+            <a:endParaRPr lang="zh-CN" altLang="en-US" sz="1900">
+              <a:cs typeface="+mn-lt"/>
+            </a:endParaRPr>
+          </a:p>
+          <a:p>
+            <a:pPr indent="0">
+              <a:buNone/>
+            </a:pPr>
+            <a:r>
+              <a:rPr lang="en-US" altLang="zh-CN" sz="1900">
+                <a:cs typeface="+mn-lt"/>
+              </a:rPr>
+              <a:t>3.  </a:t>
+            </a:r>
+            <a:r>
+              <a:rPr lang="zh-CN" altLang="en-US" sz="1900">
+                <a:cs typeface="+mn-lt"/>
+              </a:rPr>
+              <a:t>对抓取到网络数据进行分析</a:t>
+            </a:r>
+            <a:endParaRPr lang="zh-CN" altLang="en-US" sz="1900">
+              <a:cs typeface="+mn-lt"/>
+            </a:endParaRPr>
+          </a:p>
+          <a:p>
+            <a:pPr indent="457200">
+              <a:buNone/>
+            </a:pPr>
+            <a:r>
+              <a:rPr lang="zh-CN" altLang="en-US" sz="1900">
+                <a:cs typeface="+mn-lt"/>
+              </a:rPr>
+              <a:t>提取数据包中的源和目的IP地址、端口号、协议类型等信息，进行统计和分析。根据用户的需求，对特定的流量进行更深入的分析，如查找特定协议的流量、某个IP地址的流量等。</a:t>
+            </a:r>
+            <a:endParaRPr lang="zh-CN" altLang="en-US" sz="1900">
+              <a:cs typeface="+mn-lt"/>
+            </a:endParaRPr>
+          </a:p>
+          <a:p>
+            <a:pPr indent="0">
+              <a:buNone/>
+            </a:pPr>
+            <a:r>
+              <a:rPr lang="en-US" altLang="zh-CN" sz="1900">
+                <a:cs typeface="+mn-lt"/>
+              </a:rPr>
+              <a:t>4.  </a:t>
+            </a:r>
+            <a:r>
+              <a:rPr lang="zh-CN" altLang="en-US" sz="1900">
+                <a:cs typeface="+mn-lt"/>
+              </a:rPr>
+              <a:t>对抓取到网络数据的储存</a:t>
+            </a:r>
+            <a:endParaRPr lang="zh-CN" altLang="en-US" sz="1900">
+              <a:cs typeface="+mn-lt"/>
+            </a:endParaRPr>
+          </a:p>
+          <a:p>
+            <a:pPr indent="457200">
+              <a:buNone/>
+            </a:pPr>
+            <a:r>
+              <a:rPr lang="zh-CN" altLang="en-US" sz="1900">
+                <a:cs typeface="+mn-lt"/>
+              </a:rPr>
+              <a:t>将抓取到的流量数据进行保存。将数据保存到本地文件中，以便后续的查询和分析。根据用户的需求，设置数据储存的策略，如保存最近一段时间的数据、保存特定协议的数据等。</a:t>
+            </a:r>
+            <a:endParaRPr lang="zh-CN" altLang="en-US" sz="1900">
+              <a:cs typeface="+mn-lt"/>
+            </a:endParaRPr>
           </a:p>
         </p:txBody>
       </p:sp>
     </p:spTree>
     <p:custDataLst>
-      <p:tags r:id="rId6"/>
+      <p:tags r:id="rId7"/>
     </p:custDataLst>
   </p:cSld>
   <p:clrMapOvr>
@@ -18483,14 +18615,122 @@
       </p:cxnSp>
       <p:sp>
         <p:nvSpPr>
-          <p:cNvPr id="2" name="文本框 1"/>
+          <p:cNvPr id="9" name="文本框 6"/>
+          <p:cNvSpPr txBox="1"/>
+          <p:nvPr>
+            <p:custDataLst>
+              <p:tags r:id="rId6"/>
+            </p:custDataLst>
+          </p:nvPr>
+        </p:nvSpPr>
+        <p:spPr>
+          <a:xfrm>
+            <a:off x="457200" y="-106045"/>
+            <a:ext cx="11277600" cy="1228725"/>
+          </a:xfrm>
+          <a:prstGeom prst="rect">
+            <a:avLst/>
+          </a:prstGeom>
+          <a:noFill/>
+          <a:ln w="12700">
+            <a:miter lim="400000"/>
+          </a:ln>
+          <a:extLst>
+            <a:ext uri="{909E8E84-426E-40DD-AFC4-6F175D3DCCD1}">
+              <a14:hiddenFill xmlns:a14="http://schemas.microsoft.com/office/drawing/2010/main">
+                <a:solidFill>
+                  <a:schemeClr val="accent1"/>
+                </a:solidFill>
+              </a14:hiddenFill>
+            </a:ext>
+          </a:extLst>
+        </p:spPr>
+        <p:txBody>
+          <a:bodyPr lIns="0" tIns="0" rIns="0" bIns="0" anchor="ctr" anchorCtr="0">
+            <a:normAutofit/>
+          </a:bodyPr>
+          <a:lstStyle>
+            <a:defPPr>
+              <a:defRPr lang="zh-CN"/>
+            </a:defPPr>
+            <a:lvl1pPr>
+              <a:lnSpc>
+                <a:spcPct val="120000"/>
+              </a:lnSpc>
+              <a:defRPr sz="3600" b="1">
+                <a:solidFill>
+                  <a:srgbClr val="FFFFFF"/>
+                </a:solidFill>
+                <a:latin typeface="微软雅黑" panose="020B0503020204020204" charset="-122"/>
+                <a:ea typeface="微软雅黑" panose="020B0503020204020204" charset="-122"/>
+                <a:cs typeface="微软雅黑" panose="020B0503020204020204" charset="-122"/>
+              </a:defRPr>
+            </a:lvl1pPr>
+          </a:lstStyle>
+          <a:p>
+            <a:pPr>
+              <a:lnSpc>
+                <a:spcPct val="100000"/>
+              </a:lnSpc>
+            </a:pPr>
+            <a:r>
+              <a:rPr lang="zh-CN" altLang="en-US" sz="4000" dirty="0" err="1">
+                <a:solidFill>
+                  <a:schemeClr val="dk1"/>
+                </a:solidFill>
+                <a:latin typeface="微软雅黑" panose="020B0503020204020204" charset="-122"/>
+                <a:ea typeface="微软雅黑" panose="020B0503020204020204" charset="-122"/>
+                <a:cs typeface="微软雅黑" panose="020B0503020204020204" charset="-122"/>
+                <a:sym typeface="微软雅黑" panose="020B0503020204020204" charset="-122"/>
+              </a:rPr>
+              <a:t>研究思路</a:t>
+            </a:r>
+            <a:r>
+              <a:rPr lang="en-US" altLang="zh-CN" sz="4000" dirty="0" err="1">
+                <a:solidFill>
+                  <a:schemeClr val="dk1"/>
+                </a:solidFill>
+                <a:latin typeface="微软雅黑" panose="020B0503020204020204" charset="-122"/>
+                <a:ea typeface="微软雅黑" panose="020B0503020204020204" charset="-122"/>
+                <a:cs typeface="微软雅黑" panose="020B0503020204020204" charset="-122"/>
+                <a:sym typeface="微软雅黑" panose="020B0503020204020204" charset="-122"/>
+              </a:rPr>
+              <a:t>	</a:t>
+            </a:r>
+            <a:r>
+              <a:rPr lang="en-US" altLang="zh-CN" dirty="0" err="1">
+                <a:solidFill>
+                  <a:schemeClr val="dk1"/>
+                </a:solidFill>
+                <a:latin typeface="微软雅黑" panose="020B0503020204020204" charset="-122"/>
+                <a:ea typeface="微软雅黑" panose="020B0503020204020204" charset="-122"/>
+                <a:cs typeface="微软雅黑" panose="020B0503020204020204" charset="-122"/>
+                <a:sym typeface="微软雅黑" panose="020B0503020204020204" charset="-122"/>
+              </a:rPr>
+              <a:t>	</a:t>
+            </a:r>
+            <a:endParaRPr lang="en-US" altLang="zh-CN" dirty="0" err="1">
+              <a:solidFill>
+                <a:schemeClr val="dk1"/>
+              </a:solidFill>
+              <a:latin typeface="微软雅黑" panose="020B0503020204020204" charset="-122"/>
+              <a:ea typeface="微软雅黑" panose="020B0503020204020204" charset="-122"/>
+              <a:cs typeface="微软雅黑" panose="020B0503020204020204" charset="-122"/>
+              <a:sym typeface="微软雅黑" panose="020B0503020204020204" charset="-122"/>
+            </a:endParaRPr>
+          </a:p>
+        </p:txBody>
+      </p:sp>
+      <p:sp>
+        <p:nvSpPr>
+          <p:cNvPr id="11" name="文本框 10"/>
           <p:cNvSpPr txBox="1"/>
           <p:nvPr/>
         </p:nvSpPr>
         <p:spPr>
           <a:xfrm>
-            <a:off x="598170" y="207645"/>
-            <a:ext cx="8002270" cy="706755"/>
+            <a:off x="528955" y="1122680"/>
+            <a:ext cx="11205845" cy="5490845"/>
           </a:xfrm>
           <a:prstGeom prst="rect">
             <a:avLst/>
@@ -18499,127 +18739,97 @@
         </p:spPr>
         <p:txBody>
           <a:bodyPr wrap="square" rtlCol="0">
-            <a:spAutoFit/>
+            <a:noAutofit/>
           </a:bodyPr>
           <a:p>
-            <a:r>
-              <a:rPr lang="zh-CN" altLang="en-US" sz="4000"/>
-              <a:t>研究目标在当今的</a:t>
-            </a:r>
-            <a:r>
-              <a:rPr lang="zh-CN" altLang="en-US" sz="4000"/>
-              <a:t>应用</a:t>
-            </a:r>
-            <a:endParaRPr lang="zh-CN" altLang="en-US" sz="4000"/>
-          </a:p>
-        </p:txBody>
-      </p:sp>
-      <p:sp>
-        <p:nvSpPr>
-          <p:cNvPr id="7" name="文本框 6"/>
-          <p:cNvSpPr txBox="1"/>
-          <p:nvPr/>
-        </p:nvSpPr>
-        <p:spPr>
-          <a:xfrm>
-            <a:off x="685165" y="1169670"/>
-            <a:ext cx="10476230" cy="5354320"/>
-          </a:xfrm>
-          <a:prstGeom prst="rect">
-            <a:avLst/>
-          </a:prstGeom>
-          <a:noFill/>
-        </p:spPr>
-        <p:txBody>
-          <a:bodyPr wrap="square" rtlCol="0" anchor="t">
-            <a:spAutoFit/>
-          </a:bodyPr>
-          <a:p>
-            <a:pPr marL="285750" indent="-285750">
-              <a:buFont typeface="Arial" panose="020B0604020202090204" pitchFamily="34" charset="0"/>
-              <a:buChar char="•"/>
+            <a:pPr indent="0">
+              <a:buNone/>
             </a:pPr>
             <a:r>
-              <a:rPr lang="zh-CN" altLang="en-US"/>
-              <a:t>网络安全保障：网络嗅探是一种重要的网络安全工具，它可以监控和分析网络中的数据流量，帮助发现和解决潜在的安全威胁。通过嗅探网络数据包，可以检测到恶意流量、入侵攻击、未经授权的访问和其他安全事件，从而提高网络的安全性。</a:t>
+              <a:rPr lang="zh-CN" altLang="en-US" sz="1900">
+                <a:cs typeface="+mn-lt"/>
+              </a:rPr>
+              <a:t>1. 网络嗅探工具的界面及数据可视化设计</a:t>
             </a:r>
-            <a:endParaRPr lang="zh-CN" altLang="en-US"/>
-          </a:p>
-          <a:p>
-            <a:endParaRPr lang="zh-CN" altLang="en-US"/>
-          </a:p>
-          <a:p>
-            <a:pPr marL="285750" indent="-285750">
-              <a:buFont typeface="Arial" panose="020B0604020202090204" pitchFamily="34" charset="0"/>
-              <a:buChar char="•"/>
+            <a:endParaRPr lang="zh-CN" altLang="en-US" sz="1900">
+              <a:cs typeface="+mn-lt"/>
+            </a:endParaRPr>
+          </a:p>
+          <a:p>
+            <a:pPr indent="457200">
+              <a:buNone/>
             </a:pPr>
             <a:r>
-              <a:rPr lang="zh-CN" altLang="en-US"/>
-              <a:t>网络故障排除：网络嗅探可以帮助管理员识别和解决网络故障。通过捕获和分析数据包，可以查找网络中的问题，如延迟、丢包、传输错误等，并提供相应的故障排除手段。这有助于提高网络的稳定性和可用性。</a:t>
+              <a:rPr lang="zh-CN" altLang="en-US" sz="1900">
+                <a:cs typeface="+mn-lt"/>
+              </a:rPr>
+              <a:t>通过python的tkinter库创建网络嗅探工具的界面，通过python的pyecharts库进行数据可视化设计一个UI窗口，在顶部创建一个菜单栏括文件、统计、分析、主题和设置菜单，利用Tkinter库创建图形界面，包括数据包列表的TreeView、协议树和十六进制内容显示区域。以表格形式展示捕获到的网络数据包的相关信息，如时间戳、源IP地址、目标IP地址、协议类型等。显示该数据包的详细解析信息，包括源端口、目标端口、协议头部信息等来进一步分析和选择性展示。实时刷新并自动滚动显示最新的数据包。</a:t>
             </a:r>
-            <a:endParaRPr lang="zh-CN" altLang="en-US"/>
-          </a:p>
-          <a:p>
-            <a:endParaRPr lang="zh-CN" altLang="en-US"/>
-          </a:p>
-          <a:p>
-            <a:pPr marL="285750" indent="-285750">
-              <a:buFont typeface="Arial" panose="020B0604020202090204" pitchFamily="34" charset="0"/>
-              <a:buChar char="•"/>
+            <a:endParaRPr lang="zh-CN" altLang="en-US" sz="1900">
+              <a:cs typeface="+mn-lt"/>
+            </a:endParaRPr>
+          </a:p>
+          <a:p>
+            <a:pPr indent="457200">
+              <a:buNone/>
             </a:pPr>
             <a:r>
-              <a:rPr lang="zh-CN" altLang="en-US"/>
-              <a:t>网络性能优化：通过网络嗅探，可以对网络流量和应用程序进行分析，了解网络的使用情况和性能瓶颈。这有助于优化网络带宽的使用、改进应用程序的性能，并提供更好的用户体验。</a:t>
+              <a:rPr lang="zh-CN" altLang="en-US" sz="1900">
+                <a:cs typeface="+mn-lt"/>
+              </a:rPr>
+              <a:t>使用TreeView控件来展示协议树，并根据用户选择的协议节点来展示选中协议的详细内容。通过Scapy库的功能，可以解析数据包中的协议层级结构，并将其转化为协议树形式。当用户选择特定的协议节点时，从相关数据包中提取选中协议的详细内容，并显示在十六进制内容显示区域。</a:t>
             </a:r>
-            <a:endParaRPr lang="zh-CN" altLang="en-US"/>
-          </a:p>
-          <a:p>
-            <a:endParaRPr lang="zh-CN" altLang="en-US"/>
-          </a:p>
-          <a:p>
-            <a:pPr marL="285750" indent="-285750">
-              <a:buFont typeface="Arial" panose="020B0604020202090204" pitchFamily="34" charset="0"/>
-              <a:buChar char="•"/>
+            <a:endParaRPr lang="zh-CN" altLang="en-US" sz="1900">
+              <a:cs typeface="+mn-lt"/>
+            </a:endParaRPr>
+          </a:p>
+          <a:p>
+            <a:pPr indent="0">
+              <a:buNone/>
             </a:pPr>
             <a:r>
-              <a:rPr lang="zh-CN" altLang="en-US"/>
-              <a:t>协议研究和开发：网络嗅探开发可以促进对网络协议和通信的研究和开发。通过解析和分析捕获的数据包，可以深入了解网络协议的工作原理，设计和实现新的协议和通信机制。</a:t>
+              <a:rPr lang="zh-CN" altLang="en-US" sz="1900">
+                <a:cs typeface="+mn-lt"/>
+              </a:rPr>
+              <a:t>使用python的pyecharts模块创建可视化柱状图、饼图，直线图图表。提供一些统计信息和图表，如流量分布、协议分布、源目标IP统计来更直观地了解网络流量特征。</a:t>
             </a:r>
-            <a:endParaRPr lang="zh-CN" altLang="en-US"/>
-          </a:p>
-          <a:p>
-            <a:endParaRPr lang="zh-CN" altLang="en-US"/>
-          </a:p>
-          <a:p>
-            <a:pPr marL="285750" indent="-285750">
-              <a:buFont typeface="Arial" panose="020B0604020202090204" pitchFamily="34" charset="0"/>
-              <a:buChar char="•"/>
+            <a:endParaRPr lang="zh-CN" altLang="en-US" sz="1900">
+              <a:cs typeface="+mn-lt"/>
+            </a:endParaRPr>
+          </a:p>
+          <a:p>
+            <a:pPr indent="0">
+              <a:buNone/>
             </a:pPr>
             <a:r>
-              <a:rPr lang="zh-CN" altLang="en-US"/>
-              <a:t>安全事件响应：网络嗅探可以帮助及时发现网络安全事件，并采取必要的响应措施。通过监控网络数据流量，可以实时检测和分析异常活动，追踪攻击者的行为，采取相应的反制措施。</a:t>
+              <a:rPr lang="zh-CN" altLang="en-US" sz="1900">
+                <a:cs typeface="+mn-lt"/>
+              </a:rPr>
+              <a:t>2. 网络数据的抓取与过滤</a:t>
             </a:r>
-            <a:endParaRPr lang="zh-CN" altLang="en-US"/>
-          </a:p>
-          <a:p>
-            <a:endParaRPr lang="zh-CN" altLang="en-US"/>
-          </a:p>
-          <a:p>
-            <a:pPr marL="285750" indent="-285750">
-              <a:buFont typeface="Arial" panose="020B0604020202090204" pitchFamily="34" charset="0"/>
-              <a:buChar char="•"/>
+            <a:endParaRPr lang="zh-CN" altLang="en-US" sz="1900">
+              <a:cs typeface="+mn-lt"/>
+            </a:endParaRPr>
+          </a:p>
+          <a:p>
+            <a:pPr indent="457200">
+              <a:buNone/>
             </a:pPr>
             <a:r>
-              <a:rPr lang="zh-CN" altLang="en-US"/>
-              <a:t>网络管理和监控：网络嗅探提供了对网络数据的全面的监控和分析能力，帮助管理员了解网络的实时状态、流量分布和使用情况。这有助于网络运维人员进行合理的资源分配、故障排除和网络规划。</a:t>
+              <a:rPr lang="zh-CN" altLang="en-US" sz="1900">
+                <a:cs typeface="+mn-lt"/>
+              </a:rPr>
+              <a:t>使用多线程以及Scapy库抓取与过滤。使用Threading库创建多个线程，在后台运行一个子线程来抓包，使得界面仍然能够响应用户操作。</a:t>
             </a:r>
-            <a:endParaRPr lang="zh-CN" altLang="en-US"/>
+            <a:endParaRPr lang="zh-CN" altLang="en-US" sz="1900">
+              <a:cs typeface="+mn-lt"/>
+            </a:endParaRPr>
           </a:p>
         </p:txBody>
       </p:sp>
     </p:spTree>
     <p:custDataLst>
-      <p:tags r:id="rId6"/>
+      <p:tags r:id="rId7"/>
     </p:custDataLst>
   </p:cSld>
   <p:clrMapOvr>
@@ -19016,7 +19226,7 @@
                 <a:cs typeface="微软雅黑" panose="020B0503020204020204" charset="-122"/>
                 <a:sym typeface="微软雅黑" panose="020B0503020204020204" charset="-122"/>
               </a:rPr>
-              <a:t>研究内容与研究思路</a:t>
+              <a:t>研究思路</a:t>
             </a:r>
             <a:r>
               <a:rPr lang="en-US" altLang="zh-CN" sz="4000" dirty="0" err="1">
@@ -19062,8 +19272,8 @@
         </p:nvSpPr>
         <p:spPr>
           <a:xfrm>
-            <a:off x="528955" y="998220"/>
-            <a:ext cx="10109835" cy="5490845"/>
+            <a:off x="531495" y="1122680"/>
+            <a:ext cx="11205845" cy="5490845"/>
           </a:xfrm>
           <a:prstGeom prst="rect">
             <a:avLst/>
@@ -19075,146 +19285,88 @@
             <a:noAutofit/>
           </a:bodyPr>
           <a:p>
-            <a:pPr marL="342900" indent="-342900">
-              <a:buAutoNum type="arabicPeriod"/>
+            <a:pPr indent="457200">
+              <a:buNone/>
             </a:pPr>
             <a:r>
-              <a:rPr lang="zh-CN" altLang="en-US" sz="2000">
-                <a:sym typeface="+mn-ea"/>
+              <a:rPr lang="zh-CN" altLang="en-US" sz="1900">
+                <a:cs typeface="+mn-lt"/>
               </a:rPr>
-              <a:t>UI</a:t>
+              <a:t>使用Scapy库进行数据包的抓取。在子线程中，可以使用Scapy库提供的sniff函数来进行数据包的抓取。可以设置参数来指定监听的网络接口、抓取的数据包数量、抓取的超时时间等。同时，也可以设置过滤条件，只抓取匹配特定协议、源或目的IP地址、端口号等条件的数据包。</a:t>
             </a:r>
-            <a:r>
-              <a:rPr lang="zh-CN" altLang="en-US" sz="2000">
-                <a:sym typeface="+mn-ea"/>
-              </a:rPr>
-              <a:t>窗口：</a:t>
-            </a:r>
-            <a:r>
-              <a:rPr lang="zh-CN" altLang="en-US" sz="2000"/>
-              <a:t>初始化和UI</a:t>
-            </a:r>
-            <a:r>
-              <a:rPr lang="zh-CN" altLang="en-US" sz="2000">
-                <a:sym typeface="+mn-ea"/>
-              </a:rPr>
-              <a:t>窗口</a:t>
-            </a:r>
-            <a:r>
-              <a:rPr lang="zh-CN" altLang="en-US" sz="2000"/>
-              <a:t>。</a:t>
-            </a:r>
-            <a:endParaRPr lang="zh-CN" altLang="en-US" sz="2000"/>
-          </a:p>
-          <a:p>
-            <a:pPr marL="342900" indent="-342900">
-              <a:buAutoNum type="arabicPeriod"/>
+            <a:endParaRPr lang="zh-CN" altLang="en-US" sz="1900">
+              <a:cs typeface="+mn-lt"/>
+            </a:endParaRPr>
+          </a:p>
+          <a:p>
+            <a:pPr indent="457200">
+              <a:buNone/>
             </a:pPr>
             <a:r>
-              <a:rPr lang="zh-CN" altLang="en-US" sz="2000"/>
-              <a:t>菜单栏:法在UI窗口的顶部创建一个菜单栏。它包括文件、统计、分析、主题和设置菜单，每个菜单都有特定的命令和功能。</a:t>
+              <a:rPr lang="zh-CN" altLang="en-US" sz="1900">
+                <a:cs typeface="+mn-lt"/>
+              </a:rPr>
+              <a:t>抓取到的数据包可以通过回调函数进一步处理和显示。可以根据用户的需要，提取数据包中的字段信息并进行展示。可以实时更新界面上的数据包列表，并提供详细信息如源IP地址、目的IP地址、协议类型、时间戳等。</a:t>
             </a:r>
-            <a:endParaRPr lang="zh-CN" altLang="en-US" sz="2000"/>
-          </a:p>
-          <a:p>
-            <a:pPr marL="342900" indent="-342900">
-              <a:buAutoNum type="arabicPeriod"/>
+            <a:endParaRPr lang="zh-CN" altLang="en-US" sz="1900">
+              <a:cs typeface="+mn-lt"/>
+            </a:endParaRPr>
+          </a:p>
+          <a:p>
+            <a:pPr indent="0">
+              <a:buNone/>
             </a:pPr>
             <a:r>
-              <a:rPr lang="zh-CN" altLang="en-US" sz="2000"/>
-              <a:t>过滤输入:filter方法创建一个输入字段，用于捕获过滤表达式，用于过滤捕获的网络数据包。输入字段使用ttkb。类创建具有验证和样式的增强输入字段。</a:t>
+              <a:rPr lang="zh-CN" altLang="en-US" sz="1900">
+                <a:cs typeface="+mn-lt"/>
+              </a:rPr>
+              <a:t>3. 网络数据进行分析和统计</a:t>
             </a:r>
-            <a:endParaRPr lang="zh-CN" altLang="en-US" sz="2000"/>
-          </a:p>
-          <a:p>
-            <a:pPr marL="342900" indent="-342900">
-              <a:buAutoNum type="arabicPeriod"/>
+            <a:endParaRPr lang="zh-CN" altLang="en-US" sz="1900">
+              <a:cs typeface="+mn-lt"/>
+            </a:endParaRPr>
+          </a:p>
+          <a:p>
+            <a:pPr indent="457200">
+              <a:buNone/>
             </a:pPr>
             <a:r>
-              <a:rPr lang="zh-CN" altLang="en-US" sz="2000"/>
-              <a:t>按钮创建:按钮方法创建两个按钮分别用于启动抓包和保存抓包。</a:t>
+              <a:rPr lang="zh-CN" altLang="en-US" sz="1900">
+                <a:cs typeface="+mn-lt"/>
+              </a:rPr>
+              <a:t>使用scapy库设置参数来指定过滤条件捕获网络数据包。将抓取的数据使用scapy进行数据解析，解析多种类型的数据包如TCP、UDP、ICMP。获取源IP地址、目标IP地址和存活时间（TTL）、协议版本、服务类型、数据包长度等信息，并进行流量统计。</a:t>
             </a:r>
-            <a:endParaRPr lang="zh-CN" altLang="en-US" sz="2000"/>
-          </a:p>
-          <a:p>
-            <a:pPr marL="342900" indent="-342900">
-              <a:buAutoNum type="arabicPeriod"/>
+            <a:endParaRPr lang="zh-CN" altLang="en-US" sz="1900">
+              <a:cs typeface="+mn-lt"/>
+            </a:endParaRPr>
+          </a:p>
+          <a:p>
+            <a:pPr indent="0">
+              <a:buNone/>
             </a:pPr>
             <a:r>
-              <a:rPr lang="zh-CN" altLang="en-US" sz="2000"/>
-              <a:t>利用Tkinter库创建图形界面，包括数据包列表的TreeView、协议树和十六进制内容显示区域。</a:t>
+              <a:rPr lang="zh-CN" altLang="en-US" sz="1900">
+                <a:cs typeface="+mn-lt"/>
+              </a:rPr>
+              <a:t>4. 网络数据的储存</a:t>
             </a:r>
-            <a:endParaRPr lang="zh-CN" altLang="en-US" sz="2000"/>
-          </a:p>
-          <a:p>
-            <a:pPr marL="342900" indent="-342900">
-              <a:buAutoNum type="arabicPeriod"/>
+            <a:endParaRPr lang="zh-CN" altLang="en-US" sz="1900">
+              <a:cs typeface="+mn-lt"/>
+            </a:endParaRPr>
+          </a:p>
+          <a:p>
+            <a:pPr indent="457200">
+              <a:buNone/>
             </a:pPr>
             <a:r>
-              <a:rPr lang="zh-CN" altLang="en-US" sz="2000"/>
-              <a:t>使用Threading库创建多个线程，在后台运行一个子线程来抓包，使得界面仍然能够响应用户操作。</a:t>
+              <a:rPr lang="zh-CN" altLang="en-US" sz="1900">
+                <a:cs typeface="+mn-lt"/>
+              </a:rPr>
+              <a:t>常见的选择包括PCAP（Packet Capture）和CSV（Comma-Separated Values）等。在程序中创建一个文件，并将捕获的每个数据包的相关信息写入文件中。对于PCAP文件，使用第三方库，如PyShark，Pcapy或dpkt来直接写入PCAP文件；对于CSV文件，使用Python的csv库来将每个数据包的字段信息写入文件中。包括网络数据的端口，ip地址等。对于PCAP文件，使用相应的库来格式化和写入数据包的原始二进制内容，以及每个数据包的相关信息。</a:t>
             </a:r>
-            <a:endParaRPr lang="zh-CN" altLang="en-US" sz="2000"/>
-          </a:p>
-          <a:p>
-            <a:pPr marL="342900" indent="-342900">
-              <a:buAutoNum type="arabicPeriod"/>
-            </a:pPr>
-            <a:r>
-              <a:rPr lang="zh-CN" altLang="en-US" sz="2000"/>
-              <a:t>使用Scapy库进行数据包的抓取、分析和处理。</a:t>
-            </a:r>
-            <a:endParaRPr lang="zh-CN" altLang="en-US" sz="2000"/>
-          </a:p>
-          <a:p>
-            <a:pPr marL="342900" indent="-342900">
-              <a:buAutoNum type="arabicPeriod"/>
-            </a:pPr>
-            <a:r>
-              <a:rPr lang="zh-CN" altLang="en-US" sz="2000"/>
-              <a:t>利用TreeView显示数据包列表，并通过对表头按钮的点击事件实现数据包列表的排序功能。</a:t>
-            </a:r>
-            <a:endParaRPr lang="zh-CN" altLang="en-US" sz="2000"/>
-          </a:p>
-          <a:p>
-            <a:pPr marL="342900" indent="-342900">
-              <a:buAutoNum type="arabicPeriod"/>
-            </a:pPr>
-            <a:r>
-              <a:rPr lang="zh-CN" altLang="en-US" sz="2000"/>
-              <a:t>通过对协议树的选择，在十六进制内容显示区域中展示选中协议的详细内容。</a:t>
-            </a:r>
-            <a:endParaRPr lang="zh-CN" altLang="en-US" sz="2000"/>
-          </a:p>
-          <a:p>
-            <a:pPr marL="342900" indent="-342900">
-              <a:buAutoNum type="arabicPeriod"/>
-            </a:pPr>
-            <a:r>
-              <a:rPr lang="zh-CN" altLang="en-US" sz="2000"/>
-              <a:t>实现了其他一些功能，如保存抓包、加载数据包、清空数据包表格等。</a:t>
-            </a:r>
-            <a:endParaRPr lang="zh-CN" altLang="en-US" sz="2000"/>
-          </a:p>
-          <a:p>
-            <a:pPr marL="342900" indent="-342900">
-              <a:buAutoNum type="arabicPeriod"/>
-            </a:pPr>
-            <a:r>
-              <a:rPr lang="zh-CN" altLang="en-US" sz="2000"/>
-              <a:t>将抓取的数据包流量保存在本地。</a:t>
-            </a:r>
-            <a:endParaRPr lang="zh-CN" altLang="en-US" sz="2000"/>
-          </a:p>
-          <a:p>
-            <a:pPr marL="342900" indent="-342900">
-              <a:buAutoNum type="arabicPeriod"/>
-            </a:pPr>
-            <a:r>
-              <a:rPr lang="zh-CN" altLang="en-US" sz="2000"/>
-              <a:t>对抓取的数据包做可视化界面，并对数据流量进行分析。</a:t>
-            </a:r>
-            <a:endParaRPr lang="zh-CN" altLang="en-US" sz="2000"/>
+            <a:endParaRPr lang="zh-CN" altLang="en-US" sz="1900">
+              <a:cs typeface="+mn-lt"/>
+            </a:endParaRPr>
           </a:p>
         </p:txBody>
       </p:sp>
@@ -19661,8 +19813,8 @@
         </p:blipFill>
         <p:spPr>
           <a:xfrm>
-            <a:off x="1330325" y="1861185"/>
-            <a:ext cx="7152640" cy="4705985"/>
+            <a:off x="942340" y="2279650"/>
+            <a:ext cx="5716270" cy="3761105"/>
           </a:xfrm>
           <a:prstGeom prst="rect">
             <a:avLst/>
@@ -19706,6 +19858,525 @@
           </a:p>
         </p:txBody>
       </p:sp>
+      <p:pic>
+        <p:nvPicPr>
+          <p:cNvPr id="7" name="图片 6"/>
+          <p:cNvPicPr>
+            <a:picLocks noChangeAspect="1"/>
+          </p:cNvPicPr>
+          <p:nvPr/>
+        </p:nvPicPr>
+        <p:blipFill>
+          <a:blip r:embed="rId9"/>
+          <a:stretch>
+            <a:fillRect/>
+          </a:stretch>
+        </p:blipFill>
+        <p:spPr>
+          <a:xfrm>
+            <a:off x="9766935" y="3185795"/>
+            <a:ext cx="962025" cy="1362075"/>
+          </a:xfrm>
+          <a:prstGeom prst="rect">
+            <a:avLst/>
+          </a:prstGeom>
+        </p:spPr>
+      </p:pic>
+      <p:pic>
+        <p:nvPicPr>
+          <p:cNvPr id="10" name="图片 9"/>
+          <p:cNvPicPr>
+            <a:picLocks noChangeAspect="1"/>
+          </p:cNvPicPr>
+          <p:nvPr/>
+        </p:nvPicPr>
+        <p:blipFill>
+          <a:blip r:embed="rId10"/>
+          <a:stretch>
+            <a:fillRect/>
+          </a:stretch>
+        </p:blipFill>
+        <p:spPr>
+          <a:xfrm>
+            <a:off x="7245350" y="3185795"/>
+            <a:ext cx="2133600" cy="1514475"/>
+          </a:xfrm>
+          <a:prstGeom prst="rect">
+            <a:avLst/>
+          </a:prstGeom>
+        </p:spPr>
+      </p:pic>
+    </p:spTree>
+    <p:custDataLst>
+      <p:tags r:id="rId11"/>
+    </p:custDataLst>
+  </p:cSld>
+  <p:clrMapOvr>
+    <a:masterClrMapping/>
+  </p:clrMapOvr>
+  <p:transition spd="med"/>
+</p:sld>
+</file>
+
+<file path=ppt/slides/slide8.xml><?xml version="1.0" encoding="utf-8"?>
+<p:sld xmlns:a="http://schemas.openxmlformats.org/drawingml/2006/main" xmlns:r="http://schemas.openxmlformats.org/officeDocument/2006/relationships" xmlns:p="http://schemas.openxmlformats.org/presentationml/2006/main">
+  <p:cSld>
+    <p:bg>
+      <p:bgPr>
+        <a:noFill/>
+        <a:effectLst/>
+      </p:bgPr>
+    </p:bg>
+    <p:spTree>
+      <p:nvGrpSpPr>
+        <p:cNvPr id="1" name=""/>
+        <p:cNvGrpSpPr/>
+        <p:nvPr/>
+      </p:nvGrpSpPr>
+      <p:grpSpPr>
+        <a:xfrm>
+          <a:off x="0" y="0"/>
+          <a:ext cx="0" cy="0"/>
+          <a:chOff x="0" y="0"/>
+          <a:chExt cx="0" cy="0"/>
+        </a:xfrm>
+      </p:grpSpPr>
+      <p:grpSp>
+        <p:nvGrpSpPr>
+          <p:cNvPr id="12" name="组合 11"/>
+          <p:cNvGrpSpPr/>
+          <p:nvPr userDrawn="1">
+            <p:custDataLst>
+              <p:tags r:id="rId1"/>
+            </p:custDataLst>
+          </p:nvPr>
+        </p:nvGrpSpPr>
+        <p:grpSpPr>
+          <a:xfrm>
+            <a:off x="10638971" y="5416757"/>
+            <a:ext cx="1553029" cy="1432837"/>
+            <a:chOff x="10898414" y="5656121"/>
+            <a:chExt cx="1293586" cy="1193473"/>
+          </a:xfrm>
+        </p:grpSpPr>
+        <p:sp>
+          <p:nvSpPr>
+            <p:cNvPr id="13" name="任意多边形: 形状 12"/>
+            <p:cNvSpPr/>
+            <p:nvPr>
+              <p:custDataLst>
+                <p:tags r:id="rId2"/>
+              </p:custDataLst>
+            </p:nvPr>
+          </p:nvSpPr>
+          <p:spPr>
+            <a:xfrm>
+              <a:off x="10898414" y="6156789"/>
+              <a:ext cx="678846" cy="692805"/>
+            </a:xfrm>
+            <a:custGeom>
+              <a:avLst/>
+              <a:gdLst>
+                <a:gd name="connsiteX0" fmla="*/ 551985 w 826176"/>
+                <a:gd name="connsiteY0" fmla="*/ 0 h 843164"/>
+                <a:gd name="connsiteX1" fmla="*/ 826176 w 826176"/>
+                <a:gd name="connsiteY1" fmla="*/ 418831 h 843164"/>
+                <a:gd name="connsiteX2" fmla="*/ 551984 w 826176"/>
+                <a:gd name="connsiteY2" fmla="*/ 843164 h 843164"/>
+                <a:gd name="connsiteX3" fmla="*/ 0 w 826176"/>
+                <a:gd name="connsiteY3" fmla="*/ 843164 h 843164"/>
+              </a:gdLst>
+              <a:ahLst/>
+              <a:cxnLst>
+                <a:cxn ang="0">
+                  <a:pos x="connsiteX0" y="connsiteY0"/>
+                </a:cxn>
+                <a:cxn ang="0">
+                  <a:pos x="connsiteX1" y="connsiteY1"/>
+                </a:cxn>
+                <a:cxn ang="0">
+                  <a:pos x="connsiteX2" y="connsiteY2"/>
+                </a:cxn>
+                <a:cxn ang="0">
+                  <a:pos x="connsiteX3" y="connsiteY3"/>
+                </a:cxn>
+              </a:cxnLst>
+              <a:rect l="l" t="t" r="r" b="b"/>
+              <a:pathLst>
+                <a:path w="826176" h="843164">
+                  <a:moveTo>
+                    <a:pt x="551985" y="0"/>
+                  </a:moveTo>
+                  <a:lnTo>
+                    <a:pt x="826176" y="418831"/>
+                  </a:lnTo>
+                  <a:lnTo>
+                    <a:pt x="551984" y="843164"/>
+                  </a:lnTo>
+                  <a:lnTo>
+                    <a:pt x="0" y="843164"/>
+                  </a:lnTo>
+                  <a:close/>
+                </a:path>
+              </a:pathLst>
+            </a:custGeom>
+            <a:solidFill>
+              <a:schemeClr val="accent2"/>
+            </a:solidFill>
+            <a:ln>
+              <a:noFill/>
+            </a:ln>
+          </p:spPr>
+          <p:style>
+            <a:lnRef idx="2">
+              <a:schemeClr val="accent1">
+                <a:shade val="50000"/>
+              </a:schemeClr>
+            </a:lnRef>
+            <a:fillRef idx="1">
+              <a:schemeClr val="accent1"/>
+            </a:fillRef>
+            <a:effectRef idx="0">
+              <a:schemeClr val="accent1"/>
+            </a:effectRef>
+            <a:fontRef idx="minor">
+              <a:schemeClr val="lt1"/>
+            </a:fontRef>
+          </p:style>
+          <p:txBody>
+            <a:bodyPr wrap="square" rtlCol="0" anchor="ctr">
+              <a:noAutofit/>
+            </a:bodyPr>
+            <a:p>
+              <a:pPr algn="ctr"/>
+              <a:r>
+                <a:rPr kumimoji="1" lang="zh-CN" altLang="en-US" dirty="0">
+                  <a:solidFill>
+                    <a:schemeClr val="dk1">
+                      <a:lumMod val="85000"/>
+                      <a:lumOff val="15000"/>
+                    </a:schemeClr>
+                  </a:solidFill>
+                  <a:latin typeface="微软雅黑" panose="020B0503020204020204" charset="-122"/>
+                  <a:ea typeface="微软雅黑" panose="020B0503020204020204" charset="-122"/>
+                </a:rPr>
+                <a:t> </a:t>
+              </a:r>
+              <a:endParaRPr kumimoji="1" lang="zh-CN" altLang="en-US" dirty="0">
+                <a:solidFill>
+                  <a:schemeClr val="dk1">
+                    <a:lumMod val="85000"/>
+                    <a:lumOff val="15000"/>
+                  </a:schemeClr>
+                </a:solidFill>
+                <a:latin typeface="微软雅黑" panose="020B0503020204020204" charset="-122"/>
+                <a:ea typeface="微软雅黑" panose="020B0503020204020204" charset="-122"/>
+              </a:endParaRPr>
+            </a:p>
+          </p:txBody>
+        </p:sp>
+        <p:sp>
+          <p:nvSpPr>
+            <p:cNvPr id="18" name="三角形 7"/>
+            <p:cNvSpPr/>
+            <p:nvPr>
+              <p:custDataLst>
+                <p:tags r:id="rId3"/>
+              </p:custDataLst>
+            </p:nvPr>
+          </p:nvSpPr>
+          <p:spPr>
+            <a:xfrm>
+              <a:off x="11420811" y="5656121"/>
+              <a:ext cx="771189" cy="1193473"/>
+            </a:xfrm>
+            <a:prstGeom prst="triangle">
+              <a:avLst>
+                <a:gd name="adj" fmla="val 100000"/>
+              </a:avLst>
+            </a:prstGeom>
+            <a:solidFill>
+              <a:schemeClr val="accent2"/>
+            </a:solidFill>
+            <a:ln>
+              <a:noFill/>
+            </a:ln>
+          </p:spPr>
+          <p:style>
+            <a:lnRef idx="2">
+              <a:schemeClr val="accent1">
+                <a:shade val="50000"/>
+              </a:schemeClr>
+            </a:lnRef>
+            <a:fillRef idx="1">
+              <a:schemeClr val="accent1"/>
+            </a:fillRef>
+            <a:effectRef idx="0">
+              <a:schemeClr val="accent1"/>
+            </a:effectRef>
+            <a:fontRef idx="minor">
+              <a:schemeClr val="lt1"/>
+            </a:fontRef>
+          </p:style>
+          <p:txBody>
+            <a:bodyPr rtlCol="0" anchor="ctr"/>
+            <a:p>
+              <a:pPr algn="ctr"/>
+              <a:endParaRPr kumimoji="1" lang="zh-CN" altLang="en-US" dirty="0">
+                <a:solidFill>
+                  <a:schemeClr val="dk1">
+                    <a:lumMod val="85000"/>
+                    <a:lumOff val="15000"/>
+                  </a:schemeClr>
+                </a:solidFill>
+                <a:latin typeface="微软雅黑" panose="020B0503020204020204" charset="-122"/>
+                <a:ea typeface="微软雅黑" panose="020B0503020204020204" charset="-122"/>
+              </a:endParaRPr>
+            </a:p>
+          </p:txBody>
+        </p:sp>
+        <p:sp>
+          <p:nvSpPr>
+            <p:cNvPr id="19" name="三角形 8"/>
+            <p:cNvSpPr/>
+            <p:nvPr>
+              <p:custDataLst>
+                <p:tags r:id="rId4"/>
+              </p:custDataLst>
+            </p:nvPr>
+          </p:nvSpPr>
+          <p:spPr>
+            <a:xfrm rot="10800000">
+              <a:off x="11408088" y="6156530"/>
+              <a:ext cx="405290" cy="300624"/>
+            </a:xfrm>
+            <a:prstGeom prst="triangle">
+              <a:avLst/>
+            </a:prstGeom>
+            <a:solidFill>
+              <a:schemeClr val="accent3"/>
+            </a:solidFill>
+            <a:ln>
+              <a:noFill/>
+            </a:ln>
+          </p:spPr>
+          <p:style>
+            <a:lnRef idx="2">
+              <a:schemeClr val="accent1">
+                <a:shade val="50000"/>
+              </a:schemeClr>
+            </a:lnRef>
+            <a:fillRef idx="1">
+              <a:schemeClr val="accent1"/>
+            </a:fillRef>
+            <a:effectRef idx="0">
+              <a:schemeClr val="accent1"/>
+            </a:effectRef>
+            <a:fontRef idx="minor">
+              <a:schemeClr val="lt1"/>
+            </a:fontRef>
+          </p:style>
+          <p:txBody>
+            <a:bodyPr rtlCol="0" anchor="ctr"/>
+            <a:p>
+              <a:pPr algn="ctr"/>
+              <a:endParaRPr kumimoji="1" lang="zh-CN" altLang="en-US">
+                <a:solidFill>
+                  <a:schemeClr val="dk1">
+                    <a:lumMod val="85000"/>
+                    <a:lumOff val="15000"/>
+                  </a:schemeClr>
+                </a:solidFill>
+                <a:latin typeface="微软雅黑" panose="020B0503020204020204" charset="-122"/>
+                <a:ea typeface="微软雅黑" panose="020B0503020204020204" charset="-122"/>
+              </a:endParaRPr>
+            </a:p>
+          </p:txBody>
+        </p:sp>
+      </p:grpSp>
+      <p:cxnSp>
+        <p:nvCxnSpPr>
+          <p:cNvPr id="3" name="直接连接符 2"/>
+          <p:cNvCxnSpPr/>
+          <p:nvPr>
+            <p:custDataLst>
+              <p:tags r:id="rId5"/>
+            </p:custDataLst>
+          </p:nvPr>
+        </p:nvCxnSpPr>
+        <p:spPr>
+          <a:xfrm>
+            <a:off x="457204" y="914407"/>
+            <a:ext cx="11277690" cy="12700"/>
+          </a:xfrm>
+          <a:prstGeom prst="line">
+            <a:avLst/>
+          </a:prstGeom>
+          <a:ln w="31750">
+            <a:solidFill>
+              <a:schemeClr val="accent1"/>
+            </a:solidFill>
+          </a:ln>
+        </p:spPr>
+        <p:style>
+          <a:lnRef idx="1">
+            <a:schemeClr val="dk1"/>
+          </a:lnRef>
+          <a:fillRef idx="0">
+            <a:schemeClr val="dk1"/>
+          </a:fillRef>
+          <a:effectRef idx="0">
+            <a:schemeClr val="dk1"/>
+          </a:effectRef>
+          <a:fontRef idx="minor">
+            <a:schemeClr val="tx1"/>
+          </a:fontRef>
+        </p:style>
+      </p:cxnSp>
+      <p:sp>
+        <p:nvSpPr>
+          <p:cNvPr id="9" name="文本框 6"/>
+          <p:cNvSpPr txBox="1"/>
+          <p:nvPr>
+            <p:custDataLst>
+              <p:tags r:id="rId6"/>
+            </p:custDataLst>
+          </p:nvPr>
+        </p:nvSpPr>
+        <p:spPr>
+          <a:xfrm>
+            <a:off x="459744" y="152401"/>
+            <a:ext cx="11277690" cy="609605"/>
+          </a:xfrm>
+          <a:prstGeom prst="rect">
+            <a:avLst/>
+          </a:prstGeom>
+          <a:noFill/>
+          <a:ln w="12700">
+            <a:miter lim="400000"/>
+          </a:ln>
+          <a:extLst>
+            <a:ext uri="{909E8E84-426E-40DD-AFC4-6F175D3DCCD1}">
+              <a14:hiddenFill xmlns:a14="http://schemas.microsoft.com/office/drawing/2010/main">
+                <a:solidFill>
+                  <a:schemeClr val="accent1"/>
+                </a:solidFill>
+              </a14:hiddenFill>
+            </a:ext>
+          </a:extLst>
+        </p:spPr>
+        <p:txBody>
+          <a:bodyPr lIns="0" tIns="0" rIns="0" bIns="0" anchor="ctr" anchorCtr="0">
+            <a:noAutofit/>
+          </a:bodyPr>
+          <a:lstStyle>
+            <a:defPPr>
+              <a:defRPr lang="zh-CN"/>
+            </a:defPPr>
+            <a:lvl1pPr>
+              <a:lnSpc>
+                <a:spcPct val="120000"/>
+              </a:lnSpc>
+              <a:defRPr sz="3600" b="1">
+                <a:solidFill>
+                  <a:srgbClr val="FFFFFF"/>
+                </a:solidFill>
+                <a:latin typeface="微软雅黑" panose="020B0503020204020204" charset="-122"/>
+                <a:ea typeface="微软雅黑" panose="020B0503020204020204" charset="-122"/>
+                <a:cs typeface="微软雅黑" panose="020B0503020204020204" charset="-122"/>
+              </a:defRPr>
+            </a:lvl1pPr>
+          </a:lstStyle>
+          <a:p>
+            <a:pPr>
+              <a:lnSpc>
+                <a:spcPct val="100000"/>
+              </a:lnSpc>
+            </a:pPr>
+            <a:r>
+              <a:rPr lang="zh-CN" altLang="en-US" sz="4000" dirty="0" err="1">
+                <a:solidFill>
+                  <a:schemeClr val="dk1"/>
+                </a:solidFill>
+                <a:latin typeface="微软雅黑" panose="020B0503020204020204" charset="-122"/>
+                <a:ea typeface="微软雅黑" panose="020B0503020204020204" charset="-122"/>
+                <a:cs typeface="微软雅黑" panose="020B0503020204020204" charset="-122"/>
+                <a:sym typeface="微软雅黑" panose="020B0503020204020204" charset="-122"/>
+              </a:rPr>
+              <a:t>目前进度</a:t>
+            </a:r>
+            <a:r>
+              <a:rPr lang="en-US" altLang="zh-CN" sz="4000" dirty="0" err="1">
+                <a:solidFill>
+                  <a:schemeClr val="dk1"/>
+                </a:solidFill>
+                <a:latin typeface="微软雅黑" panose="020B0503020204020204" charset="-122"/>
+                <a:ea typeface="微软雅黑" panose="020B0503020204020204" charset="-122"/>
+                <a:cs typeface="微软雅黑" panose="020B0503020204020204" charset="-122"/>
+                <a:sym typeface="微软雅黑" panose="020B0503020204020204" charset="-122"/>
+              </a:rPr>
+              <a:t>		</a:t>
+            </a:r>
+            <a:endParaRPr lang="en-US" altLang="zh-CN" sz="4000" dirty="0" err="1">
+              <a:solidFill>
+                <a:schemeClr val="dk1"/>
+              </a:solidFill>
+              <a:latin typeface="微软雅黑" panose="020B0503020204020204" charset="-122"/>
+              <a:ea typeface="微软雅黑" panose="020B0503020204020204" charset="-122"/>
+              <a:cs typeface="微软雅黑" panose="020B0503020204020204" charset="-122"/>
+              <a:sym typeface="微软雅黑" panose="020B0503020204020204" charset="-122"/>
+            </a:endParaRPr>
+          </a:p>
+        </p:txBody>
+      </p:sp>
+      <p:pic>
+        <p:nvPicPr>
+          <p:cNvPr id="4" name="图片 3"/>
+          <p:cNvPicPr>
+            <a:picLocks noChangeAspect="1"/>
+          </p:cNvPicPr>
+          <p:nvPr/>
+        </p:nvPicPr>
+        <p:blipFill>
+          <a:blip r:embed="rId7"/>
+          <a:stretch>
+            <a:fillRect/>
+          </a:stretch>
+        </p:blipFill>
+        <p:spPr>
+          <a:xfrm>
+            <a:off x="5543550" y="1291590"/>
+            <a:ext cx="5588635" cy="4030980"/>
+          </a:xfrm>
+          <a:prstGeom prst="rect">
+            <a:avLst/>
+          </a:prstGeom>
+        </p:spPr>
+      </p:pic>
+      <p:pic>
+        <p:nvPicPr>
+          <p:cNvPr id="5" name="图片 4"/>
+          <p:cNvPicPr>
+            <a:picLocks noChangeAspect="1"/>
+          </p:cNvPicPr>
+          <p:nvPr/>
+        </p:nvPicPr>
+        <p:blipFill>
+          <a:blip r:embed="rId8"/>
+          <a:stretch>
+            <a:fillRect/>
+          </a:stretch>
+        </p:blipFill>
+        <p:spPr>
+          <a:xfrm>
+            <a:off x="243840" y="2961005"/>
+            <a:ext cx="6150610" cy="3287395"/>
+          </a:xfrm>
+          <a:prstGeom prst="rect">
+            <a:avLst/>
+          </a:prstGeom>
+        </p:spPr>
+      </p:pic>
     </p:spTree>
     <p:custDataLst>
       <p:tags r:id="rId9"/>
@@ -19718,7 +20389,7 @@
 </p:sld>
 </file>
 
-<file path=ppt/slides/slide8.xml><?xml version="1.0" encoding="utf-8"?>
+<file path=ppt/slides/slide9.xml><?xml version="1.0" encoding="utf-8"?>
 <p:sld xmlns:a="http://schemas.openxmlformats.org/drawingml/2006/main" xmlns:r="http://schemas.openxmlformats.org/officeDocument/2006/relationships" xmlns:p="http://schemas.openxmlformats.org/presentationml/2006/main">
   <p:cSld>
     <p:spTree>
@@ -21921,144 +22592,35 @@
 
 <file path=ppt/tags/tag212.xml><?xml version="1.0" encoding="utf-8"?>
 <p:tagLst xmlns:p="http://schemas.openxmlformats.org/presentationml/2006/main">
-  <p:tag name="KSO_WM_SLIDE_ID" val="diagram20220058_1"/>
-  <p:tag name="KSO_WM_TEMPLATE_SUBCATEGORY" val="25"/>
-  <p:tag name="KSO_WM_TEMPLATE_MASTER_TYPE" val="0"/>
-  <p:tag name="KSO_WM_TEMPLATE_COLOR_TYPE" val="0"/>
-  <p:tag name="KSO_WM_SLIDE_ITEM_CNT" val="0"/>
-  <p:tag name="KSO_WM_SLIDE_INDEX" val="1"/>
-  <p:tag name="KSO_WM_TAG_VERSION" val="1.0"/>
-  <p:tag name="KSO_WM_BEAUTIFY_FLAG" val="#wm#"/>
-  <p:tag name="KSO_WM_TEMPLATE_CATEGORY" val="diagram"/>
-  <p:tag name="KSO_WM_TEMPLATE_INDEX" val="20220058"/>
-  <p:tag name="KSO_WM_SLIDE_LAYOUT" val="a_d"/>
-  <p:tag name="KSO_WM_SLIDE_LAYOUT_CNT" val="1_1"/>
-  <p:tag name="KSO_WM_SLIDE_TYPE" val="text"/>
-  <p:tag name="KSO_WM_SLIDE_SUBTYPE" val="picTxt"/>
-  <p:tag name="KSO_WM_SLIDE_LAYOUTTYPE" val="topbottom"/>
-  <p:tag name="KSO_WM_SLIDE_SIZE" val="888*504"/>
-  <p:tag name="KSO_WM_SLIDE_POSITION" val="36*12"/>
-  <p:tag name="KSO_WM_SLIDE_LAYOUT_INFO" val="{&quot;backgroundInfo&quot;:[{&quot;bottom&quot;:0,&quot;bottomAbs&quot;:false,&quot;left&quot;:0,&quot;leftAbs&quot;:false,&quot;right&quot;:0,&quot;rightAbs&quot;:false,&quot;top&quot;:0,&quot;topAbs&quot;:false,&quot;type&quot;:&quot;general&quot;}],&quot;id&quot;:&quot;2023-04-06T22:45:45&quot;,&quot;maxSize&quot;:{&quot;size1&quot;:20},&quot;minSize&quot;:{&quot;size1&quot;:11.2},&quot;normalSize&quot;:{&quot;size1&quot;:11.2},&quot;subLayout&quot;:[{&quot;id&quot;:&quot;2023-04-06T22:45:45&quot;,&quot;margin&quot;:{&quot;bottom&quot;:0.025999998673796654,&quot;left&quot;:1.2699999809265137,&quot;right&quot;:1.2699999809265137,&quot;top&quot;:0.4230000376701355},&quot;type&quot;:0},{&quot;id&quot;:&quot;2023-04-06T22:45:45&quot;,&quot;margin&quot;:{&quot;bottom&quot;:0.847000002861023,&quot;left&quot;:1.2699999809265137,&quot;right&quot;:1.2699999809265137,&quot;top&quot;:1.2699999809265137},&quot;type&quot;:0}],&quot;type&quot;:0}"/>
-  <p:tag name="KSO_WM_SLIDE_RATIO" val="1.777778"/>
-  <p:tag name="KSO_WM_SLIDE_BACKGROUND" val="[&quot;general&quot;]"/>
-  <p:tag name="KSO_WM_SLIDE_BACKGROUND_TYPE" val="general"/>
-  <p:tag name="KSO_WM_SLIDE_BK_DARK_LIGHT" val="2"/>
-  <p:tag name="KSO_WM_SPECIAL_SOURCE" val="bdnull"/>
-</p:tagLst>
-</file>
-
-<file path=ppt/tags/tag213.xml><?xml version="1.0" encoding="utf-8"?>
-<p:tagLst xmlns:p="http://schemas.openxmlformats.org/presentationml/2006/main">
-  <p:tag name="KSO_WM_SLIDE_BACKGROUND_TYPE" val="general"/>
-  <p:tag name="KSO_WM_SLIDE_BK_DARK_LIGHT" val="2"/>
+  <p:tag name="KSO_WM_UNIT_ISCONTENTSTITLE" val="0"/>
+  <p:tag name="KSO_WM_UNIT_ISNUMDGMTITLE" val="0"/>
+  <p:tag name="KSO_WM_UNIT_PRESET_TEXT" val="线型上下导航版"/>
+  <p:tag name="KSO_WM_UNIT_NOCLEAR" val="0"/>
   <p:tag name="KSO_WM_UNIT_HIGHLIGHT" val="0"/>
   <p:tag name="KSO_WM_UNIT_COMPATIBLE" val="0"/>
   <p:tag name="KSO_WM_UNIT_DIAGRAM_ISNUMVISUAL" val="0"/>
   <p:tag name="KSO_WM_UNIT_DIAGRAM_ISREFERUNIT" val="0"/>
-  <p:tag name="KSO_WM_UNIT_TYPE" val="i"/>
+  <p:tag name="KSO_WM_UNIT_TYPE" val="a"/>
   <p:tag name="KSO_WM_UNIT_INDEX" val="1"/>
-  <p:tag name="KSO_WM_UNIT_ID" val="_12*i*1"/>
-  <p:tag name="KSO_WM_UNIT_LAYERLEVEL" val="1"/>
-  <p:tag name="KSO_WM_TAG_VERSION" val="1.0"/>
-  <p:tag name="KSO_WM_BEAUTIFY_FLAG" val="#wm#"/>
-</p:tagLst>
-</file>
-
-<file path=ppt/tags/tag214.xml><?xml version="1.0" encoding="utf-8"?>
-<p:tagLst xmlns:p="http://schemas.openxmlformats.org/presentationml/2006/main">
-  <p:tag name="KSO_WM_SLIDE_BACKGROUND_TYPE" val="general"/>
-  <p:tag name="KSO_WM_SLIDE_BK_DARK_LIGHT" val="2"/>
-  <p:tag name="KSO_WM_UNIT_HIGHLIGHT" val="0"/>
-  <p:tag name="KSO_WM_UNIT_COMPATIBLE" val="0"/>
-  <p:tag name="KSO_WM_UNIT_DIAGRAM_ISNUMVISUAL" val="0"/>
-  <p:tag name="KSO_WM_UNIT_DIAGRAM_ISREFERUNIT" val="0"/>
-  <p:tag name="KSO_WM_UNIT_TYPE" val="i"/>
-  <p:tag name="KSO_WM_UNIT_INDEX" val="2"/>
-  <p:tag name="KSO_WM_UNIT_ID" val="_12*i*2"/>
-  <p:tag name="KSO_WM_UNIT_LAYERLEVEL" val="1"/>
-  <p:tag name="KSO_WM_TAG_VERSION" val="1.0"/>
-  <p:tag name="KSO_WM_BEAUTIFY_FLAG" val="#wm#"/>
-  <p:tag name="KSO_WM_UNIT_FILL_FORE_SCHEMECOLOR_INDEX_BRIGHTNESS" val="0"/>
-  <p:tag name="KSO_WM_UNIT_FILL_FORE_SCHEMECOLOR_INDEX" val="6"/>
-  <p:tag name="KSO_WM_UNIT_FILL_TYPE" val="1"/>
-  <p:tag name="KSO_WM_UNIT_TEXT_FILL_FORE_SCHEMECOLOR_INDEX_BRIGHTNESS" val="0.15"/>
-  <p:tag name="KSO_WM_UNIT_TEXT_FILL_FORE_SCHEMECOLOR_INDEX" val="13"/>
-  <p:tag name="KSO_WM_UNIT_TEXT_FILL_TYPE" val="1"/>
-</p:tagLst>
-</file>
-
-<file path=ppt/tags/tag215.xml><?xml version="1.0" encoding="utf-8"?>
-<p:tagLst xmlns:p="http://schemas.openxmlformats.org/presentationml/2006/main">
-  <p:tag name="KSO_WM_SLIDE_BACKGROUND_TYPE" val="general"/>
-  <p:tag name="KSO_WM_SLIDE_BK_DARK_LIGHT" val="2"/>
-  <p:tag name="KSO_WM_UNIT_HIGHLIGHT" val="0"/>
-  <p:tag name="KSO_WM_UNIT_COMPATIBLE" val="0"/>
-  <p:tag name="KSO_WM_UNIT_DIAGRAM_ISNUMVISUAL" val="0"/>
-  <p:tag name="KSO_WM_UNIT_DIAGRAM_ISREFERUNIT" val="0"/>
-  <p:tag name="KSO_WM_UNIT_TYPE" val="i"/>
-  <p:tag name="KSO_WM_UNIT_INDEX" val="3"/>
-  <p:tag name="KSO_WM_UNIT_ID" val="_12*i*3"/>
-  <p:tag name="KSO_WM_UNIT_LAYERLEVEL" val="1"/>
-  <p:tag name="KSO_WM_TAG_VERSION" val="1.0"/>
-  <p:tag name="KSO_WM_BEAUTIFY_FLAG" val="#wm#"/>
-  <p:tag name="KSO_WM_UNIT_FILL_FORE_SCHEMECOLOR_INDEX_BRIGHTNESS" val="0"/>
-  <p:tag name="KSO_WM_UNIT_FILL_FORE_SCHEMECOLOR_INDEX" val="6"/>
-  <p:tag name="KSO_WM_UNIT_FILL_TYPE" val="1"/>
-  <p:tag name="KSO_WM_UNIT_TEXT_FILL_FORE_SCHEMECOLOR_INDEX_BRIGHTNESS" val="0.15"/>
-  <p:tag name="KSO_WM_UNIT_TEXT_FILL_FORE_SCHEMECOLOR_INDEX" val="13"/>
-  <p:tag name="KSO_WM_UNIT_TEXT_FILL_TYPE" val="1"/>
-</p:tagLst>
-</file>
-
-<file path=ppt/tags/tag216.xml><?xml version="1.0" encoding="utf-8"?>
-<p:tagLst xmlns:p="http://schemas.openxmlformats.org/presentationml/2006/main">
-  <p:tag name="KSO_WM_SLIDE_BACKGROUND_TYPE" val="general"/>
-  <p:tag name="KSO_WM_SLIDE_BK_DARK_LIGHT" val="2"/>
-  <p:tag name="KSO_WM_UNIT_HIGHLIGHT" val="0"/>
-  <p:tag name="KSO_WM_UNIT_COMPATIBLE" val="0"/>
-  <p:tag name="KSO_WM_UNIT_DIAGRAM_ISNUMVISUAL" val="0"/>
-  <p:tag name="KSO_WM_UNIT_DIAGRAM_ISREFERUNIT" val="0"/>
-  <p:tag name="KSO_WM_UNIT_TYPE" val="i"/>
-  <p:tag name="KSO_WM_UNIT_INDEX" val="4"/>
-  <p:tag name="KSO_WM_UNIT_ID" val="_12*i*4"/>
-  <p:tag name="KSO_WM_UNIT_LAYERLEVEL" val="1"/>
-  <p:tag name="KSO_WM_TAG_VERSION" val="1.0"/>
-  <p:tag name="KSO_WM_BEAUTIFY_FLAG" val="#wm#"/>
-  <p:tag name="KSO_WM_UNIT_FILL_FORE_SCHEMECOLOR_INDEX_BRIGHTNESS" val="0"/>
-  <p:tag name="KSO_WM_UNIT_FILL_FORE_SCHEMECOLOR_INDEX" val="7"/>
-  <p:tag name="KSO_WM_UNIT_FILL_TYPE" val="1"/>
-  <p:tag name="KSO_WM_UNIT_TEXT_FILL_FORE_SCHEMECOLOR_INDEX_BRIGHTNESS" val="0.15"/>
-  <p:tag name="KSO_WM_UNIT_TEXT_FILL_FORE_SCHEMECOLOR_INDEX" val="13"/>
-  <p:tag name="KSO_WM_UNIT_TEXT_FILL_TYPE" val="1"/>
-</p:tagLst>
-</file>
-
-<file path=ppt/tags/tag217.xml><?xml version="1.0" encoding="utf-8"?>
-<p:tagLst xmlns:p="http://schemas.openxmlformats.org/presentationml/2006/main">
-  <p:tag name="KSO_WM_UNIT_HIGHLIGHT" val="0"/>
-  <p:tag name="KSO_WM_UNIT_COMPATIBLE" val="0"/>
-  <p:tag name="KSO_WM_UNIT_DIAGRAM_ISNUMVISUAL" val="0"/>
-  <p:tag name="KSO_WM_UNIT_DIAGRAM_ISREFERUNIT" val="0"/>
-  <p:tag name="KSO_WM_UNIT_TYPE" val="i"/>
-  <p:tag name="KSO_WM_UNIT_INDEX" val="1"/>
-  <p:tag name="KSO_WM_UNIT_ID" val="diagram20220058_1*i*1"/>
+  <p:tag name="KSO_WM_UNIT_ID" val="diagram20220058_1*a*1"/>
   <p:tag name="KSO_WM_TEMPLATE_CATEGORY" val="diagram"/>
   <p:tag name="KSO_WM_TEMPLATE_INDEX" val="20220058"/>
   <p:tag name="KSO_WM_UNIT_LAYERLEVEL" val="1"/>
   <p:tag name="KSO_WM_TAG_VERSION" val="1.0"/>
   <p:tag name="KSO_WM_BEAUTIFY_FLAG" val="#wm#"/>
+  <p:tag name="KSO_WM_UNIT_VALUE" val="27"/>
   <p:tag name="KSO_WM_UNIT_BLOCK" val="0"/>
-  <p:tag name="KSO_WM_UNIT_SM_LIMIT_TYPE" val="0"/>
-  <p:tag name="KSO_WM_UNIT_DEC_AREA_ID" val="401453a90b9f4fd5b1215058b8a2f2e8"/>
-  <p:tag name="KSO_WM_UNIT_DECORATE_INFO" val="{&quot;ReferentInfo&quot;:{&quot;Id&quot;:&quot;2d2094633d9c481aa0d84a95a0159686&quot;,&quot;X&quot;:{&quot;Pos&quot;:1},&quot;Y&quot;:{&quot;Pos&quot;:2}},&quot;DecorateInfoX&quot;:{&quot;Pos&quot;:1,&quot;IsAbs&quot;:true},&quot;DecorateInfoY&quot;:{&quot;Pos&quot;:0,&quot;IsAbs&quot;:true},&quot;DecorateInfoW&quot;:{&quot;IsAbs&quot;:true},&quot;DecorateInfoH&quot;:{&quot;IsAbs&quot;:true},&quot;whChangeMode&quot;:0}"/>
-  <p:tag name="KSO_WM_UNIT_LINE_FORE_SCHEMECOLOR_INDEX_BRIGHTNESS" val="0"/>
-  <p:tag name="KSO_WM_UNIT_LINE_FORE_SCHEMECOLOR_INDEX" val="5"/>
-  <p:tag name="KSO_WM_UNIT_LINE_FILL_TYPE" val="2"/>
-  <p:tag name="WM_BEAUTIFY_ZORDER_FLAG_TAG" val="1"/>
+  <p:tag name="KSO_WM_UNIT_SM_LIMIT_TYPE" val="2"/>
+  <p:tag name="KSO_WM_UNIT_DEC_AREA_ID" val="2d2094633d9c481aa0d84a95a0159686"/>
+  <p:tag name="KSO_WM_UNIT_DECORATE_INFO" val="{&quot;ReferentInfo&quot;:{&quot;Id&quot;:&quot;slide&quot;,&quot;X&quot;:{&quot;Pos&quot;:0},&quot;Y&quot;:{&quot;Pos&quot;:0}},&quot;DecorateInfoX&quot;:{&quot;Pos&quot;:0,&quot;IsAbs&quot;:false},&quot;DecorateInfoY&quot;:{&quot;Pos&quot;:0,&quot;IsAbs&quot;:false},&quot;DecorateInfoW&quot;:{&quot;IsAbs&quot;:false},&quot;DecorateInfoH&quot;:{&quot;IsAbs&quot;:false},&quot;whChangeMode&quot;:0}"/>
+  <p:tag name="KSO_WM_UNIT_TEXT_FILL_FORE_SCHEMECOLOR_INDEX_BRIGHTNESS" val="0"/>
+  <p:tag name="KSO_WM_UNIT_TEXT_FILL_FORE_SCHEMECOLOR_INDEX" val="13"/>
+  <p:tag name="KSO_WM_UNIT_TEXT_FILL_TYPE" val="1"/>
+  <p:tag name="WM_BEAUTIFY_ZORDER_FLAG_TAG" val="2"/>
 </p:tagLst>
 </file>
 
-<file path=ppt/tags/tag218.xml><?xml version="1.0" encoding="utf-8"?>
+<file path=ppt/tags/tag213.xml><?xml version="1.0" encoding="utf-8"?>
 <p:tagLst xmlns:p="http://schemas.openxmlformats.org/presentationml/2006/main">
   <p:tag name="KSO_WM_SLIDE_ID" val="diagram20220058_1"/>
   <p:tag name="KSO_WM_TEMPLATE_SUBCATEGORY" val="25"/>
@@ -22086,7 +22648,7 @@
 </p:tagLst>
 </file>
 
-<file path=ppt/tags/tag219.xml><?xml version="1.0" encoding="utf-8"?>
+<file path=ppt/tags/tag214.xml><?xml version="1.0" encoding="utf-8"?>
 <p:tagLst xmlns:p="http://schemas.openxmlformats.org/presentationml/2006/main">
   <p:tag name="KSO_WM_SLIDE_BACKGROUND_TYPE" val="general"/>
   <p:tag name="KSO_WM_SLIDE_BK_DARK_LIGHT" val="2"/>
@@ -22103,20 +22665,7 @@
 </p:tagLst>
 </file>
 
-<file path=ppt/tags/tag22.xml><?xml version="1.0" encoding="utf-8"?>
-<p:tagLst xmlns:p="http://schemas.openxmlformats.org/presentationml/2006/main">
-  <p:tag name="KSO_WM_UNIT_HIGHLIGHT" val="0"/>
-  <p:tag name="KSO_WM_UNIT_COMPATIBLE" val="0"/>
-  <p:tag name="KSO_WM_UNIT_DIAGRAM_ISNUMVISUAL" val="0"/>
-  <p:tag name="KSO_WM_UNIT_DIAGRAM_ISREFERUNIT" val="0"/>
-  <p:tag name="KSO_WM_UNIT_ID" val="_2**"/>
-  <p:tag name="KSO_WM_UNIT_LAYERLEVEL" val="1"/>
-  <p:tag name="KSO_WM_TAG_VERSION" val="1.0"/>
-  <p:tag name="KSO_WM_BEAUTIFY_FLAG" val="#wm#"/>
-</p:tagLst>
-</file>
-
-<file path=ppt/tags/tag220.xml><?xml version="1.0" encoding="utf-8"?>
+<file path=ppt/tags/tag215.xml><?xml version="1.0" encoding="utf-8"?>
 <p:tagLst xmlns:p="http://schemas.openxmlformats.org/presentationml/2006/main">
   <p:tag name="KSO_WM_SLIDE_BACKGROUND_TYPE" val="general"/>
   <p:tag name="KSO_WM_SLIDE_BK_DARK_LIGHT" val="2"/>
@@ -22139,7 +22688,7 @@
 </p:tagLst>
 </file>
 
-<file path=ppt/tags/tag221.xml><?xml version="1.0" encoding="utf-8"?>
+<file path=ppt/tags/tag216.xml><?xml version="1.0" encoding="utf-8"?>
 <p:tagLst xmlns:p="http://schemas.openxmlformats.org/presentationml/2006/main">
   <p:tag name="KSO_WM_SLIDE_BACKGROUND_TYPE" val="general"/>
   <p:tag name="KSO_WM_SLIDE_BK_DARK_LIGHT" val="2"/>
@@ -22162,7 +22711,7 @@
 </p:tagLst>
 </file>
 
-<file path=ppt/tags/tag222.xml><?xml version="1.0" encoding="utf-8"?>
+<file path=ppt/tags/tag217.xml><?xml version="1.0" encoding="utf-8"?>
 <p:tagLst xmlns:p="http://schemas.openxmlformats.org/presentationml/2006/main">
   <p:tag name="KSO_WM_SLIDE_BACKGROUND_TYPE" val="general"/>
   <p:tag name="KSO_WM_SLIDE_BK_DARK_LIGHT" val="2"/>
@@ -22185,7 +22734,7 @@
 </p:tagLst>
 </file>
 
-<file path=ppt/tags/tag223.xml><?xml version="1.0" encoding="utf-8"?>
+<file path=ppt/tags/tag218.xml><?xml version="1.0" encoding="utf-8"?>
 <p:tagLst xmlns:p="http://schemas.openxmlformats.org/presentationml/2006/main">
   <p:tag name="KSO_WM_UNIT_HIGHLIGHT" val="0"/>
   <p:tag name="KSO_WM_UNIT_COMPATIBLE" val="0"/>
@@ -22210,7 +22759,7 @@
 </p:tagLst>
 </file>
 
-<file path=ppt/tags/tag224.xml><?xml version="1.0" encoding="utf-8"?>
+<file path=ppt/tags/tag219.xml><?xml version="1.0" encoding="utf-8"?>
 <p:tagLst xmlns:p="http://schemas.openxmlformats.org/presentationml/2006/main">
   <p:tag name="KSO_WM_UNIT_ISCONTENTSTITLE" val="0"/>
   <p:tag name="KSO_WM_UNIT_ISNUMDGMTITLE" val="0"/>
@@ -22240,7 +22789,20 @@
 </p:tagLst>
 </file>
 
-<file path=ppt/tags/tag225.xml><?xml version="1.0" encoding="utf-8"?>
+<file path=ppt/tags/tag22.xml><?xml version="1.0" encoding="utf-8"?>
+<p:tagLst xmlns:p="http://schemas.openxmlformats.org/presentationml/2006/main">
+  <p:tag name="KSO_WM_UNIT_HIGHLIGHT" val="0"/>
+  <p:tag name="KSO_WM_UNIT_COMPATIBLE" val="0"/>
+  <p:tag name="KSO_WM_UNIT_DIAGRAM_ISNUMVISUAL" val="0"/>
+  <p:tag name="KSO_WM_UNIT_DIAGRAM_ISREFERUNIT" val="0"/>
+  <p:tag name="KSO_WM_UNIT_ID" val="_2**"/>
+  <p:tag name="KSO_WM_UNIT_LAYERLEVEL" val="1"/>
+  <p:tag name="KSO_WM_TAG_VERSION" val="1.0"/>
+  <p:tag name="KSO_WM_BEAUTIFY_FLAG" val="#wm#"/>
+</p:tagLst>
+</file>
+
+<file path=ppt/tags/tag220.xml><?xml version="1.0" encoding="utf-8"?>
 <p:tagLst xmlns:p="http://schemas.openxmlformats.org/presentationml/2006/main">
   <p:tag name="KSO_WM_SLIDE_ID" val="diagram20220058_1"/>
   <p:tag name="KSO_WM_TEMPLATE_SUBCATEGORY" val="25"/>
@@ -22268,7 +22830,7 @@
 </p:tagLst>
 </file>
 
-<file path=ppt/tags/tag226.xml><?xml version="1.0" encoding="utf-8"?>
+<file path=ppt/tags/tag221.xml><?xml version="1.0" encoding="utf-8"?>
 <p:tagLst xmlns:p="http://schemas.openxmlformats.org/presentationml/2006/main">
   <p:tag name="KSO_WM_SLIDE_BACKGROUND_TYPE" val="general"/>
   <p:tag name="KSO_WM_SLIDE_BK_DARK_LIGHT" val="2"/>
@@ -22285,7 +22847,7 @@
 </p:tagLst>
 </file>
 
-<file path=ppt/tags/tag227.xml><?xml version="1.0" encoding="utf-8"?>
+<file path=ppt/tags/tag222.xml><?xml version="1.0" encoding="utf-8"?>
 <p:tagLst xmlns:p="http://schemas.openxmlformats.org/presentationml/2006/main">
   <p:tag name="KSO_WM_SLIDE_BACKGROUND_TYPE" val="general"/>
   <p:tag name="KSO_WM_SLIDE_BK_DARK_LIGHT" val="2"/>
@@ -22308,7 +22870,7 @@
 </p:tagLst>
 </file>
 
-<file path=ppt/tags/tag228.xml><?xml version="1.0" encoding="utf-8"?>
+<file path=ppt/tags/tag223.xml><?xml version="1.0" encoding="utf-8"?>
 <p:tagLst xmlns:p="http://schemas.openxmlformats.org/presentationml/2006/main">
   <p:tag name="KSO_WM_SLIDE_BACKGROUND_TYPE" val="general"/>
   <p:tag name="KSO_WM_SLIDE_BK_DARK_LIGHT" val="2"/>
@@ -22331,7 +22893,7 @@
 </p:tagLst>
 </file>
 
-<file path=ppt/tags/tag229.xml><?xml version="1.0" encoding="utf-8"?>
+<file path=ppt/tags/tag224.xml><?xml version="1.0" encoding="utf-8"?>
 <p:tagLst xmlns:p="http://schemas.openxmlformats.org/presentationml/2006/main">
   <p:tag name="KSO_WM_SLIDE_BACKGROUND_TYPE" val="general"/>
   <p:tag name="KSO_WM_SLIDE_BK_DARK_LIGHT" val="2"/>
@@ -22354,20 +22916,7 @@
 </p:tagLst>
 </file>
 
-<file path=ppt/tags/tag23.xml><?xml version="1.0" encoding="utf-8"?>
-<p:tagLst xmlns:p="http://schemas.openxmlformats.org/presentationml/2006/main">
-  <p:tag name="KSO_WM_UNIT_HIGHLIGHT" val="0"/>
-  <p:tag name="KSO_WM_UNIT_COMPATIBLE" val="0"/>
-  <p:tag name="KSO_WM_UNIT_DIAGRAM_ISNUMVISUAL" val="0"/>
-  <p:tag name="KSO_WM_UNIT_DIAGRAM_ISREFERUNIT" val="0"/>
-  <p:tag name="KSO_WM_UNIT_ID" val="_2**"/>
-  <p:tag name="KSO_WM_UNIT_LAYERLEVEL" val="1"/>
-  <p:tag name="KSO_WM_TAG_VERSION" val="1.0"/>
-  <p:tag name="KSO_WM_BEAUTIFY_FLAG" val="#wm#"/>
-</p:tagLst>
-</file>
-
-<file path=ppt/tags/tag230.xml><?xml version="1.0" encoding="utf-8"?>
+<file path=ppt/tags/tag225.xml><?xml version="1.0" encoding="utf-8"?>
 <p:tagLst xmlns:p="http://schemas.openxmlformats.org/presentationml/2006/main">
   <p:tag name="KSO_WM_UNIT_HIGHLIGHT" val="0"/>
   <p:tag name="KSO_WM_UNIT_COMPATIBLE" val="0"/>
@@ -22392,7 +22941,7 @@
 </p:tagLst>
 </file>
 
-<file path=ppt/tags/tag231.xml><?xml version="1.0" encoding="utf-8"?>
+<file path=ppt/tags/tag226.xml><?xml version="1.0" encoding="utf-8"?>
 <p:tagLst xmlns:p="http://schemas.openxmlformats.org/presentationml/2006/main">
   <p:tag name="KSO_WM_UNIT_ISCONTENTSTITLE" val="0"/>
   <p:tag name="KSO_WM_UNIT_ISNUMDGMTITLE" val="0"/>
@@ -22422,13 +22971,7 @@
 </p:tagLst>
 </file>
 
-<file path=ppt/tags/tag232.xml><?xml version="1.0" encoding="utf-8"?>
-<p:tagLst xmlns:p="http://schemas.openxmlformats.org/presentationml/2006/main">
-  <p:tag name="KSO_WM_BEAUTIFY_FLAG" val=""/>
-</p:tagLst>
-</file>
-
-<file path=ppt/tags/tag233.xml><?xml version="1.0" encoding="utf-8"?>
+<file path=ppt/tags/tag227.xml><?xml version="1.0" encoding="utf-8"?>
 <p:tagLst xmlns:p="http://schemas.openxmlformats.org/presentationml/2006/main">
   <p:tag name="KSO_WM_SLIDE_ID" val="diagram20220058_1"/>
   <p:tag name="KSO_WM_TEMPLATE_SUBCATEGORY" val="25"/>
@@ -22456,7 +22999,377 @@
 </p:tagLst>
 </file>
 
+<file path=ppt/tags/tag228.xml><?xml version="1.0" encoding="utf-8"?>
+<p:tagLst xmlns:p="http://schemas.openxmlformats.org/presentationml/2006/main">
+  <p:tag name="KSO_WM_SLIDE_BACKGROUND_TYPE" val="general"/>
+  <p:tag name="KSO_WM_SLIDE_BK_DARK_LIGHT" val="2"/>
+  <p:tag name="KSO_WM_UNIT_HIGHLIGHT" val="0"/>
+  <p:tag name="KSO_WM_UNIT_COMPATIBLE" val="0"/>
+  <p:tag name="KSO_WM_UNIT_DIAGRAM_ISNUMVISUAL" val="0"/>
+  <p:tag name="KSO_WM_UNIT_DIAGRAM_ISREFERUNIT" val="0"/>
+  <p:tag name="KSO_WM_UNIT_TYPE" val="i"/>
+  <p:tag name="KSO_WM_UNIT_INDEX" val="1"/>
+  <p:tag name="KSO_WM_UNIT_ID" val="_12*i*1"/>
+  <p:tag name="KSO_WM_UNIT_LAYERLEVEL" val="1"/>
+  <p:tag name="KSO_WM_TAG_VERSION" val="1.0"/>
+  <p:tag name="KSO_WM_BEAUTIFY_FLAG" val="#wm#"/>
+</p:tagLst>
+</file>
+
+<file path=ppt/tags/tag229.xml><?xml version="1.0" encoding="utf-8"?>
+<p:tagLst xmlns:p="http://schemas.openxmlformats.org/presentationml/2006/main">
+  <p:tag name="KSO_WM_SLIDE_BACKGROUND_TYPE" val="general"/>
+  <p:tag name="KSO_WM_SLIDE_BK_DARK_LIGHT" val="2"/>
+  <p:tag name="KSO_WM_UNIT_HIGHLIGHT" val="0"/>
+  <p:tag name="KSO_WM_UNIT_COMPATIBLE" val="0"/>
+  <p:tag name="KSO_WM_UNIT_DIAGRAM_ISNUMVISUAL" val="0"/>
+  <p:tag name="KSO_WM_UNIT_DIAGRAM_ISREFERUNIT" val="0"/>
+  <p:tag name="KSO_WM_UNIT_TYPE" val="i"/>
+  <p:tag name="KSO_WM_UNIT_INDEX" val="2"/>
+  <p:tag name="KSO_WM_UNIT_ID" val="_12*i*2"/>
+  <p:tag name="KSO_WM_UNIT_LAYERLEVEL" val="1"/>
+  <p:tag name="KSO_WM_TAG_VERSION" val="1.0"/>
+  <p:tag name="KSO_WM_BEAUTIFY_FLAG" val="#wm#"/>
+  <p:tag name="KSO_WM_UNIT_FILL_FORE_SCHEMECOLOR_INDEX_BRIGHTNESS" val="0"/>
+  <p:tag name="KSO_WM_UNIT_FILL_FORE_SCHEMECOLOR_INDEX" val="6"/>
+  <p:tag name="KSO_WM_UNIT_FILL_TYPE" val="1"/>
+  <p:tag name="KSO_WM_UNIT_TEXT_FILL_FORE_SCHEMECOLOR_INDEX_BRIGHTNESS" val="0.15"/>
+  <p:tag name="KSO_WM_UNIT_TEXT_FILL_FORE_SCHEMECOLOR_INDEX" val="13"/>
+  <p:tag name="KSO_WM_UNIT_TEXT_FILL_TYPE" val="1"/>
+</p:tagLst>
+</file>
+
+<file path=ppt/tags/tag23.xml><?xml version="1.0" encoding="utf-8"?>
+<p:tagLst xmlns:p="http://schemas.openxmlformats.org/presentationml/2006/main">
+  <p:tag name="KSO_WM_UNIT_HIGHLIGHT" val="0"/>
+  <p:tag name="KSO_WM_UNIT_COMPATIBLE" val="0"/>
+  <p:tag name="KSO_WM_UNIT_DIAGRAM_ISNUMVISUAL" val="0"/>
+  <p:tag name="KSO_WM_UNIT_DIAGRAM_ISREFERUNIT" val="0"/>
+  <p:tag name="KSO_WM_UNIT_ID" val="_2**"/>
+  <p:tag name="KSO_WM_UNIT_LAYERLEVEL" val="1"/>
+  <p:tag name="KSO_WM_TAG_VERSION" val="1.0"/>
+  <p:tag name="KSO_WM_BEAUTIFY_FLAG" val="#wm#"/>
+</p:tagLst>
+</file>
+
+<file path=ppt/tags/tag230.xml><?xml version="1.0" encoding="utf-8"?>
+<p:tagLst xmlns:p="http://schemas.openxmlformats.org/presentationml/2006/main">
+  <p:tag name="KSO_WM_SLIDE_BACKGROUND_TYPE" val="general"/>
+  <p:tag name="KSO_WM_SLIDE_BK_DARK_LIGHT" val="2"/>
+  <p:tag name="KSO_WM_UNIT_HIGHLIGHT" val="0"/>
+  <p:tag name="KSO_WM_UNIT_COMPATIBLE" val="0"/>
+  <p:tag name="KSO_WM_UNIT_DIAGRAM_ISNUMVISUAL" val="0"/>
+  <p:tag name="KSO_WM_UNIT_DIAGRAM_ISREFERUNIT" val="0"/>
+  <p:tag name="KSO_WM_UNIT_TYPE" val="i"/>
+  <p:tag name="KSO_WM_UNIT_INDEX" val="3"/>
+  <p:tag name="KSO_WM_UNIT_ID" val="_12*i*3"/>
+  <p:tag name="KSO_WM_UNIT_LAYERLEVEL" val="1"/>
+  <p:tag name="KSO_WM_TAG_VERSION" val="1.0"/>
+  <p:tag name="KSO_WM_BEAUTIFY_FLAG" val="#wm#"/>
+  <p:tag name="KSO_WM_UNIT_FILL_FORE_SCHEMECOLOR_INDEX_BRIGHTNESS" val="0"/>
+  <p:tag name="KSO_WM_UNIT_FILL_FORE_SCHEMECOLOR_INDEX" val="6"/>
+  <p:tag name="KSO_WM_UNIT_FILL_TYPE" val="1"/>
+  <p:tag name="KSO_WM_UNIT_TEXT_FILL_FORE_SCHEMECOLOR_INDEX_BRIGHTNESS" val="0.15"/>
+  <p:tag name="KSO_WM_UNIT_TEXT_FILL_FORE_SCHEMECOLOR_INDEX" val="13"/>
+  <p:tag name="KSO_WM_UNIT_TEXT_FILL_TYPE" val="1"/>
+</p:tagLst>
+</file>
+
+<file path=ppt/tags/tag231.xml><?xml version="1.0" encoding="utf-8"?>
+<p:tagLst xmlns:p="http://schemas.openxmlformats.org/presentationml/2006/main">
+  <p:tag name="KSO_WM_SLIDE_BACKGROUND_TYPE" val="general"/>
+  <p:tag name="KSO_WM_SLIDE_BK_DARK_LIGHT" val="2"/>
+  <p:tag name="KSO_WM_UNIT_HIGHLIGHT" val="0"/>
+  <p:tag name="KSO_WM_UNIT_COMPATIBLE" val="0"/>
+  <p:tag name="KSO_WM_UNIT_DIAGRAM_ISNUMVISUAL" val="0"/>
+  <p:tag name="KSO_WM_UNIT_DIAGRAM_ISREFERUNIT" val="0"/>
+  <p:tag name="KSO_WM_UNIT_TYPE" val="i"/>
+  <p:tag name="KSO_WM_UNIT_INDEX" val="4"/>
+  <p:tag name="KSO_WM_UNIT_ID" val="_12*i*4"/>
+  <p:tag name="KSO_WM_UNIT_LAYERLEVEL" val="1"/>
+  <p:tag name="KSO_WM_TAG_VERSION" val="1.0"/>
+  <p:tag name="KSO_WM_BEAUTIFY_FLAG" val="#wm#"/>
+  <p:tag name="KSO_WM_UNIT_FILL_FORE_SCHEMECOLOR_INDEX_BRIGHTNESS" val="0"/>
+  <p:tag name="KSO_WM_UNIT_FILL_FORE_SCHEMECOLOR_INDEX" val="7"/>
+  <p:tag name="KSO_WM_UNIT_FILL_TYPE" val="1"/>
+  <p:tag name="KSO_WM_UNIT_TEXT_FILL_FORE_SCHEMECOLOR_INDEX_BRIGHTNESS" val="0.15"/>
+  <p:tag name="KSO_WM_UNIT_TEXT_FILL_FORE_SCHEMECOLOR_INDEX" val="13"/>
+  <p:tag name="KSO_WM_UNIT_TEXT_FILL_TYPE" val="1"/>
+</p:tagLst>
+</file>
+
+<file path=ppt/tags/tag232.xml><?xml version="1.0" encoding="utf-8"?>
+<p:tagLst xmlns:p="http://schemas.openxmlformats.org/presentationml/2006/main">
+  <p:tag name="KSO_WM_UNIT_HIGHLIGHT" val="0"/>
+  <p:tag name="KSO_WM_UNIT_COMPATIBLE" val="0"/>
+  <p:tag name="KSO_WM_UNIT_DIAGRAM_ISNUMVISUAL" val="0"/>
+  <p:tag name="KSO_WM_UNIT_DIAGRAM_ISREFERUNIT" val="0"/>
+  <p:tag name="KSO_WM_UNIT_TYPE" val="i"/>
+  <p:tag name="KSO_WM_UNIT_INDEX" val="1"/>
+  <p:tag name="KSO_WM_UNIT_ID" val="diagram20220058_1*i*1"/>
+  <p:tag name="KSO_WM_TEMPLATE_CATEGORY" val="diagram"/>
+  <p:tag name="KSO_WM_TEMPLATE_INDEX" val="20220058"/>
+  <p:tag name="KSO_WM_UNIT_LAYERLEVEL" val="1"/>
+  <p:tag name="KSO_WM_TAG_VERSION" val="1.0"/>
+  <p:tag name="KSO_WM_BEAUTIFY_FLAG" val="#wm#"/>
+  <p:tag name="KSO_WM_UNIT_BLOCK" val="0"/>
+  <p:tag name="KSO_WM_UNIT_SM_LIMIT_TYPE" val="0"/>
+  <p:tag name="KSO_WM_UNIT_DEC_AREA_ID" val="401453a90b9f4fd5b1215058b8a2f2e8"/>
+  <p:tag name="KSO_WM_UNIT_DECORATE_INFO" val="{&quot;ReferentInfo&quot;:{&quot;Id&quot;:&quot;2d2094633d9c481aa0d84a95a0159686&quot;,&quot;X&quot;:{&quot;Pos&quot;:1},&quot;Y&quot;:{&quot;Pos&quot;:2}},&quot;DecorateInfoX&quot;:{&quot;Pos&quot;:1,&quot;IsAbs&quot;:true},&quot;DecorateInfoY&quot;:{&quot;Pos&quot;:0,&quot;IsAbs&quot;:true},&quot;DecorateInfoW&quot;:{&quot;IsAbs&quot;:true},&quot;DecorateInfoH&quot;:{&quot;IsAbs&quot;:true},&quot;whChangeMode&quot;:0}"/>
+  <p:tag name="KSO_WM_UNIT_LINE_FORE_SCHEMECOLOR_INDEX_BRIGHTNESS" val="0"/>
+  <p:tag name="KSO_WM_UNIT_LINE_FORE_SCHEMECOLOR_INDEX" val="5"/>
+  <p:tag name="KSO_WM_UNIT_LINE_FILL_TYPE" val="2"/>
+  <p:tag name="WM_BEAUTIFY_ZORDER_FLAG_TAG" val="1"/>
+</p:tagLst>
+</file>
+
+<file path=ppt/tags/tag233.xml><?xml version="1.0" encoding="utf-8"?>
+<p:tagLst xmlns:p="http://schemas.openxmlformats.org/presentationml/2006/main">
+  <p:tag name="KSO_WM_UNIT_ISCONTENTSTITLE" val="0"/>
+  <p:tag name="KSO_WM_UNIT_ISNUMDGMTITLE" val="0"/>
+  <p:tag name="KSO_WM_UNIT_PRESET_TEXT" val="线型上下导航版"/>
+  <p:tag name="KSO_WM_UNIT_NOCLEAR" val="0"/>
+  <p:tag name="KSO_WM_UNIT_HIGHLIGHT" val="0"/>
+  <p:tag name="KSO_WM_UNIT_COMPATIBLE" val="0"/>
+  <p:tag name="KSO_WM_UNIT_DIAGRAM_ISNUMVISUAL" val="0"/>
+  <p:tag name="KSO_WM_UNIT_DIAGRAM_ISREFERUNIT" val="0"/>
+  <p:tag name="KSO_WM_UNIT_TYPE" val="a"/>
+  <p:tag name="KSO_WM_UNIT_INDEX" val="1"/>
+  <p:tag name="KSO_WM_UNIT_ID" val="diagram20220058_1*a*1"/>
+  <p:tag name="KSO_WM_TEMPLATE_CATEGORY" val="diagram"/>
+  <p:tag name="KSO_WM_TEMPLATE_INDEX" val="20220058"/>
+  <p:tag name="KSO_WM_UNIT_LAYERLEVEL" val="1"/>
+  <p:tag name="KSO_WM_TAG_VERSION" val="1.0"/>
+  <p:tag name="KSO_WM_BEAUTIFY_FLAG" val="#wm#"/>
+  <p:tag name="KSO_WM_UNIT_VALUE" val="27"/>
+  <p:tag name="KSO_WM_UNIT_BLOCK" val="0"/>
+  <p:tag name="KSO_WM_UNIT_SM_LIMIT_TYPE" val="2"/>
+  <p:tag name="KSO_WM_UNIT_DEC_AREA_ID" val="2d2094633d9c481aa0d84a95a0159686"/>
+  <p:tag name="KSO_WM_UNIT_DECORATE_INFO" val="{&quot;ReferentInfo&quot;:{&quot;Id&quot;:&quot;slide&quot;,&quot;X&quot;:{&quot;Pos&quot;:0},&quot;Y&quot;:{&quot;Pos&quot;:0}},&quot;DecorateInfoX&quot;:{&quot;Pos&quot;:0,&quot;IsAbs&quot;:false},&quot;DecorateInfoY&quot;:{&quot;Pos&quot;:0,&quot;IsAbs&quot;:false},&quot;DecorateInfoW&quot;:{&quot;IsAbs&quot;:false},&quot;DecorateInfoH&quot;:{&quot;IsAbs&quot;:false},&quot;whChangeMode&quot;:0}"/>
+  <p:tag name="KSO_WM_UNIT_TEXT_FILL_FORE_SCHEMECOLOR_INDEX_BRIGHTNESS" val="0"/>
+  <p:tag name="KSO_WM_UNIT_TEXT_FILL_FORE_SCHEMECOLOR_INDEX" val="13"/>
+  <p:tag name="KSO_WM_UNIT_TEXT_FILL_TYPE" val="1"/>
+  <p:tag name="WM_BEAUTIFY_ZORDER_FLAG_TAG" val="2"/>
+</p:tagLst>
+</file>
+
 <file path=ppt/tags/tag234.xml><?xml version="1.0" encoding="utf-8"?>
+<p:tagLst xmlns:p="http://schemas.openxmlformats.org/presentationml/2006/main">
+  <p:tag name="KSO_WM_BEAUTIFY_FLAG" val=""/>
+</p:tagLst>
+</file>
+
+<file path=ppt/tags/tag235.xml><?xml version="1.0" encoding="utf-8"?>
+<p:tagLst xmlns:p="http://schemas.openxmlformats.org/presentationml/2006/main">
+  <p:tag name="KSO_WM_SLIDE_ID" val="diagram20220058_1"/>
+  <p:tag name="KSO_WM_TEMPLATE_SUBCATEGORY" val="25"/>
+  <p:tag name="KSO_WM_TEMPLATE_MASTER_TYPE" val="0"/>
+  <p:tag name="KSO_WM_TEMPLATE_COLOR_TYPE" val="0"/>
+  <p:tag name="KSO_WM_SLIDE_ITEM_CNT" val="0"/>
+  <p:tag name="KSO_WM_SLIDE_INDEX" val="1"/>
+  <p:tag name="KSO_WM_TAG_VERSION" val="1.0"/>
+  <p:tag name="KSO_WM_BEAUTIFY_FLAG" val="#wm#"/>
+  <p:tag name="KSO_WM_TEMPLATE_CATEGORY" val="diagram"/>
+  <p:tag name="KSO_WM_TEMPLATE_INDEX" val="20220058"/>
+  <p:tag name="KSO_WM_SLIDE_LAYOUT" val="a_d"/>
+  <p:tag name="KSO_WM_SLIDE_LAYOUT_CNT" val="1_1"/>
+  <p:tag name="KSO_WM_SLIDE_TYPE" val="text"/>
+  <p:tag name="KSO_WM_SLIDE_SUBTYPE" val="picTxt"/>
+  <p:tag name="KSO_WM_SLIDE_LAYOUTTYPE" val="topbottom"/>
+  <p:tag name="KSO_WM_SLIDE_SIZE" val="888*504"/>
+  <p:tag name="KSO_WM_SLIDE_POSITION" val="36*12"/>
+  <p:tag name="KSO_WM_SLIDE_LAYOUT_INFO" val="{&quot;backgroundInfo&quot;:[{&quot;bottom&quot;:0,&quot;bottomAbs&quot;:false,&quot;left&quot;:0,&quot;leftAbs&quot;:false,&quot;right&quot;:0,&quot;rightAbs&quot;:false,&quot;top&quot;:0,&quot;topAbs&quot;:false,&quot;type&quot;:&quot;general&quot;}],&quot;id&quot;:&quot;2023-04-06T22:45:45&quot;,&quot;maxSize&quot;:{&quot;size1&quot;:20},&quot;minSize&quot;:{&quot;size1&quot;:11.2},&quot;normalSize&quot;:{&quot;size1&quot;:11.2},&quot;subLayout&quot;:[{&quot;id&quot;:&quot;2023-04-06T22:45:45&quot;,&quot;margin&quot;:{&quot;bottom&quot;:0.025999998673796654,&quot;left&quot;:1.2699999809265137,&quot;right&quot;:1.2699999809265137,&quot;top&quot;:0.4230000376701355},&quot;type&quot;:0},{&quot;id&quot;:&quot;2023-04-06T22:45:45&quot;,&quot;margin&quot;:{&quot;bottom&quot;:0.847000002861023,&quot;left&quot;:1.2699999809265137,&quot;right&quot;:1.2699999809265137,&quot;top&quot;:1.2699999809265137},&quot;type&quot;:0}],&quot;type&quot;:0}"/>
+  <p:tag name="KSO_WM_SLIDE_RATIO" val="1.777778"/>
+  <p:tag name="KSO_WM_SLIDE_BACKGROUND" val="[&quot;general&quot;]"/>
+  <p:tag name="KSO_WM_SLIDE_BACKGROUND_TYPE" val="general"/>
+  <p:tag name="KSO_WM_SLIDE_BK_DARK_LIGHT" val="2"/>
+  <p:tag name="KSO_WM_SPECIAL_SOURCE" val="bdnull"/>
+</p:tagLst>
+</file>
+
+<file path=ppt/tags/tag236.xml><?xml version="1.0" encoding="utf-8"?>
+<p:tagLst xmlns:p="http://schemas.openxmlformats.org/presentationml/2006/main">
+  <p:tag name="KSO_WM_SLIDE_BACKGROUND_TYPE" val="general"/>
+  <p:tag name="KSO_WM_SLIDE_BK_DARK_LIGHT" val="2"/>
+  <p:tag name="KSO_WM_UNIT_HIGHLIGHT" val="0"/>
+  <p:tag name="KSO_WM_UNIT_COMPATIBLE" val="0"/>
+  <p:tag name="KSO_WM_UNIT_DIAGRAM_ISNUMVISUAL" val="0"/>
+  <p:tag name="KSO_WM_UNIT_DIAGRAM_ISREFERUNIT" val="0"/>
+  <p:tag name="KSO_WM_UNIT_TYPE" val="i"/>
+  <p:tag name="KSO_WM_UNIT_INDEX" val="1"/>
+  <p:tag name="KSO_WM_UNIT_ID" val="_12*i*1"/>
+  <p:tag name="KSO_WM_UNIT_LAYERLEVEL" val="1"/>
+  <p:tag name="KSO_WM_TAG_VERSION" val="1.0"/>
+  <p:tag name="KSO_WM_BEAUTIFY_FLAG" val="#wm#"/>
+</p:tagLst>
+</file>
+
+<file path=ppt/tags/tag237.xml><?xml version="1.0" encoding="utf-8"?>
+<p:tagLst xmlns:p="http://schemas.openxmlformats.org/presentationml/2006/main">
+  <p:tag name="KSO_WM_SLIDE_BACKGROUND_TYPE" val="general"/>
+  <p:tag name="KSO_WM_SLIDE_BK_DARK_LIGHT" val="2"/>
+  <p:tag name="KSO_WM_UNIT_HIGHLIGHT" val="0"/>
+  <p:tag name="KSO_WM_UNIT_COMPATIBLE" val="0"/>
+  <p:tag name="KSO_WM_UNIT_DIAGRAM_ISNUMVISUAL" val="0"/>
+  <p:tag name="KSO_WM_UNIT_DIAGRAM_ISREFERUNIT" val="0"/>
+  <p:tag name="KSO_WM_UNIT_TYPE" val="i"/>
+  <p:tag name="KSO_WM_UNIT_INDEX" val="2"/>
+  <p:tag name="KSO_WM_UNIT_ID" val="_12*i*2"/>
+  <p:tag name="KSO_WM_UNIT_LAYERLEVEL" val="1"/>
+  <p:tag name="KSO_WM_TAG_VERSION" val="1.0"/>
+  <p:tag name="KSO_WM_BEAUTIFY_FLAG" val="#wm#"/>
+  <p:tag name="KSO_WM_UNIT_FILL_FORE_SCHEMECOLOR_INDEX_BRIGHTNESS" val="0"/>
+  <p:tag name="KSO_WM_UNIT_FILL_FORE_SCHEMECOLOR_INDEX" val="6"/>
+  <p:tag name="KSO_WM_UNIT_FILL_TYPE" val="1"/>
+  <p:tag name="KSO_WM_UNIT_TEXT_FILL_FORE_SCHEMECOLOR_INDEX_BRIGHTNESS" val="0.15"/>
+  <p:tag name="KSO_WM_UNIT_TEXT_FILL_FORE_SCHEMECOLOR_INDEX" val="13"/>
+  <p:tag name="KSO_WM_UNIT_TEXT_FILL_TYPE" val="1"/>
+</p:tagLst>
+</file>
+
+<file path=ppt/tags/tag238.xml><?xml version="1.0" encoding="utf-8"?>
+<p:tagLst xmlns:p="http://schemas.openxmlformats.org/presentationml/2006/main">
+  <p:tag name="KSO_WM_SLIDE_BACKGROUND_TYPE" val="general"/>
+  <p:tag name="KSO_WM_SLIDE_BK_DARK_LIGHT" val="2"/>
+  <p:tag name="KSO_WM_UNIT_HIGHLIGHT" val="0"/>
+  <p:tag name="KSO_WM_UNIT_COMPATIBLE" val="0"/>
+  <p:tag name="KSO_WM_UNIT_DIAGRAM_ISNUMVISUAL" val="0"/>
+  <p:tag name="KSO_WM_UNIT_DIAGRAM_ISREFERUNIT" val="0"/>
+  <p:tag name="KSO_WM_UNIT_TYPE" val="i"/>
+  <p:tag name="KSO_WM_UNIT_INDEX" val="3"/>
+  <p:tag name="KSO_WM_UNIT_ID" val="_12*i*3"/>
+  <p:tag name="KSO_WM_UNIT_LAYERLEVEL" val="1"/>
+  <p:tag name="KSO_WM_TAG_VERSION" val="1.0"/>
+  <p:tag name="KSO_WM_BEAUTIFY_FLAG" val="#wm#"/>
+  <p:tag name="KSO_WM_UNIT_FILL_FORE_SCHEMECOLOR_INDEX_BRIGHTNESS" val="0"/>
+  <p:tag name="KSO_WM_UNIT_FILL_FORE_SCHEMECOLOR_INDEX" val="6"/>
+  <p:tag name="KSO_WM_UNIT_FILL_TYPE" val="1"/>
+  <p:tag name="KSO_WM_UNIT_TEXT_FILL_FORE_SCHEMECOLOR_INDEX_BRIGHTNESS" val="0.15"/>
+  <p:tag name="KSO_WM_UNIT_TEXT_FILL_FORE_SCHEMECOLOR_INDEX" val="13"/>
+  <p:tag name="KSO_WM_UNIT_TEXT_FILL_TYPE" val="1"/>
+</p:tagLst>
+</file>
+
+<file path=ppt/tags/tag239.xml><?xml version="1.0" encoding="utf-8"?>
+<p:tagLst xmlns:p="http://schemas.openxmlformats.org/presentationml/2006/main">
+  <p:tag name="KSO_WM_SLIDE_BACKGROUND_TYPE" val="general"/>
+  <p:tag name="KSO_WM_SLIDE_BK_DARK_LIGHT" val="2"/>
+  <p:tag name="KSO_WM_UNIT_HIGHLIGHT" val="0"/>
+  <p:tag name="KSO_WM_UNIT_COMPATIBLE" val="0"/>
+  <p:tag name="KSO_WM_UNIT_DIAGRAM_ISNUMVISUAL" val="0"/>
+  <p:tag name="KSO_WM_UNIT_DIAGRAM_ISREFERUNIT" val="0"/>
+  <p:tag name="KSO_WM_UNIT_TYPE" val="i"/>
+  <p:tag name="KSO_WM_UNIT_INDEX" val="4"/>
+  <p:tag name="KSO_WM_UNIT_ID" val="_12*i*4"/>
+  <p:tag name="KSO_WM_UNIT_LAYERLEVEL" val="1"/>
+  <p:tag name="KSO_WM_TAG_VERSION" val="1.0"/>
+  <p:tag name="KSO_WM_BEAUTIFY_FLAG" val="#wm#"/>
+  <p:tag name="KSO_WM_UNIT_FILL_FORE_SCHEMECOLOR_INDEX_BRIGHTNESS" val="0"/>
+  <p:tag name="KSO_WM_UNIT_FILL_FORE_SCHEMECOLOR_INDEX" val="7"/>
+  <p:tag name="KSO_WM_UNIT_FILL_TYPE" val="1"/>
+  <p:tag name="KSO_WM_UNIT_TEXT_FILL_FORE_SCHEMECOLOR_INDEX_BRIGHTNESS" val="0.15"/>
+  <p:tag name="KSO_WM_UNIT_TEXT_FILL_FORE_SCHEMECOLOR_INDEX" val="13"/>
+  <p:tag name="KSO_WM_UNIT_TEXT_FILL_TYPE" val="1"/>
+</p:tagLst>
+</file>
+
+<file path=ppt/tags/tag24.xml><?xml version="1.0" encoding="utf-8"?>
+<p:tagLst xmlns:p="http://schemas.openxmlformats.org/presentationml/2006/main">
+  <p:tag name="KSO_WM_UNIT_HIGHLIGHT" val="0"/>
+  <p:tag name="KSO_WM_UNIT_COMPATIBLE" val="0"/>
+  <p:tag name="KSO_WM_UNIT_DIAGRAM_ISNUMVISUAL" val="0"/>
+  <p:tag name="KSO_WM_UNIT_DIAGRAM_ISREFERUNIT" val="0"/>
+  <p:tag name="KSO_WM_UNIT_ID" val="_2**"/>
+  <p:tag name="KSO_WM_UNIT_LAYERLEVEL" val="1"/>
+  <p:tag name="KSO_WM_TAG_VERSION" val="1.0"/>
+  <p:tag name="KSO_WM_BEAUTIFY_FLAG" val="#wm#"/>
+</p:tagLst>
+</file>
+
+<file path=ppt/tags/tag240.xml><?xml version="1.0" encoding="utf-8"?>
+<p:tagLst xmlns:p="http://schemas.openxmlformats.org/presentationml/2006/main">
+  <p:tag name="KSO_WM_UNIT_HIGHLIGHT" val="0"/>
+  <p:tag name="KSO_WM_UNIT_COMPATIBLE" val="0"/>
+  <p:tag name="KSO_WM_UNIT_DIAGRAM_ISNUMVISUAL" val="0"/>
+  <p:tag name="KSO_WM_UNIT_DIAGRAM_ISREFERUNIT" val="0"/>
+  <p:tag name="KSO_WM_UNIT_TYPE" val="i"/>
+  <p:tag name="KSO_WM_UNIT_INDEX" val="1"/>
+  <p:tag name="KSO_WM_UNIT_ID" val="diagram20220058_1*i*1"/>
+  <p:tag name="KSO_WM_TEMPLATE_CATEGORY" val="diagram"/>
+  <p:tag name="KSO_WM_TEMPLATE_INDEX" val="20220058"/>
+  <p:tag name="KSO_WM_UNIT_LAYERLEVEL" val="1"/>
+  <p:tag name="KSO_WM_TAG_VERSION" val="1.0"/>
+  <p:tag name="KSO_WM_BEAUTIFY_FLAG" val="#wm#"/>
+  <p:tag name="KSO_WM_UNIT_BLOCK" val="0"/>
+  <p:tag name="KSO_WM_UNIT_SM_LIMIT_TYPE" val="0"/>
+  <p:tag name="KSO_WM_UNIT_DEC_AREA_ID" val="401453a90b9f4fd5b1215058b8a2f2e8"/>
+  <p:tag name="KSO_WM_UNIT_DECORATE_INFO" val="{&quot;ReferentInfo&quot;:{&quot;Id&quot;:&quot;2d2094633d9c481aa0d84a95a0159686&quot;,&quot;X&quot;:{&quot;Pos&quot;:1},&quot;Y&quot;:{&quot;Pos&quot;:2}},&quot;DecorateInfoX&quot;:{&quot;Pos&quot;:1,&quot;IsAbs&quot;:true},&quot;DecorateInfoY&quot;:{&quot;Pos&quot;:0,&quot;IsAbs&quot;:true},&quot;DecorateInfoW&quot;:{&quot;IsAbs&quot;:true},&quot;DecorateInfoH&quot;:{&quot;IsAbs&quot;:true},&quot;whChangeMode&quot;:0}"/>
+  <p:tag name="KSO_WM_UNIT_LINE_FORE_SCHEMECOLOR_INDEX_BRIGHTNESS" val="0"/>
+  <p:tag name="KSO_WM_UNIT_LINE_FORE_SCHEMECOLOR_INDEX" val="5"/>
+  <p:tag name="KSO_WM_UNIT_LINE_FILL_TYPE" val="2"/>
+  <p:tag name="WM_BEAUTIFY_ZORDER_FLAG_TAG" val="1"/>
+</p:tagLst>
+</file>
+
+<file path=ppt/tags/tag241.xml><?xml version="1.0" encoding="utf-8"?>
+<p:tagLst xmlns:p="http://schemas.openxmlformats.org/presentationml/2006/main">
+  <p:tag name="KSO_WM_UNIT_ISCONTENTSTITLE" val="0"/>
+  <p:tag name="KSO_WM_UNIT_ISNUMDGMTITLE" val="0"/>
+  <p:tag name="KSO_WM_UNIT_PRESET_TEXT" val="线型上下导航版"/>
+  <p:tag name="KSO_WM_UNIT_NOCLEAR" val="0"/>
+  <p:tag name="KSO_WM_UNIT_HIGHLIGHT" val="0"/>
+  <p:tag name="KSO_WM_UNIT_COMPATIBLE" val="0"/>
+  <p:tag name="KSO_WM_UNIT_DIAGRAM_ISNUMVISUAL" val="0"/>
+  <p:tag name="KSO_WM_UNIT_DIAGRAM_ISREFERUNIT" val="0"/>
+  <p:tag name="KSO_WM_UNIT_TYPE" val="a"/>
+  <p:tag name="KSO_WM_UNIT_INDEX" val="1"/>
+  <p:tag name="KSO_WM_UNIT_ID" val="diagram20220058_1*a*1"/>
+  <p:tag name="KSO_WM_TEMPLATE_CATEGORY" val="diagram"/>
+  <p:tag name="KSO_WM_TEMPLATE_INDEX" val="20220058"/>
+  <p:tag name="KSO_WM_UNIT_LAYERLEVEL" val="1"/>
+  <p:tag name="KSO_WM_TAG_VERSION" val="1.0"/>
+  <p:tag name="KSO_WM_BEAUTIFY_FLAG" val="#wm#"/>
+  <p:tag name="KSO_WM_UNIT_VALUE" val="27"/>
+  <p:tag name="KSO_WM_UNIT_BLOCK" val="0"/>
+  <p:tag name="KSO_WM_UNIT_SM_LIMIT_TYPE" val="2"/>
+  <p:tag name="KSO_WM_UNIT_DEC_AREA_ID" val="2d2094633d9c481aa0d84a95a0159686"/>
+  <p:tag name="KSO_WM_UNIT_DECORATE_INFO" val="{&quot;ReferentInfo&quot;:{&quot;Id&quot;:&quot;slide&quot;,&quot;X&quot;:{&quot;Pos&quot;:0},&quot;Y&quot;:{&quot;Pos&quot;:0}},&quot;DecorateInfoX&quot;:{&quot;Pos&quot;:0,&quot;IsAbs&quot;:false},&quot;DecorateInfoY&quot;:{&quot;Pos&quot;:0,&quot;IsAbs&quot;:false},&quot;DecorateInfoW&quot;:{&quot;IsAbs&quot;:false},&quot;DecorateInfoH&quot;:{&quot;IsAbs&quot;:false},&quot;whChangeMode&quot;:0}"/>
+  <p:tag name="KSO_WM_UNIT_TEXT_FILL_FORE_SCHEMECOLOR_INDEX_BRIGHTNESS" val="0"/>
+  <p:tag name="KSO_WM_UNIT_TEXT_FILL_FORE_SCHEMECOLOR_INDEX" val="13"/>
+  <p:tag name="KSO_WM_UNIT_TEXT_FILL_TYPE" val="1"/>
+  <p:tag name="WM_BEAUTIFY_ZORDER_FLAG_TAG" val="2"/>
+</p:tagLst>
+</file>
+
+<file path=ppt/tags/tag242.xml><?xml version="1.0" encoding="utf-8"?>
+<p:tagLst xmlns:p="http://schemas.openxmlformats.org/presentationml/2006/main">
+  <p:tag name="KSO_WM_SLIDE_ID" val="diagram20220058_1"/>
+  <p:tag name="KSO_WM_TEMPLATE_SUBCATEGORY" val="25"/>
+  <p:tag name="KSO_WM_TEMPLATE_MASTER_TYPE" val="0"/>
+  <p:tag name="KSO_WM_TEMPLATE_COLOR_TYPE" val="0"/>
+  <p:tag name="KSO_WM_SLIDE_ITEM_CNT" val="0"/>
+  <p:tag name="KSO_WM_SLIDE_INDEX" val="1"/>
+  <p:tag name="KSO_WM_TAG_VERSION" val="1.0"/>
+  <p:tag name="KSO_WM_BEAUTIFY_FLAG" val="#wm#"/>
+  <p:tag name="KSO_WM_TEMPLATE_CATEGORY" val="diagram"/>
+  <p:tag name="KSO_WM_TEMPLATE_INDEX" val="20220058"/>
+  <p:tag name="KSO_WM_SLIDE_LAYOUT" val="a_d"/>
+  <p:tag name="KSO_WM_SLIDE_LAYOUT_CNT" val="1_1"/>
+  <p:tag name="KSO_WM_SLIDE_TYPE" val="text"/>
+  <p:tag name="KSO_WM_SLIDE_SUBTYPE" val="picTxt"/>
+  <p:tag name="KSO_WM_SLIDE_LAYOUTTYPE" val="topbottom"/>
+  <p:tag name="KSO_WM_SLIDE_SIZE" val="888*504"/>
+  <p:tag name="KSO_WM_SLIDE_POSITION" val="36*12"/>
+  <p:tag name="KSO_WM_SLIDE_LAYOUT_INFO" val="{&quot;backgroundInfo&quot;:[{&quot;bottom&quot;:0,&quot;bottomAbs&quot;:false,&quot;left&quot;:0,&quot;leftAbs&quot;:false,&quot;right&quot;:0,&quot;rightAbs&quot;:false,&quot;top&quot;:0,&quot;topAbs&quot;:false,&quot;type&quot;:&quot;general&quot;}],&quot;id&quot;:&quot;2023-04-06T22:45:45&quot;,&quot;maxSize&quot;:{&quot;size1&quot;:20},&quot;minSize&quot;:{&quot;size1&quot;:11.2},&quot;normalSize&quot;:{&quot;size1&quot;:11.2},&quot;subLayout&quot;:[{&quot;id&quot;:&quot;2023-04-06T22:45:45&quot;,&quot;margin&quot;:{&quot;bottom&quot;:0.025999998673796654,&quot;left&quot;:1.2699999809265137,&quot;right&quot;:1.2699999809265137,&quot;top&quot;:0.4230000376701355},&quot;type&quot;:0},{&quot;id&quot;:&quot;2023-04-06T22:45:45&quot;,&quot;margin&quot;:{&quot;bottom&quot;:0.847000002861023,&quot;left&quot;:1.2699999809265137,&quot;right&quot;:1.2699999809265137,&quot;top&quot;:1.2699999809265137},&quot;type&quot;:0}],&quot;type&quot;:0}"/>
+  <p:tag name="KSO_WM_SLIDE_RATIO" val="1.777778"/>
+  <p:tag name="KSO_WM_SLIDE_BACKGROUND" val="[&quot;general&quot;]"/>
+  <p:tag name="KSO_WM_SLIDE_BACKGROUND_TYPE" val="general"/>
+  <p:tag name="KSO_WM_SLIDE_BK_DARK_LIGHT" val="2"/>
+  <p:tag name="KSO_WM_SPECIAL_SOURCE" val="bdnull"/>
+</p:tagLst>
+</file>
+
+<file path=ppt/tags/tag243.xml><?xml version="1.0" encoding="utf-8"?>
 <p:tagLst xmlns:p="http://schemas.openxmlformats.org/presentationml/2006/main">
   <p:tag name="KSO_WM_UNIT_ISCONTENTSTITLE" val="0"/>
   <p:tag name="KSO_WM_UNIT_ISNUMDGMTITLE" val="0"/>
@@ -22481,7 +23394,7 @@
 </p:tagLst>
 </file>
 
-<file path=ppt/tags/tag235.xml><?xml version="1.0" encoding="utf-8"?>
+<file path=ppt/tags/tag244.xml><?xml version="1.0" encoding="utf-8"?>
 <p:tagLst xmlns:p="http://schemas.openxmlformats.org/presentationml/2006/main">
   <p:tag name="KSO_WM_SLIDE_ID" val="custom20202548_15"/>
   <p:tag name="KSO_WM_TEMPLATE_SUBCATEGORY" val="0"/>
@@ -22501,24 +23414,11 @@
 </p:tagLst>
 </file>
 
-<file path=ppt/tags/tag236.xml><?xml version="1.0" encoding="utf-8"?>
+<file path=ppt/tags/tag245.xml><?xml version="1.0" encoding="utf-8"?>
 <p:tagLst xmlns:p="http://schemas.openxmlformats.org/presentationml/2006/main">
   <p:tag name="KSO_WPP_MARK_KEY" val="1ec68aae-aac7-4cd7-adca-3b22322198ab"/>
   <p:tag name="COMMONDATA" val="eyJoZGlkIjoiOTdiYmZlMTg4NTQ1MGJkYTAxYjE2NTJhYWJkNDU1YmUifQ=="/>
   <p:tag name="commondata" val="eyJoZGlkIjoiY2Q5Y2IzNDQwMDAwZWNhMTU3NGY1YjMwNDVjYjE2ZWYifQ=="/>
-</p:tagLst>
-</file>
-
-<file path=ppt/tags/tag24.xml><?xml version="1.0" encoding="utf-8"?>
-<p:tagLst xmlns:p="http://schemas.openxmlformats.org/presentationml/2006/main">
-  <p:tag name="KSO_WM_UNIT_HIGHLIGHT" val="0"/>
-  <p:tag name="KSO_WM_UNIT_COMPATIBLE" val="0"/>
-  <p:tag name="KSO_WM_UNIT_DIAGRAM_ISNUMVISUAL" val="0"/>
-  <p:tag name="KSO_WM_UNIT_DIAGRAM_ISREFERUNIT" val="0"/>
-  <p:tag name="KSO_WM_UNIT_ID" val="_2**"/>
-  <p:tag name="KSO_WM_UNIT_LAYERLEVEL" val="1"/>
-  <p:tag name="KSO_WM_TAG_VERSION" val="1.0"/>
-  <p:tag name="KSO_WM_BEAUTIFY_FLAG" val="#wm#"/>
 </p:tagLst>
 </file>
 

</xml_diff>